<commit_message>
Update Abschlusspräsentation with latest changes
</commit_message>
<xml_diff>
--- a/02_Backend/!_Docs/INF4_SYP_Gruppe1_Abschlusspräsentation.pptx
+++ b/02_Backend/!_Docs/INF4_SYP_Gruppe1_Abschlusspräsentation.pptx
@@ -5,10 +5,10 @@
     <p:sldMasterId id="2147483648" r:id="rId4"/>
   </p:sldMasterIdLst>
   <p:notesMasterIdLst>
-    <p:notesMasterId r:id="rId19"/>
+    <p:notesMasterId r:id="rId24"/>
   </p:notesMasterIdLst>
   <p:handoutMasterIdLst>
-    <p:handoutMasterId r:id="rId20"/>
+    <p:handoutMasterId r:id="rId25"/>
   </p:handoutMasterIdLst>
   <p:sldIdLst>
     <p:sldId id="361" r:id="rId5"/>
@@ -23,8 +23,13 @@
     <p:sldId id="598" r:id="rId14"/>
     <p:sldId id="599" r:id="rId15"/>
     <p:sldId id="600" r:id="rId16"/>
-    <p:sldId id="601" r:id="rId17"/>
-    <p:sldId id="587" r:id="rId18"/>
+    <p:sldId id="606" r:id="rId17"/>
+    <p:sldId id="601" r:id="rId18"/>
+    <p:sldId id="602" r:id="rId19"/>
+    <p:sldId id="603" r:id="rId20"/>
+    <p:sldId id="605" r:id="rId21"/>
+    <p:sldId id="604" r:id="rId22"/>
+    <p:sldId id="587" r:id="rId23"/>
   </p:sldIdLst>
   <p:sldSz cx="9144000" cy="6858000" type="screen4x3"/>
   <p:notesSz cx="7099300" cy="10234613"/>
@@ -826,7 +831,7 @@
             </a:pPr>
             <a:fld id="{3953DA5E-C6E2-4FA2-8BC8-7FF9A5EB6734}" type="datetimeFigureOut">
               <a:rPr lang="de-DE"/>
-              <a:t>22.05.2025</a:t>
+              <a:t>28.05.2025</a:t>
             </a:fld>
             <a:endParaRPr lang="de-DE"/>
           </a:p>
@@ -1007,7 +1012,7 @@
           <a:p>
             <a:fld id="{88DE360A-102B-474E-BEC0-79AC7566E430}" type="datetimeFigureOut">
               <a:rPr lang="en-US" smtClean="0"/>
-              <a:t>5/22/2025</a:t>
+              <a:t>5/28/2025</a:t>
             </a:fld>
             <a:endParaRPr lang="en-US"/>
           </a:p>
@@ -1353,6 +1358,438 @@
 </p:notes>
 </file>
 
+<file path=ppt/notesSlides/notesSlide10.xml><?xml version="1.0" encoding="utf-8"?>
+<p:notes xmlns:a="http://schemas.openxmlformats.org/drawingml/2006/main" xmlns:r="http://schemas.openxmlformats.org/officeDocument/2006/relationships" xmlns:p="http://schemas.openxmlformats.org/presentationml/2006/main">
+  <p:cSld>
+    <p:spTree>
+      <p:nvGrpSpPr>
+        <p:cNvPr id="1" name="">
+          <a:extLst>
+            <a:ext uri="{FF2B5EF4-FFF2-40B4-BE49-F238E27FC236}">
+              <a16:creationId xmlns:a16="http://schemas.microsoft.com/office/drawing/2014/main" id="{DECF6811-27A0-4092-0350-697ADC073641}"/>
+            </a:ext>
+          </a:extLst>
+        </p:cNvPr>
+        <p:cNvGrpSpPr/>
+        <p:nvPr/>
+      </p:nvGrpSpPr>
+      <p:grpSpPr>
+        <a:xfrm>
+          <a:off x="0" y="0"/>
+          <a:ext cx="0" cy="0"/>
+          <a:chOff x="0" y="0"/>
+          <a:chExt cx="0" cy="0"/>
+        </a:xfrm>
+      </p:grpSpPr>
+      <p:sp>
+        <p:nvSpPr>
+          <p:cNvPr id="2" name="Folienbildplatzhalter 1">
+            <a:extLst>
+              <a:ext uri="{FF2B5EF4-FFF2-40B4-BE49-F238E27FC236}">
+                <a16:creationId xmlns:a16="http://schemas.microsoft.com/office/drawing/2014/main" id="{B973850F-CCC7-666B-3D6D-7ACD6138D5A9}"/>
+              </a:ext>
+            </a:extLst>
+          </p:cNvPr>
+          <p:cNvSpPr>
+            <a:spLocks noGrp="1" noRot="1" noChangeAspect="1"/>
+          </p:cNvSpPr>
+          <p:nvPr>
+            <p:ph type="sldImg"/>
+          </p:nvPr>
+        </p:nvSpPr>
+        <p:spPr/>
+      </p:sp>
+      <p:sp>
+        <p:nvSpPr>
+          <p:cNvPr id="3" name="Notizenplatzhalter 2">
+            <a:extLst>
+              <a:ext uri="{FF2B5EF4-FFF2-40B4-BE49-F238E27FC236}">
+                <a16:creationId xmlns:a16="http://schemas.microsoft.com/office/drawing/2014/main" id="{F673A14B-3CD4-248C-3FC2-8B5C408E6A4F}"/>
+              </a:ext>
+            </a:extLst>
+          </p:cNvPr>
+          <p:cNvSpPr>
+            <a:spLocks noGrp="1"/>
+          </p:cNvSpPr>
+          <p:nvPr>
+            <p:ph type="body" idx="1"/>
+          </p:nvPr>
+        </p:nvSpPr>
+        <p:spPr/>
+        <p:txBody>
+          <a:bodyPr/>
+          <a:lstStyle/>
+          <a:p>
+            <a:endParaRPr lang="de-DE"/>
+          </a:p>
+        </p:txBody>
+      </p:sp>
+      <p:sp>
+        <p:nvSpPr>
+          <p:cNvPr id="4" name="Foliennummernplatzhalter 3">
+            <a:extLst>
+              <a:ext uri="{FF2B5EF4-FFF2-40B4-BE49-F238E27FC236}">
+                <a16:creationId xmlns:a16="http://schemas.microsoft.com/office/drawing/2014/main" id="{443DEACF-ED16-0AA3-805A-C4901F434352}"/>
+              </a:ext>
+            </a:extLst>
+          </p:cNvPr>
+          <p:cNvSpPr>
+            <a:spLocks noGrp="1"/>
+          </p:cNvSpPr>
+          <p:nvPr>
+            <p:ph type="sldNum" sz="quarter" idx="5"/>
+          </p:nvPr>
+        </p:nvSpPr>
+        <p:spPr/>
+        <p:txBody>
+          <a:bodyPr/>
+          <a:lstStyle/>
+          <a:p>
+            <a:fld id="{18D8EB10-9094-CC46-9BCA-615730AD1A2C}" type="slidenum">
+              <a:rPr lang="en-US" smtClean="0"/>
+              <a:t>15</a:t>
+            </a:fld>
+            <a:endParaRPr lang="en-US"/>
+          </a:p>
+        </p:txBody>
+      </p:sp>
+    </p:spTree>
+    <p:extLst>
+      <p:ext uri="{BB962C8B-B14F-4D97-AF65-F5344CB8AC3E}">
+        <p14:creationId xmlns:p14="http://schemas.microsoft.com/office/powerpoint/2010/main" val="2672714447"/>
+      </p:ext>
+    </p:extLst>
+  </p:cSld>
+  <p:clrMapOvr>
+    <a:masterClrMapping/>
+  </p:clrMapOvr>
+</p:notes>
+</file>
+
+<file path=ppt/notesSlides/notesSlide11.xml><?xml version="1.0" encoding="utf-8"?>
+<p:notes xmlns:a="http://schemas.openxmlformats.org/drawingml/2006/main" xmlns:r="http://schemas.openxmlformats.org/officeDocument/2006/relationships" xmlns:p="http://schemas.openxmlformats.org/presentationml/2006/main">
+  <p:cSld>
+    <p:spTree>
+      <p:nvGrpSpPr>
+        <p:cNvPr id="1" name="">
+          <a:extLst>
+            <a:ext uri="{FF2B5EF4-FFF2-40B4-BE49-F238E27FC236}">
+              <a16:creationId xmlns:a16="http://schemas.microsoft.com/office/drawing/2014/main" id="{4D68F1F2-0D32-8845-1E6C-1EA78EF669CD}"/>
+            </a:ext>
+          </a:extLst>
+        </p:cNvPr>
+        <p:cNvGrpSpPr/>
+        <p:nvPr/>
+      </p:nvGrpSpPr>
+      <p:grpSpPr>
+        <a:xfrm>
+          <a:off x="0" y="0"/>
+          <a:ext cx="0" cy="0"/>
+          <a:chOff x="0" y="0"/>
+          <a:chExt cx="0" cy="0"/>
+        </a:xfrm>
+      </p:grpSpPr>
+      <p:sp>
+        <p:nvSpPr>
+          <p:cNvPr id="2" name="Folienbildplatzhalter 1">
+            <a:extLst>
+              <a:ext uri="{FF2B5EF4-FFF2-40B4-BE49-F238E27FC236}">
+                <a16:creationId xmlns:a16="http://schemas.microsoft.com/office/drawing/2014/main" id="{038AB7AA-DB90-6806-FEFE-5D0818D072E8}"/>
+              </a:ext>
+            </a:extLst>
+          </p:cNvPr>
+          <p:cNvSpPr>
+            <a:spLocks noGrp="1" noRot="1" noChangeAspect="1"/>
+          </p:cNvSpPr>
+          <p:nvPr>
+            <p:ph type="sldImg"/>
+          </p:nvPr>
+        </p:nvSpPr>
+        <p:spPr/>
+      </p:sp>
+      <p:sp>
+        <p:nvSpPr>
+          <p:cNvPr id="3" name="Notizenplatzhalter 2">
+            <a:extLst>
+              <a:ext uri="{FF2B5EF4-FFF2-40B4-BE49-F238E27FC236}">
+                <a16:creationId xmlns:a16="http://schemas.microsoft.com/office/drawing/2014/main" id="{962A91C2-821E-1017-A805-5F442C4B8B1A}"/>
+              </a:ext>
+            </a:extLst>
+          </p:cNvPr>
+          <p:cNvSpPr>
+            <a:spLocks noGrp="1"/>
+          </p:cNvSpPr>
+          <p:nvPr>
+            <p:ph type="body" idx="1"/>
+          </p:nvPr>
+        </p:nvSpPr>
+        <p:spPr/>
+        <p:txBody>
+          <a:bodyPr/>
+          <a:lstStyle/>
+          <a:p>
+            <a:endParaRPr lang="de-DE"/>
+          </a:p>
+        </p:txBody>
+      </p:sp>
+      <p:sp>
+        <p:nvSpPr>
+          <p:cNvPr id="4" name="Foliennummernplatzhalter 3">
+            <a:extLst>
+              <a:ext uri="{FF2B5EF4-FFF2-40B4-BE49-F238E27FC236}">
+                <a16:creationId xmlns:a16="http://schemas.microsoft.com/office/drawing/2014/main" id="{27484706-851B-26F4-7161-64DE5666E6E6}"/>
+              </a:ext>
+            </a:extLst>
+          </p:cNvPr>
+          <p:cNvSpPr>
+            <a:spLocks noGrp="1"/>
+          </p:cNvSpPr>
+          <p:nvPr>
+            <p:ph type="sldNum" sz="quarter" idx="5"/>
+          </p:nvPr>
+        </p:nvSpPr>
+        <p:spPr/>
+        <p:txBody>
+          <a:bodyPr/>
+          <a:lstStyle/>
+          <a:p>
+            <a:fld id="{18D8EB10-9094-CC46-9BCA-615730AD1A2C}" type="slidenum">
+              <a:rPr lang="en-US" smtClean="0"/>
+              <a:t>16</a:t>
+            </a:fld>
+            <a:endParaRPr lang="en-US"/>
+          </a:p>
+        </p:txBody>
+      </p:sp>
+    </p:spTree>
+    <p:extLst>
+      <p:ext uri="{BB962C8B-B14F-4D97-AF65-F5344CB8AC3E}">
+        <p14:creationId xmlns:p14="http://schemas.microsoft.com/office/powerpoint/2010/main" val="4178782690"/>
+      </p:ext>
+    </p:extLst>
+  </p:cSld>
+  <p:clrMapOvr>
+    <a:masterClrMapping/>
+  </p:clrMapOvr>
+</p:notes>
+</file>
+
+<file path=ppt/notesSlides/notesSlide12.xml><?xml version="1.0" encoding="utf-8"?>
+<p:notes xmlns:a="http://schemas.openxmlformats.org/drawingml/2006/main" xmlns:r="http://schemas.openxmlformats.org/officeDocument/2006/relationships" xmlns:p="http://schemas.openxmlformats.org/presentationml/2006/main">
+  <p:cSld>
+    <p:spTree>
+      <p:nvGrpSpPr>
+        <p:cNvPr id="1" name="">
+          <a:extLst>
+            <a:ext uri="{FF2B5EF4-FFF2-40B4-BE49-F238E27FC236}">
+              <a16:creationId xmlns:a16="http://schemas.microsoft.com/office/drawing/2014/main" id="{BC7688D4-2D9B-8D87-5CE2-319B2EFA4C1C}"/>
+            </a:ext>
+          </a:extLst>
+        </p:cNvPr>
+        <p:cNvGrpSpPr/>
+        <p:nvPr/>
+      </p:nvGrpSpPr>
+      <p:grpSpPr>
+        <a:xfrm>
+          <a:off x="0" y="0"/>
+          <a:ext cx="0" cy="0"/>
+          <a:chOff x="0" y="0"/>
+          <a:chExt cx="0" cy="0"/>
+        </a:xfrm>
+      </p:grpSpPr>
+      <p:sp>
+        <p:nvSpPr>
+          <p:cNvPr id="2" name="Folienbildplatzhalter 1">
+            <a:extLst>
+              <a:ext uri="{FF2B5EF4-FFF2-40B4-BE49-F238E27FC236}">
+                <a16:creationId xmlns:a16="http://schemas.microsoft.com/office/drawing/2014/main" id="{5152C2B8-633B-30BE-EBE9-13E9199571DA}"/>
+              </a:ext>
+            </a:extLst>
+          </p:cNvPr>
+          <p:cNvSpPr>
+            <a:spLocks noGrp="1" noRot="1" noChangeAspect="1"/>
+          </p:cNvSpPr>
+          <p:nvPr>
+            <p:ph type="sldImg"/>
+          </p:nvPr>
+        </p:nvSpPr>
+        <p:spPr/>
+      </p:sp>
+      <p:sp>
+        <p:nvSpPr>
+          <p:cNvPr id="3" name="Notizenplatzhalter 2">
+            <a:extLst>
+              <a:ext uri="{FF2B5EF4-FFF2-40B4-BE49-F238E27FC236}">
+                <a16:creationId xmlns:a16="http://schemas.microsoft.com/office/drawing/2014/main" id="{54E09F56-C0ED-DAAC-2705-1AF9910A7E9A}"/>
+              </a:ext>
+            </a:extLst>
+          </p:cNvPr>
+          <p:cNvSpPr>
+            <a:spLocks noGrp="1"/>
+          </p:cNvSpPr>
+          <p:nvPr>
+            <p:ph type="body" idx="1"/>
+          </p:nvPr>
+        </p:nvSpPr>
+        <p:spPr/>
+        <p:txBody>
+          <a:bodyPr/>
+          <a:lstStyle/>
+          <a:p>
+            <a:endParaRPr lang="de-DE"/>
+          </a:p>
+        </p:txBody>
+      </p:sp>
+      <p:sp>
+        <p:nvSpPr>
+          <p:cNvPr id="4" name="Foliennummernplatzhalter 3">
+            <a:extLst>
+              <a:ext uri="{FF2B5EF4-FFF2-40B4-BE49-F238E27FC236}">
+                <a16:creationId xmlns:a16="http://schemas.microsoft.com/office/drawing/2014/main" id="{CD6EE6D3-C4A7-7904-88CF-1544243EE693}"/>
+              </a:ext>
+            </a:extLst>
+          </p:cNvPr>
+          <p:cNvSpPr>
+            <a:spLocks noGrp="1"/>
+          </p:cNvSpPr>
+          <p:nvPr>
+            <p:ph type="sldNum" sz="quarter" idx="5"/>
+          </p:nvPr>
+        </p:nvSpPr>
+        <p:spPr/>
+        <p:txBody>
+          <a:bodyPr/>
+          <a:lstStyle/>
+          <a:p>
+            <a:fld id="{18D8EB10-9094-CC46-9BCA-615730AD1A2C}" type="slidenum">
+              <a:rPr lang="en-US" smtClean="0"/>
+              <a:t>17</a:t>
+            </a:fld>
+            <a:endParaRPr lang="en-US"/>
+          </a:p>
+        </p:txBody>
+      </p:sp>
+    </p:spTree>
+    <p:extLst>
+      <p:ext uri="{BB962C8B-B14F-4D97-AF65-F5344CB8AC3E}">
+        <p14:creationId xmlns:p14="http://schemas.microsoft.com/office/powerpoint/2010/main" val="3225204619"/>
+      </p:ext>
+    </p:extLst>
+  </p:cSld>
+  <p:clrMapOvr>
+    <a:masterClrMapping/>
+  </p:clrMapOvr>
+</p:notes>
+</file>
+
+<file path=ppt/notesSlides/notesSlide13.xml><?xml version="1.0" encoding="utf-8"?>
+<p:notes xmlns:a="http://schemas.openxmlformats.org/drawingml/2006/main" xmlns:r="http://schemas.openxmlformats.org/officeDocument/2006/relationships" xmlns:p="http://schemas.openxmlformats.org/presentationml/2006/main">
+  <p:cSld>
+    <p:spTree>
+      <p:nvGrpSpPr>
+        <p:cNvPr id="1" name="">
+          <a:extLst>
+            <a:ext uri="{FF2B5EF4-FFF2-40B4-BE49-F238E27FC236}">
+              <a16:creationId xmlns:a16="http://schemas.microsoft.com/office/drawing/2014/main" id="{A66FA3BB-B418-0FA6-D1AD-F1B94C435CED}"/>
+            </a:ext>
+          </a:extLst>
+        </p:cNvPr>
+        <p:cNvGrpSpPr/>
+        <p:nvPr/>
+      </p:nvGrpSpPr>
+      <p:grpSpPr>
+        <a:xfrm>
+          <a:off x="0" y="0"/>
+          <a:ext cx="0" cy="0"/>
+          <a:chOff x="0" y="0"/>
+          <a:chExt cx="0" cy="0"/>
+        </a:xfrm>
+      </p:grpSpPr>
+      <p:sp>
+        <p:nvSpPr>
+          <p:cNvPr id="2" name="Folienbildplatzhalter 1">
+            <a:extLst>
+              <a:ext uri="{FF2B5EF4-FFF2-40B4-BE49-F238E27FC236}">
+                <a16:creationId xmlns:a16="http://schemas.microsoft.com/office/drawing/2014/main" id="{E9103901-2CE2-2DA4-A584-EE1ADB9BB5CE}"/>
+              </a:ext>
+            </a:extLst>
+          </p:cNvPr>
+          <p:cNvSpPr>
+            <a:spLocks noGrp="1" noRot="1" noChangeAspect="1"/>
+          </p:cNvSpPr>
+          <p:nvPr>
+            <p:ph type="sldImg"/>
+          </p:nvPr>
+        </p:nvSpPr>
+        <p:spPr/>
+      </p:sp>
+      <p:sp>
+        <p:nvSpPr>
+          <p:cNvPr id="3" name="Notizenplatzhalter 2">
+            <a:extLst>
+              <a:ext uri="{FF2B5EF4-FFF2-40B4-BE49-F238E27FC236}">
+                <a16:creationId xmlns:a16="http://schemas.microsoft.com/office/drawing/2014/main" id="{740B0696-7D55-C852-DE34-ACEFCC854A68}"/>
+              </a:ext>
+            </a:extLst>
+          </p:cNvPr>
+          <p:cNvSpPr>
+            <a:spLocks noGrp="1"/>
+          </p:cNvSpPr>
+          <p:nvPr>
+            <p:ph type="body" idx="1"/>
+          </p:nvPr>
+        </p:nvSpPr>
+        <p:spPr/>
+        <p:txBody>
+          <a:bodyPr/>
+          <a:lstStyle/>
+          <a:p>
+            <a:endParaRPr lang="de-DE"/>
+          </a:p>
+        </p:txBody>
+      </p:sp>
+      <p:sp>
+        <p:nvSpPr>
+          <p:cNvPr id="4" name="Foliennummernplatzhalter 3">
+            <a:extLst>
+              <a:ext uri="{FF2B5EF4-FFF2-40B4-BE49-F238E27FC236}">
+                <a16:creationId xmlns:a16="http://schemas.microsoft.com/office/drawing/2014/main" id="{05FF9443-1C17-C8C1-84DE-C393997CFCE9}"/>
+              </a:ext>
+            </a:extLst>
+          </p:cNvPr>
+          <p:cNvSpPr>
+            <a:spLocks noGrp="1"/>
+          </p:cNvSpPr>
+          <p:nvPr>
+            <p:ph type="sldNum" sz="quarter" idx="5"/>
+          </p:nvPr>
+        </p:nvSpPr>
+        <p:spPr/>
+        <p:txBody>
+          <a:bodyPr/>
+          <a:lstStyle/>
+          <a:p>
+            <a:fld id="{18D8EB10-9094-CC46-9BCA-615730AD1A2C}" type="slidenum">
+              <a:rPr lang="en-US" smtClean="0"/>
+              <a:t>18</a:t>
+            </a:fld>
+            <a:endParaRPr lang="en-US"/>
+          </a:p>
+        </p:txBody>
+      </p:sp>
+    </p:spTree>
+    <p:extLst>
+      <p:ext uri="{BB962C8B-B14F-4D97-AF65-F5344CB8AC3E}">
+        <p14:creationId xmlns:p14="http://schemas.microsoft.com/office/powerpoint/2010/main" val="695515184"/>
+      </p:ext>
+    </p:extLst>
+  </p:cSld>
+  <p:clrMapOvr>
+    <a:masterClrMapping/>
+  </p:clrMapOvr>
+</p:notes>
+</file>
+
 <file path=ppt/notesSlides/notesSlide2.xml><?xml version="1.0" encoding="utf-8"?>
 <p:notes xmlns:a="http://schemas.openxmlformats.org/drawingml/2006/main" xmlns:r="http://schemas.openxmlformats.org/officeDocument/2006/relationships" xmlns:p="http://schemas.openxmlformats.org/presentationml/2006/main">
   <p:cSld>
@@ -2009,6 +2446,114 @@
         <p:cNvPr id="1" name="">
           <a:extLst>
             <a:ext uri="{FF2B5EF4-FFF2-40B4-BE49-F238E27FC236}">
+              <a16:creationId xmlns:a16="http://schemas.microsoft.com/office/drawing/2014/main" id="{49915A02-F8AE-F7B9-2211-4B4AF3239AC6}"/>
+            </a:ext>
+          </a:extLst>
+        </p:cNvPr>
+        <p:cNvGrpSpPr/>
+        <p:nvPr/>
+      </p:nvGrpSpPr>
+      <p:grpSpPr>
+        <a:xfrm>
+          <a:off x="0" y="0"/>
+          <a:ext cx="0" cy="0"/>
+          <a:chOff x="0" y="0"/>
+          <a:chExt cx="0" cy="0"/>
+        </a:xfrm>
+      </p:grpSpPr>
+      <p:sp>
+        <p:nvSpPr>
+          <p:cNvPr id="2" name="Folienbildplatzhalter 1">
+            <a:extLst>
+              <a:ext uri="{FF2B5EF4-FFF2-40B4-BE49-F238E27FC236}">
+                <a16:creationId xmlns:a16="http://schemas.microsoft.com/office/drawing/2014/main" id="{50678E8E-67A3-9348-4AA2-DFE7CB66FEAE}"/>
+              </a:ext>
+            </a:extLst>
+          </p:cNvPr>
+          <p:cNvSpPr>
+            <a:spLocks noGrp="1" noRot="1" noChangeAspect="1"/>
+          </p:cNvSpPr>
+          <p:nvPr>
+            <p:ph type="sldImg"/>
+          </p:nvPr>
+        </p:nvSpPr>
+        <p:spPr/>
+      </p:sp>
+      <p:sp>
+        <p:nvSpPr>
+          <p:cNvPr id="3" name="Notizenplatzhalter 2">
+            <a:extLst>
+              <a:ext uri="{FF2B5EF4-FFF2-40B4-BE49-F238E27FC236}">
+                <a16:creationId xmlns:a16="http://schemas.microsoft.com/office/drawing/2014/main" id="{62093F72-56F6-8DC6-B3AB-C71591788A67}"/>
+              </a:ext>
+            </a:extLst>
+          </p:cNvPr>
+          <p:cNvSpPr>
+            <a:spLocks noGrp="1"/>
+          </p:cNvSpPr>
+          <p:nvPr>
+            <p:ph type="body" idx="1"/>
+          </p:nvPr>
+        </p:nvSpPr>
+        <p:spPr/>
+        <p:txBody>
+          <a:bodyPr/>
+          <a:lstStyle/>
+          <a:p>
+            <a:endParaRPr lang="de-DE"/>
+          </a:p>
+        </p:txBody>
+      </p:sp>
+      <p:sp>
+        <p:nvSpPr>
+          <p:cNvPr id="4" name="Foliennummernplatzhalter 3">
+            <a:extLst>
+              <a:ext uri="{FF2B5EF4-FFF2-40B4-BE49-F238E27FC236}">
+                <a16:creationId xmlns:a16="http://schemas.microsoft.com/office/drawing/2014/main" id="{604DAEDD-6837-C78C-18FA-1AC6EEFD594D}"/>
+              </a:ext>
+            </a:extLst>
+          </p:cNvPr>
+          <p:cNvSpPr>
+            <a:spLocks noGrp="1"/>
+          </p:cNvSpPr>
+          <p:nvPr>
+            <p:ph type="sldNum" sz="quarter" idx="5"/>
+          </p:nvPr>
+        </p:nvSpPr>
+        <p:spPr/>
+        <p:txBody>
+          <a:bodyPr/>
+          <a:lstStyle/>
+          <a:p>
+            <a:fld id="{18D8EB10-9094-CC46-9BCA-615730AD1A2C}" type="slidenum">
+              <a:rPr lang="en-US" smtClean="0"/>
+              <a:t>13</a:t>
+            </a:fld>
+            <a:endParaRPr lang="en-US"/>
+          </a:p>
+        </p:txBody>
+      </p:sp>
+    </p:spTree>
+    <p:extLst>
+      <p:ext uri="{BB962C8B-B14F-4D97-AF65-F5344CB8AC3E}">
+        <p14:creationId xmlns:p14="http://schemas.microsoft.com/office/powerpoint/2010/main" val="821784495"/>
+      </p:ext>
+    </p:extLst>
+  </p:cSld>
+  <p:clrMapOvr>
+    <a:masterClrMapping/>
+  </p:clrMapOvr>
+</p:notes>
+</file>
+
+<file path=ppt/notesSlides/notesSlide9.xml><?xml version="1.0" encoding="utf-8"?>
+<p:notes xmlns:a="http://schemas.openxmlformats.org/drawingml/2006/main" xmlns:r="http://schemas.openxmlformats.org/officeDocument/2006/relationships" xmlns:p="http://schemas.openxmlformats.org/presentationml/2006/main">
+  <p:cSld>
+    <p:spTree>
+      <p:nvGrpSpPr>
+        <p:cNvPr id="1" name="">
+          <a:extLst>
+            <a:ext uri="{FF2B5EF4-FFF2-40B4-BE49-F238E27FC236}">
               <a16:creationId xmlns:a16="http://schemas.microsoft.com/office/drawing/2014/main" id="{193D43B8-4591-87AE-E69A-FBDC69D41051}"/>
             </a:ext>
           </a:extLst>
@@ -2090,7 +2635,7 @@
           <a:p>
             <a:fld id="{18D8EB10-9094-CC46-9BCA-615730AD1A2C}" type="slidenum">
               <a:rPr lang="en-US" smtClean="0"/>
-              <a:t>13</a:t>
+              <a:t>14</a:t>
             </a:fld>
             <a:endParaRPr lang="en-US"/>
           </a:p>
@@ -6472,13 +7017,13 @@
   <p:clrMapOvr>
     <a:masterClrMapping/>
   </p:clrMapOvr>
-  <mc:AlternateContent xmlns:mc="http://schemas.openxmlformats.org/markup-compatibility/2006">
-    <mc:Choice xmlns:p14="http://schemas.microsoft.com/office/powerpoint/2010/main" Requires="p14">
+  <mc:AlternateContent xmlns:mc="http://schemas.openxmlformats.org/markup-compatibility/2006" xmlns:p14="http://schemas.microsoft.com/office/powerpoint/2010/main">
+    <mc:Choice Requires="p14">
       <p:transition spd="med" p14:dur="700">
         <p:fade/>
       </p:transition>
     </mc:Choice>
-    <mc:Fallback>
+    <mc:Fallback xmlns="">
       <p:transition spd="med">
         <p:fade/>
       </p:transition>
@@ -6613,10 +7158,10 @@
       </p:sp>
       <p:pic>
         <p:nvPicPr>
-          <p:cNvPr id="6" name="Grafik 5">
+          <p:cNvPr id="11" name="Grafik 10">
             <a:extLst>
               <a:ext uri="{FF2B5EF4-FFF2-40B4-BE49-F238E27FC236}">
-                <a16:creationId xmlns:a16="http://schemas.microsoft.com/office/drawing/2014/main" id="{EBA65B8A-91FF-D6F6-CFB4-B20874DF6998}"/>
+                <a16:creationId xmlns:a16="http://schemas.microsoft.com/office/drawing/2014/main" id="{2ACC9B38-59D9-1FC2-B688-935A0642EB28}"/>
               </a:ext>
             </a:extLst>
           </p:cNvPr>
@@ -6633,8 +7178,8 @@
         </p:blipFill>
         <p:spPr>
           <a:xfrm>
-            <a:off x="266807" y="2158062"/>
-            <a:ext cx="8610385" cy="2236463"/>
+            <a:off x="733368" y="1702549"/>
+            <a:ext cx="7970475" cy="4226301"/>
           </a:xfrm>
           <a:prstGeom prst="rect">
             <a:avLst/>
@@ -6651,13 +7196,13 @@
   <p:clrMapOvr>
     <a:masterClrMapping/>
   </p:clrMapOvr>
-  <mc:AlternateContent xmlns:mc="http://schemas.openxmlformats.org/markup-compatibility/2006">
-    <mc:Choice xmlns:p14="http://schemas.microsoft.com/office/powerpoint/2010/main" Requires="p14">
+  <mc:AlternateContent xmlns:mc="http://schemas.openxmlformats.org/markup-compatibility/2006" xmlns:p14="http://schemas.microsoft.com/office/powerpoint/2010/main">
+    <mc:Choice Requires="p14">
       <p:transition spd="med" p14:dur="700">
         <p:fade/>
       </p:transition>
     </mc:Choice>
-    <mc:Fallback>
+    <mc:Fallback xmlns="">
       <p:transition spd="med">
         <p:fade/>
       </p:transition>
@@ -7226,6 +7771,192 @@
   <p:clrMapOvr>
     <a:masterClrMapping/>
   </p:clrMapOvr>
+  <mc:AlternateContent xmlns:mc="http://schemas.openxmlformats.org/markup-compatibility/2006" xmlns:p14="http://schemas.microsoft.com/office/powerpoint/2010/main">
+    <mc:Choice Requires="p14">
+      <p:transition spd="med" p14:dur="700">
+        <p:fade/>
+      </p:transition>
+    </mc:Choice>
+    <mc:Fallback xmlns="">
+      <p:transition spd="med">
+        <p:fade/>
+      </p:transition>
+    </mc:Fallback>
+  </mc:AlternateContent>
+</p:sld>
+</file>
+
+<file path=ppt/slides/slide13.xml><?xml version="1.0" encoding="utf-8"?>
+<p:sld xmlns:a="http://schemas.openxmlformats.org/drawingml/2006/main" xmlns:r="http://schemas.openxmlformats.org/officeDocument/2006/relationships" xmlns:p="http://schemas.openxmlformats.org/presentationml/2006/main">
+  <p:cSld>
+    <p:spTree>
+      <p:nvGrpSpPr>
+        <p:cNvPr id="1" name="">
+          <a:extLst>
+            <a:ext uri="{FF2B5EF4-FFF2-40B4-BE49-F238E27FC236}">
+              <a16:creationId xmlns:a16="http://schemas.microsoft.com/office/drawing/2014/main" id="{0F086092-51C1-8D0C-D3B9-8CFBE126EDD6}"/>
+            </a:ext>
+          </a:extLst>
+        </p:cNvPr>
+        <p:cNvGrpSpPr/>
+        <p:nvPr/>
+      </p:nvGrpSpPr>
+      <p:grpSpPr>
+        <a:xfrm>
+          <a:off x="0" y="0"/>
+          <a:ext cx="0" cy="0"/>
+          <a:chOff x="0" y="0"/>
+          <a:chExt cx="0" cy="0"/>
+        </a:xfrm>
+      </p:grpSpPr>
+      <p:sp>
+        <p:nvSpPr>
+          <p:cNvPr id="2" name="Title 1">
+            <a:extLst>
+              <a:ext uri="{FF2B5EF4-FFF2-40B4-BE49-F238E27FC236}">
+                <a16:creationId xmlns:a16="http://schemas.microsoft.com/office/drawing/2014/main" id="{C026D44F-7BE0-E3A3-97EC-20E659FF3FC0}"/>
+              </a:ext>
+            </a:extLst>
+          </p:cNvPr>
+          <p:cNvSpPr>
+            <a:spLocks noGrp="1"/>
+          </p:cNvSpPr>
+          <p:nvPr>
+            <p:ph type="title"/>
+          </p:nvPr>
+        </p:nvSpPr>
+        <p:spPr>
+          <a:xfrm>
+            <a:off x="1937231" y="303130"/>
+            <a:ext cx="6607646" cy="759618"/>
+          </a:xfrm>
+        </p:spPr>
+        <p:txBody>
+          <a:bodyPr/>
+          <a:lstStyle/>
+          <a:p>
+            <a:endParaRPr lang="de-DE" altLang="en-US" dirty="0">
+              <a:latin typeface="Calibri" panose="020F0502020204030204" charset="0"/>
+            </a:endParaRPr>
+          </a:p>
+        </p:txBody>
+      </p:sp>
+      <p:sp>
+        <p:nvSpPr>
+          <p:cNvPr id="8" name="Footer Placeholder 7">
+            <a:extLst>
+              <a:ext uri="{FF2B5EF4-FFF2-40B4-BE49-F238E27FC236}">
+                <a16:creationId xmlns:a16="http://schemas.microsoft.com/office/drawing/2014/main" id="{06BBE790-931D-00BD-1EFB-9968300AA74D}"/>
+              </a:ext>
+            </a:extLst>
+          </p:cNvPr>
+          <p:cNvSpPr>
+            <a:spLocks noGrp="1"/>
+          </p:cNvSpPr>
+          <p:nvPr>
+            <p:ph type="ftr" sz="quarter" idx="11"/>
+          </p:nvPr>
+        </p:nvSpPr>
+        <p:spPr/>
+        <p:txBody>
+          <a:bodyPr/>
+          <a:lstStyle/>
+          <a:p>
+            <a:pPr>
+              <a:defRPr/>
+            </a:pPr>
+            <a:r>
+              <a:rPr lang="de-DE" dirty="0"/>
+              <a:t>DI(FH) Falkensteiner Markus</a:t>
+            </a:r>
+          </a:p>
+        </p:txBody>
+      </p:sp>
+      <p:sp>
+        <p:nvSpPr>
+          <p:cNvPr id="9" name="Slide Number Placeholder 8">
+            <a:extLst>
+              <a:ext uri="{FF2B5EF4-FFF2-40B4-BE49-F238E27FC236}">
+                <a16:creationId xmlns:a16="http://schemas.microsoft.com/office/drawing/2014/main" id="{FA3DA740-BDF0-32C4-D0C4-8147B4DFF455}"/>
+              </a:ext>
+            </a:extLst>
+          </p:cNvPr>
+          <p:cNvSpPr>
+            <a:spLocks noGrp="1"/>
+          </p:cNvSpPr>
+          <p:nvPr>
+            <p:ph type="sldNum" sz="quarter" idx="12"/>
+          </p:nvPr>
+        </p:nvSpPr>
+        <p:spPr/>
+        <p:txBody>
+          <a:bodyPr/>
+          <a:lstStyle/>
+          <a:p>
+            <a:pPr>
+              <a:defRPr/>
+            </a:pPr>
+            <a:fld id="{AE4538FE-AEB4-413B-B741-EC1BAEEF6B8F}" type="slidenum">
+              <a:rPr lang="de-AT" smtClean="0"/>
+              <a:t>13</a:t>
+            </a:fld>
+            <a:endParaRPr lang="de-AT"/>
+          </a:p>
+        </p:txBody>
+      </p:sp>
+      <p:pic>
+        <p:nvPicPr>
+          <p:cNvPr id="6" name="Grafik 5">
+            <a:extLst>
+              <a:ext uri="{FF2B5EF4-FFF2-40B4-BE49-F238E27FC236}">
+                <a16:creationId xmlns:a16="http://schemas.microsoft.com/office/drawing/2014/main" id="{2531EA11-1739-2828-961A-74CC5992F49F}"/>
+              </a:ext>
+            </a:extLst>
+          </p:cNvPr>
+          <p:cNvPicPr>
+            <a:picLocks noChangeAspect="1"/>
+          </p:cNvPicPr>
+          <p:nvPr/>
+        </p:nvPicPr>
+        <p:blipFill rotWithShape="1">
+          <a:blip r:embed="rId3">
+            <a:extLst>
+              <a:ext uri="{96DAC541-7B7A-43D3-8B79-37D633B846F1}">
+                <asvg:svgBlip xmlns:asvg="http://schemas.microsoft.com/office/drawing/2016/SVG/main" r:embed="rId4"/>
+              </a:ext>
+            </a:extLst>
+          </a:blip>
+          <a:srcRect t="3589"/>
+          <a:stretch/>
+        </p:blipFill>
+        <p:spPr bwMode="auto">
+          <a:xfrm>
+            <a:off x="1864524" y="136524"/>
+            <a:ext cx="5709920" cy="6469380"/>
+          </a:xfrm>
+          <a:prstGeom prst="rect">
+            <a:avLst/>
+          </a:prstGeom>
+          <a:ln>
+            <a:noFill/>
+          </a:ln>
+          <a:extLst>
+            <a:ext uri="{53640926-AAD7-44D8-BBD7-CCE9431645EC}">
+              <a14:shadowObscured xmlns:a14="http://schemas.microsoft.com/office/drawing/2010/main"/>
+            </a:ext>
+          </a:extLst>
+        </p:spPr>
+      </p:pic>
+    </p:spTree>
+    <p:extLst>
+      <p:ext uri="{BB962C8B-B14F-4D97-AF65-F5344CB8AC3E}">
+        <p14:creationId xmlns:p14="http://schemas.microsoft.com/office/powerpoint/2010/main" val="587124884"/>
+      </p:ext>
+    </p:extLst>
+  </p:cSld>
+  <p:clrMapOvr>
+    <a:masterClrMapping/>
+  </p:clrMapOvr>
   <mc:AlternateContent xmlns:mc="http://schemas.openxmlformats.org/markup-compatibility/2006">
     <mc:Choice xmlns:p14="http://schemas.microsoft.com/office/powerpoint/2010/main" Requires="p14">
       <p:transition spd="med" p14:dur="700">
@@ -7241,7 +7972,7 @@
 </p:sld>
 </file>
 
-<file path=ppt/slides/slide13.xml><?xml version="1.0" encoding="utf-8"?>
+<file path=ppt/slides/slide14.xml><?xml version="1.0" encoding="utf-8"?>
 <p:sld xmlns:a="http://schemas.openxmlformats.org/drawingml/2006/main" xmlns:r="http://schemas.openxmlformats.org/officeDocument/2006/relationships" xmlns:p="http://schemas.openxmlformats.org/presentationml/2006/main">
   <p:cSld>
     <p:spTree>
@@ -7383,7 +8114,7 @@
                 </a:spcAft>
                 <a:defRPr/>
               </a:pPr>
-              <a:t>13</a:t>
+              <a:t>14</a:t>
             </a:fld>
             <a:endParaRPr lang="de-AT"/>
           </a:p>
@@ -7473,6 +8204,250 @@
   <p:clrMapOvr>
     <a:masterClrMapping/>
   </p:clrMapOvr>
+  <mc:AlternateContent xmlns:mc="http://schemas.openxmlformats.org/markup-compatibility/2006" xmlns:p14="http://schemas.microsoft.com/office/powerpoint/2010/main">
+    <mc:Choice Requires="p14">
+      <p:transition spd="med" p14:dur="700">
+        <p:fade/>
+      </p:transition>
+    </mc:Choice>
+    <mc:Fallback xmlns="">
+      <p:transition spd="med">
+        <p:fade/>
+      </p:transition>
+    </mc:Fallback>
+  </mc:AlternateContent>
+</p:sld>
+</file>
+
+<file path=ppt/slides/slide15.xml><?xml version="1.0" encoding="utf-8"?>
+<p:sld xmlns:a="http://schemas.openxmlformats.org/drawingml/2006/main" xmlns:r="http://schemas.openxmlformats.org/officeDocument/2006/relationships" xmlns:p="http://schemas.openxmlformats.org/presentationml/2006/main">
+  <p:cSld>
+    <p:spTree>
+      <p:nvGrpSpPr>
+        <p:cNvPr id="1" name="">
+          <a:extLst>
+            <a:ext uri="{FF2B5EF4-FFF2-40B4-BE49-F238E27FC236}">
+              <a16:creationId xmlns:a16="http://schemas.microsoft.com/office/drawing/2014/main" id="{AA0A9CE9-A192-74AA-7B7C-39C733C2CEF8}"/>
+            </a:ext>
+          </a:extLst>
+        </p:cNvPr>
+        <p:cNvGrpSpPr/>
+        <p:nvPr/>
+      </p:nvGrpSpPr>
+      <p:grpSpPr>
+        <a:xfrm>
+          <a:off x="0" y="0"/>
+          <a:ext cx="0" cy="0"/>
+          <a:chOff x="0" y="0"/>
+          <a:chExt cx="0" cy="0"/>
+        </a:xfrm>
+      </p:grpSpPr>
+      <p:sp>
+        <p:nvSpPr>
+          <p:cNvPr id="2" name="Title 1">
+            <a:extLst>
+              <a:ext uri="{FF2B5EF4-FFF2-40B4-BE49-F238E27FC236}">
+                <a16:creationId xmlns:a16="http://schemas.microsoft.com/office/drawing/2014/main" id="{40BCF890-C8FA-0488-32FD-1B83C1760FFE}"/>
+              </a:ext>
+            </a:extLst>
+          </p:cNvPr>
+          <p:cNvSpPr>
+            <a:spLocks noGrp="1"/>
+          </p:cNvSpPr>
+          <p:nvPr>
+            <p:ph type="title"/>
+          </p:nvPr>
+        </p:nvSpPr>
+        <p:spPr>
+          <a:xfrm>
+            <a:off x="1907704" y="365127"/>
+            <a:ext cx="6607646" cy="759618"/>
+          </a:xfrm>
+        </p:spPr>
+        <p:txBody>
+          <a:bodyPr anchor="ctr">
+            <a:normAutofit/>
+          </a:bodyPr>
+          <a:lstStyle/>
+          <a:p>
+            <a:r>
+              <a:rPr lang="de-DE" altLang="en-US"/>
+              <a:t>Wichtige Code-Abschnitte</a:t>
+            </a:r>
+          </a:p>
+        </p:txBody>
+      </p:sp>
+      <p:sp>
+        <p:nvSpPr>
+          <p:cNvPr id="8" name="Footer Placeholder 7">
+            <a:extLst>
+              <a:ext uri="{FF2B5EF4-FFF2-40B4-BE49-F238E27FC236}">
+                <a16:creationId xmlns:a16="http://schemas.microsoft.com/office/drawing/2014/main" id="{413C5D8E-504E-AE33-5CAB-ECA08D51283C}"/>
+              </a:ext>
+            </a:extLst>
+          </p:cNvPr>
+          <p:cNvSpPr>
+            <a:spLocks noGrp="1"/>
+          </p:cNvSpPr>
+          <p:nvPr>
+            <p:ph type="ftr" sz="quarter" idx="11"/>
+          </p:nvPr>
+        </p:nvSpPr>
+        <p:spPr>
+          <a:xfrm>
+            <a:off x="3028950" y="6356351"/>
+            <a:ext cx="3086100" cy="365125"/>
+          </a:xfrm>
+        </p:spPr>
+        <p:txBody>
+          <a:bodyPr anchor="ctr">
+            <a:normAutofit/>
+          </a:bodyPr>
+          <a:lstStyle/>
+          <a:p>
+            <a:pPr>
+              <a:spcAft>
+                <a:spcPts val="600"/>
+              </a:spcAft>
+              <a:defRPr/>
+            </a:pPr>
+            <a:r>
+              <a:rPr lang="de-DE" dirty="0"/>
+              <a:t>DI(FH) Falkensteiner Markus</a:t>
+            </a:r>
+            <a:endParaRPr lang="de-DE"/>
+          </a:p>
+        </p:txBody>
+      </p:sp>
+      <p:sp>
+        <p:nvSpPr>
+          <p:cNvPr id="9" name="Slide Number Placeholder 8">
+            <a:extLst>
+              <a:ext uri="{FF2B5EF4-FFF2-40B4-BE49-F238E27FC236}">
+                <a16:creationId xmlns:a16="http://schemas.microsoft.com/office/drawing/2014/main" id="{B1AE6E00-2259-33A1-9B5C-2D9F4E794E1C}"/>
+              </a:ext>
+            </a:extLst>
+          </p:cNvPr>
+          <p:cNvSpPr>
+            <a:spLocks noGrp="1"/>
+          </p:cNvSpPr>
+          <p:nvPr>
+            <p:ph type="sldNum" sz="quarter" idx="12"/>
+          </p:nvPr>
+        </p:nvSpPr>
+        <p:spPr>
+          <a:xfrm>
+            <a:off x="6457950" y="6356351"/>
+            <a:ext cx="2057400" cy="365125"/>
+          </a:xfrm>
+        </p:spPr>
+        <p:txBody>
+          <a:bodyPr anchor="ctr">
+            <a:normAutofit/>
+          </a:bodyPr>
+          <a:lstStyle/>
+          <a:p>
+            <a:pPr>
+              <a:spcAft>
+                <a:spcPts val="600"/>
+              </a:spcAft>
+              <a:defRPr/>
+            </a:pPr>
+            <a:fld id="{AE4538FE-AEB4-413B-B741-EC1BAEEF6B8F}" type="slidenum">
+              <a:rPr lang="de-AT" smtClean="0"/>
+              <a:pPr>
+                <a:spcAft>
+                  <a:spcPts val="600"/>
+                </a:spcAft>
+                <a:defRPr/>
+              </a:pPr>
+              <a:t>15</a:t>
+            </a:fld>
+            <a:endParaRPr lang="de-AT"/>
+          </a:p>
+        </p:txBody>
+      </p:sp>
+      <p:sp>
+        <p:nvSpPr>
+          <p:cNvPr id="20" name="Textfeld 19">
+            <a:extLst>
+              <a:ext uri="{FF2B5EF4-FFF2-40B4-BE49-F238E27FC236}">
+                <a16:creationId xmlns:a16="http://schemas.microsoft.com/office/drawing/2014/main" id="{81CDD34E-9FB6-4FC1-0E88-4A31CC7375DC}"/>
+              </a:ext>
+            </a:extLst>
+          </p:cNvPr>
+          <p:cNvSpPr txBox="1"/>
+          <p:nvPr/>
+        </p:nvSpPr>
+        <p:spPr>
+          <a:xfrm>
+            <a:off x="1700981" y="1827408"/>
+            <a:ext cx="5486400" cy="446276"/>
+          </a:xfrm>
+          <a:prstGeom prst="rect">
+            <a:avLst/>
+          </a:prstGeom>
+          <a:noFill/>
+        </p:spPr>
+        <p:txBody>
+          <a:bodyPr wrap="square" rtlCol="0">
+            <a:spAutoFit/>
+          </a:bodyPr>
+          <a:lstStyle/>
+          <a:p>
+            <a:pPr algn="ctr"/>
+            <a:r>
+              <a:rPr lang="de-DE" sz="2300" b="1" dirty="0"/>
+              <a:t>Drei </a:t>
+            </a:r>
+            <a:r>
+              <a:rPr lang="de-DE" sz="2300" b="1" dirty="0" err="1"/>
+              <a:t>Betirebsmodi</a:t>
+            </a:r>
+            <a:endParaRPr lang="de-DE" sz="2300" b="1" dirty="0"/>
+          </a:p>
+        </p:txBody>
+      </p:sp>
+      <p:pic>
+        <p:nvPicPr>
+          <p:cNvPr id="4" name="Grafik 3">
+            <a:extLst>
+              <a:ext uri="{FF2B5EF4-FFF2-40B4-BE49-F238E27FC236}">
+                <a16:creationId xmlns:a16="http://schemas.microsoft.com/office/drawing/2014/main" id="{9E2BA7EA-D6BB-4D26-0753-ED64AE1629D0}"/>
+              </a:ext>
+            </a:extLst>
+          </p:cNvPr>
+          <p:cNvPicPr>
+            <a:picLocks noChangeAspect="1"/>
+          </p:cNvPicPr>
+          <p:nvPr/>
+        </p:nvPicPr>
+        <p:blipFill>
+          <a:blip r:embed="rId3"/>
+          <a:stretch>
+            <a:fillRect/>
+          </a:stretch>
+        </p:blipFill>
+        <p:spPr>
+          <a:xfrm>
+            <a:off x="0" y="2462146"/>
+            <a:ext cx="9144000" cy="3705742"/>
+          </a:xfrm>
+          <a:prstGeom prst="rect">
+            <a:avLst/>
+          </a:prstGeom>
+        </p:spPr>
+      </p:pic>
+    </p:spTree>
+    <p:extLst>
+      <p:ext uri="{BB962C8B-B14F-4D97-AF65-F5344CB8AC3E}">
+        <p14:creationId xmlns:p14="http://schemas.microsoft.com/office/powerpoint/2010/main" val="3315994116"/>
+      </p:ext>
+    </p:extLst>
+  </p:cSld>
+  <p:clrMapOvr>
+    <a:masterClrMapping/>
+  </p:clrMapOvr>
   <mc:AlternateContent xmlns:mc="http://schemas.openxmlformats.org/markup-compatibility/2006">
     <mc:Choice xmlns:p14="http://schemas.microsoft.com/office/powerpoint/2010/main" Requires="p14">
       <p:transition spd="med" p14:dur="700">
@@ -7488,7 +8463,724 @@
 </p:sld>
 </file>
 
-<file path=ppt/slides/slide14.xml><?xml version="1.0" encoding="utf-8"?>
+<file path=ppt/slides/slide16.xml><?xml version="1.0" encoding="utf-8"?>
+<p:sld xmlns:a="http://schemas.openxmlformats.org/drawingml/2006/main" xmlns:r="http://schemas.openxmlformats.org/officeDocument/2006/relationships" xmlns:p="http://schemas.openxmlformats.org/presentationml/2006/main">
+  <p:cSld>
+    <p:spTree>
+      <p:nvGrpSpPr>
+        <p:cNvPr id="1" name="">
+          <a:extLst>
+            <a:ext uri="{FF2B5EF4-FFF2-40B4-BE49-F238E27FC236}">
+              <a16:creationId xmlns:a16="http://schemas.microsoft.com/office/drawing/2014/main" id="{7D950047-9AA1-B015-1876-6A051A3DA797}"/>
+            </a:ext>
+          </a:extLst>
+        </p:cNvPr>
+        <p:cNvGrpSpPr/>
+        <p:nvPr/>
+      </p:nvGrpSpPr>
+      <p:grpSpPr>
+        <a:xfrm>
+          <a:off x="0" y="0"/>
+          <a:ext cx="0" cy="0"/>
+          <a:chOff x="0" y="0"/>
+          <a:chExt cx="0" cy="0"/>
+        </a:xfrm>
+      </p:grpSpPr>
+      <p:sp>
+        <p:nvSpPr>
+          <p:cNvPr id="2" name="Title 1">
+            <a:extLst>
+              <a:ext uri="{FF2B5EF4-FFF2-40B4-BE49-F238E27FC236}">
+                <a16:creationId xmlns:a16="http://schemas.microsoft.com/office/drawing/2014/main" id="{63179D91-8BDA-B0DC-D4BB-CDBD26F337F0}"/>
+              </a:ext>
+            </a:extLst>
+          </p:cNvPr>
+          <p:cNvSpPr>
+            <a:spLocks noGrp="1"/>
+          </p:cNvSpPr>
+          <p:nvPr>
+            <p:ph type="title"/>
+          </p:nvPr>
+        </p:nvSpPr>
+        <p:spPr>
+          <a:xfrm>
+            <a:off x="1907704" y="365127"/>
+            <a:ext cx="6607646" cy="759618"/>
+          </a:xfrm>
+        </p:spPr>
+        <p:txBody>
+          <a:bodyPr anchor="ctr">
+            <a:normAutofit/>
+          </a:bodyPr>
+          <a:lstStyle/>
+          <a:p>
+            <a:r>
+              <a:rPr lang="de-DE" altLang="en-US"/>
+              <a:t>Wichtige Code-Abschnitte</a:t>
+            </a:r>
+          </a:p>
+        </p:txBody>
+      </p:sp>
+      <p:sp>
+        <p:nvSpPr>
+          <p:cNvPr id="8" name="Footer Placeholder 7">
+            <a:extLst>
+              <a:ext uri="{FF2B5EF4-FFF2-40B4-BE49-F238E27FC236}">
+                <a16:creationId xmlns:a16="http://schemas.microsoft.com/office/drawing/2014/main" id="{EC3137E2-34A4-F3F7-ADFB-99473A8B953E}"/>
+              </a:ext>
+            </a:extLst>
+          </p:cNvPr>
+          <p:cNvSpPr>
+            <a:spLocks noGrp="1"/>
+          </p:cNvSpPr>
+          <p:nvPr>
+            <p:ph type="ftr" sz="quarter" idx="11"/>
+          </p:nvPr>
+        </p:nvSpPr>
+        <p:spPr>
+          <a:xfrm>
+            <a:off x="3028950" y="6356351"/>
+            <a:ext cx="3086100" cy="365125"/>
+          </a:xfrm>
+        </p:spPr>
+        <p:txBody>
+          <a:bodyPr anchor="ctr">
+            <a:normAutofit/>
+          </a:bodyPr>
+          <a:lstStyle/>
+          <a:p>
+            <a:pPr>
+              <a:spcAft>
+                <a:spcPts val="600"/>
+              </a:spcAft>
+              <a:defRPr/>
+            </a:pPr>
+            <a:r>
+              <a:rPr lang="de-DE" dirty="0"/>
+              <a:t>DI(FH) Falkensteiner Markus</a:t>
+            </a:r>
+            <a:endParaRPr lang="de-DE"/>
+          </a:p>
+        </p:txBody>
+      </p:sp>
+      <p:sp>
+        <p:nvSpPr>
+          <p:cNvPr id="9" name="Slide Number Placeholder 8">
+            <a:extLst>
+              <a:ext uri="{FF2B5EF4-FFF2-40B4-BE49-F238E27FC236}">
+                <a16:creationId xmlns:a16="http://schemas.microsoft.com/office/drawing/2014/main" id="{E6356C2D-0C61-A697-E59D-7FA588BBFC99}"/>
+              </a:ext>
+            </a:extLst>
+          </p:cNvPr>
+          <p:cNvSpPr>
+            <a:spLocks noGrp="1"/>
+          </p:cNvSpPr>
+          <p:nvPr>
+            <p:ph type="sldNum" sz="quarter" idx="12"/>
+          </p:nvPr>
+        </p:nvSpPr>
+        <p:spPr>
+          <a:xfrm>
+            <a:off x="6457950" y="6356351"/>
+            <a:ext cx="2057400" cy="365125"/>
+          </a:xfrm>
+        </p:spPr>
+        <p:txBody>
+          <a:bodyPr anchor="ctr">
+            <a:normAutofit/>
+          </a:bodyPr>
+          <a:lstStyle/>
+          <a:p>
+            <a:pPr>
+              <a:spcAft>
+                <a:spcPts val="600"/>
+              </a:spcAft>
+              <a:defRPr/>
+            </a:pPr>
+            <a:fld id="{AE4538FE-AEB4-413B-B741-EC1BAEEF6B8F}" type="slidenum">
+              <a:rPr lang="de-AT" smtClean="0"/>
+              <a:pPr>
+                <a:spcAft>
+                  <a:spcPts val="600"/>
+                </a:spcAft>
+                <a:defRPr/>
+              </a:pPr>
+              <a:t>16</a:t>
+            </a:fld>
+            <a:endParaRPr lang="de-AT"/>
+          </a:p>
+        </p:txBody>
+      </p:sp>
+      <p:sp>
+        <p:nvSpPr>
+          <p:cNvPr id="20" name="Textfeld 19">
+            <a:extLst>
+              <a:ext uri="{FF2B5EF4-FFF2-40B4-BE49-F238E27FC236}">
+                <a16:creationId xmlns:a16="http://schemas.microsoft.com/office/drawing/2014/main" id="{E3F290FA-3FDE-A943-3703-9329DA0F62D1}"/>
+              </a:ext>
+            </a:extLst>
+          </p:cNvPr>
+          <p:cNvSpPr txBox="1"/>
+          <p:nvPr/>
+        </p:nvSpPr>
+        <p:spPr>
+          <a:xfrm>
+            <a:off x="1681316" y="1661927"/>
+            <a:ext cx="5486400" cy="800219"/>
+          </a:xfrm>
+          <a:prstGeom prst="rect">
+            <a:avLst/>
+          </a:prstGeom>
+          <a:noFill/>
+        </p:spPr>
+        <p:txBody>
+          <a:bodyPr wrap="square" rtlCol="0">
+            <a:spAutoFit/>
+          </a:bodyPr>
+          <a:lstStyle/>
+          <a:p>
+            <a:pPr algn="ctr"/>
+            <a:r>
+              <a:rPr lang="de-DE" sz="2300" b="1" dirty="0"/>
+              <a:t>Entgegennahme der Befehle im Controller Modus</a:t>
+            </a:r>
+          </a:p>
+        </p:txBody>
+      </p:sp>
+      <p:pic>
+        <p:nvPicPr>
+          <p:cNvPr id="5" name="Grafik 4">
+            <a:extLst>
+              <a:ext uri="{FF2B5EF4-FFF2-40B4-BE49-F238E27FC236}">
+                <a16:creationId xmlns:a16="http://schemas.microsoft.com/office/drawing/2014/main" id="{8B4F23E7-8BCD-B661-5808-A40EB4073496}"/>
+              </a:ext>
+            </a:extLst>
+          </p:cNvPr>
+          <p:cNvPicPr>
+            <a:picLocks noChangeAspect="1"/>
+          </p:cNvPicPr>
+          <p:nvPr/>
+        </p:nvPicPr>
+        <p:blipFill>
+          <a:blip r:embed="rId3"/>
+          <a:stretch>
+            <a:fillRect/>
+          </a:stretch>
+        </p:blipFill>
+        <p:spPr>
+          <a:xfrm>
+            <a:off x="0" y="2772698"/>
+            <a:ext cx="9144000" cy="2931721"/>
+          </a:xfrm>
+          <a:prstGeom prst="rect">
+            <a:avLst/>
+          </a:prstGeom>
+        </p:spPr>
+      </p:pic>
+    </p:spTree>
+    <p:extLst>
+      <p:ext uri="{BB962C8B-B14F-4D97-AF65-F5344CB8AC3E}">
+        <p14:creationId xmlns:p14="http://schemas.microsoft.com/office/powerpoint/2010/main" val="359663592"/>
+      </p:ext>
+    </p:extLst>
+  </p:cSld>
+  <p:clrMapOvr>
+    <a:masterClrMapping/>
+  </p:clrMapOvr>
+  <mc:AlternateContent xmlns:mc="http://schemas.openxmlformats.org/markup-compatibility/2006">
+    <mc:Choice xmlns:p14="http://schemas.microsoft.com/office/powerpoint/2010/main" Requires="p14">
+      <p:transition spd="med" p14:dur="700">
+        <p:fade/>
+      </p:transition>
+    </mc:Choice>
+    <mc:Fallback>
+      <p:transition spd="med">
+        <p:fade/>
+      </p:transition>
+    </mc:Fallback>
+  </mc:AlternateContent>
+</p:sld>
+</file>
+
+<file path=ppt/slides/slide17.xml><?xml version="1.0" encoding="utf-8"?>
+<p:sld xmlns:a="http://schemas.openxmlformats.org/drawingml/2006/main" xmlns:r="http://schemas.openxmlformats.org/officeDocument/2006/relationships" xmlns:p="http://schemas.openxmlformats.org/presentationml/2006/main">
+  <p:cSld>
+    <p:spTree>
+      <p:nvGrpSpPr>
+        <p:cNvPr id="1" name="">
+          <a:extLst>
+            <a:ext uri="{FF2B5EF4-FFF2-40B4-BE49-F238E27FC236}">
+              <a16:creationId xmlns:a16="http://schemas.microsoft.com/office/drawing/2014/main" id="{B060D187-0F8D-F933-2505-452ED1078F6C}"/>
+            </a:ext>
+          </a:extLst>
+        </p:cNvPr>
+        <p:cNvGrpSpPr/>
+        <p:nvPr/>
+      </p:nvGrpSpPr>
+      <p:grpSpPr>
+        <a:xfrm>
+          <a:off x="0" y="0"/>
+          <a:ext cx="0" cy="0"/>
+          <a:chOff x="0" y="0"/>
+          <a:chExt cx="0" cy="0"/>
+        </a:xfrm>
+      </p:grpSpPr>
+      <p:sp>
+        <p:nvSpPr>
+          <p:cNvPr id="2" name="Title 1">
+            <a:extLst>
+              <a:ext uri="{FF2B5EF4-FFF2-40B4-BE49-F238E27FC236}">
+                <a16:creationId xmlns:a16="http://schemas.microsoft.com/office/drawing/2014/main" id="{8C0622B3-2EDC-4EEE-6856-E922158B9BEC}"/>
+              </a:ext>
+            </a:extLst>
+          </p:cNvPr>
+          <p:cNvSpPr>
+            <a:spLocks noGrp="1"/>
+          </p:cNvSpPr>
+          <p:nvPr>
+            <p:ph type="title"/>
+          </p:nvPr>
+        </p:nvSpPr>
+        <p:spPr>
+          <a:xfrm>
+            <a:off x="1907704" y="365127"/>
+            <a:ext cx="6607646" cy="759618"/>
+          </a:xfrm>
+        </p:spPr>
+        <p:txBody>
+          <a:bodyPr anchor="ctr">
+            <a:normAutofit/>
+          </a:bodyPr>
+          <a:lstStyle/>
+          <a:p>
+            <a:r>
+              <a:rPr lang="de-DE" altLang="en-US"/>
+              <a:t>Wichtige Code-Abschnitte</a:t>
+            </a:r>
+          </a:p>
+        </p:txBody>
+      </p:sp>
+      <p:sp>
+        <p:nvSpPr>
+          <p:cNvPr id="8" name="Footer Placeholder 7">
+            <a:extLst>
+              <a:ext uri="{FF2B5EF4-FFF2-40B4-BE49-F238E27FC236}">
+                <a16:creationId xmlns:a16="http://schemas.microsoft.com/office/drawing/2014/main" id="{ECE079C2-3B92-A665-3CE3-3632B4C9204F}"/>
+              </a:ext>
+            </a:extLst>
+          </p:cNvPr>
+          <p:cNvSpPr>
+            <a:spLocks noGrp="1"/>
+          </p:cNvSpPr>
+          <p:nvPr>
+            <p:ph type="ftr" sz="quarter" idx="11"/>
+          </p:nvPr>
+        </p:nvSpPr>
+        <p:spPr>
+          <a:xfrm>
+            <a:off x="3028950" y="6356351"/>
+            <a:ext cx="3086100" cy="365125"/>
+          </a:xfrm>
+        </p:spPr>
+        <p:txBody>
+          <a:bodyPr anchor="ctr">
+            <a:normAutofit/>
+          </a:bodyPr>
+          <a:lstStyle/>
+          <a:p>
+            <a:pPr>
+              <a:spcAft>
+                <a:spcPts val="600"/>
+              </a:spcAft>
+              <a:defRPr/>
+            </a:pPr>
+            <a:r>
+              <a:rPr lang="de-DE" dirty="0"/>
+              <a:t>DI(FH) Falkensteiner Markus</a:t>
+            </a:r>
+            <a:endParaRPr lang="de-DE"/>
+          </a:p>
+        </p:txBody>
+      </p:sp>
+      <p:sp>
+        <p:nvSpPr>
+          <p:cNvPr id="9" name="Slide Number Placeholder 8">
+            <a:extLst>
+              <a:ext uri="{FF2B5EF4-FFF2-40B4-BE49-F238E27FC236}">
+                <a16:creationId xmlns:a16="http://schemas.microsoft.com/office/drawing/2014/main" id="{9827DA1E-2300-BDC6-3DC7-3C746E062B90}"/>
+              </a:ext>
+            </a:extLst>
+          </p:cNvPr>
+          <p:cNvSpPr>
+            <a:spLocks noGrp="1"/>
+          </p:cNvSpPr>
+          <p:nvPr>
+            <p:ph type="sldNum" sz="quarter" idx="12"/>
+          </p:nvPr>
+        </p:nvSpPr>
+        <p:spPr>
+          <a:xfrm>
+            <a:off x="6457950" y="6356351"/>
+            <a:ext cx="2057400" cy="365125"/>
+          </a:xfrm>
+        </p:spPr>
+        <p:txBody>
+          <a:bodyPr anchor="ctr">
+            <a:normAutofit/>
+          </a:bodyPr>
+          <a:lstStyle/>
+          <a:p>
+            <a:pPr>
+              <a:spcAft>
+                <a:spcPts val="600"/>
+              </a:spcAft>
+              <a:defRPr/>
+            </a:pPr>
+            <a:fld id="{AE4538FE-AEB4-413B-B741-EC1BAEEF6B8F}" type="slidenum">
+              <a:rPr lang="de-AT" smtClean="0"/>
+              <a:pPr>
+                <a:spcAft>
+                  <a:spcPts val="600"/>
+                </a:spcAft>
+                <a:defRPr/>
+              </a:pPr>
+              <a:t>17</a:t>
+            </a:fld>
+            <a:endParaRPr lang="de-AT"/>
+          </a:p>
+        </p:txBody>
+      </p:sp>
+      <p:sp>
+        <p:nvSpPr>
+          <p:cNvPr id="20" name="Textfeld 19">
+            <a:extLst>
+              <a:ext uri="{FF2B5EF4-FFF2-40B4-BE49-F238E27FC236}">
+                <a16:creationId xmlns:a16="http://schemas.microsoft.com/office/drawing/2014/main" id="{E6910B90-64B7-3210-3841-66CED5DC9777}"/>
+              </a:ext>
+            </a:extLst>
+          </p:cNvPr>
+          <p:cNvSpPr txBox="1"/>
+          <p:nvPr/>
+        </p:nvSpPr>
+        <p:spPr>
+          <a:xfrm>
+            <a:off x="1681316" y="1661927"/>
+            <a:ext cx="5486400" cy="800219"/>
+          </a:xfrm>
+          <a:prstGeom prst="rect">
+            <a:avLst/>
+          </a:prstGeom>
+          <a:noFill/>
+        </p:spPr>
+        <p:txBody>
+          <a:bodyPr wrap="square" rtlCol="0">
+            <a:spAutoFit/>
+          </a:bodyPr>
+          <a:lstStyle/>
+          <a:p>
+            <a:pPr algn="ctr"/>
+            <a:r>
+              <a:rPr lang="de-DE" sz="2300" b="1" dirty="0"/>
+              <a:t>Daten an das Backend senden (z.B. Strecke im Discovery Modus)</a:t>
+            </a:r>
+          </a:p>
+        </p:txBody>
+      </p:sp>
+      <p:pic>
+        <p:nvPicPr>
+          <p:cNvPr id="4" name="Grafik 3">
+            <a:extLst>
+              <a:ext uri="{FF2B5EF4-FFF2-40B4-BE49-F238E27FC236}">
+                <a16:creationId xmlns:a16="http://schemas.microsoft.com/office/drawing/2014/main" id="{26479A12-6C8A-CDC3-4A18-04EC014C43F5}"/>
+              </a:ext>
+            </a:extLst>
+          </p:cNvPr>
+          <p:cNvPicPr>
+            <a:picLocks noChangeAspect="1"/>
+          </p:cNvPicPr>
+          <p:nvPr/>
+        </p:nvPicPr>
+        <p:blipFill>
+          <a:blip r:embed="rId3"/>
+          <a:stretch>
+            <a:fillRect/>
+          </a:stretch>
+        </p:blipFill>
+        <p:spPr>
+          <a:xfrm>
+            <a:off x="-1" y="2899092"/>
+            <a:ext cx="9645445" cy="2473802"/>
+          </a:xfrm>
+          <a:prstGeom prst="rect">
+            <a:avLst/>
+          </a:prstGeom>
+        </p:spPr>
+      </p:pic>
+    </p:spTree>
+    <p:extLst>
+      <p:ext uri="{BB962C8B-B14F-4D97-AF65-F5344CB8AC3E}">
+        <p14:creationId xmlns:p14="http://schemas.microsoft.com/office/powerpoint/2010/main" val="698079570"/>
+      </p:ext>
+    </p:extLst>
+  </p:cSld>
+  <p:clrMapOvr>
+    <a:masterClrMapping/>
+  </p:clrMapOvr>
+  <mc:AlternateContent xmlns:mc="http://schemas.openxmlformats.org/markup-compatibility/2006">
+    <mc:Choice xmlns:p14="http://schemas.microsoft.com/office/powerpoint/2010/main" Requires="p14">
+      <p:transition spd="med" p14:dur="700">
+        <p:fade/>
+      </p:transition>
+    </mc:Choice>
+    <mc:Fallback>
+      <p:transition spd="med">
+        <p:fade/>
+      </p:transition>
+    </mc:Fallback>
+  </mc:AlternateContent>
+</p:sld>
+</file>
+
+<file path=ppt/slides/slide18.xml><?xml version="1.0" encoding="utf-8"?>
+<p:sld xmlns:a="http://schemas.openxmlformats.org/drawingml/2006/main" xmlns:r="http://schemas.openxmlformats.org/officeDocument/2006/relationships" xmlns:p="http://schemas.openxmlformats.org/presentationml/2006/main">
+  <p:cSld>
+    <p:spTree>
+      <p:nvGrpSpPr>
+        <p:cNvPr id="1" name="">
+          <a:extLst>
+            <a:ext uri="{FF2B5EF4-FFF2-40B4-BE49-F238E27FC236}">
+              <a16:creationId xmlns:a16="http://schemas.microsoft.com/office/drawing/2014/main" id="{C30EC4AF-87D1-CE42-09B5-9EC797B957D1}"/>
+            </a:ext>
+          </a:extLst>
+        </p:cNvPr>
+        <p:cNvGrpSpPr/>
+        <p:nvPr/>
+      </p:nvGrpSpPr>
+      <p:grpSpPr>
+        <a:xfrm>
+          <a:off x="0" y="0"/>
+          <a:ext cx="0" cy="0"/>
+          <a:chOff x="0" y="0"/>
+          <a:chExt cx="0" cy="0"/>
+        </a:xfrm>
+      </p:grpSpPr>
+      <p:sp>
+        <p:nvSpPr>
+          <p:cNvPr id="2" name="Title 1">
+            <a:extLst>
+              <a:ext uri="{FF2B5EF4-FFF2-40B4-BE49-F238E27FC236}">
+                <a16:creationId xmlns:a16="http://schemas.microsoft.com/office/drawing/2014/main" id="{E5D9DC35-5A0F-E698-3A93-DD48A888452C}"/>
+              </a:ext>
+            </a:extLst>
+          </p:cNvPr>
+          <p:cNvSpPr>
+            <a:spLocks noGrp="1"/>
+          </p:cNvSpPr>
+          <p:nvPr>
+            <p:ph type="title"/>
+          </p:nvPr>
+        </p:nvSpPr>
+        <p:spPr>
+          <a:xfrm>
+            <a:off x="1907704" y="365127"/>
+            <a:ext cx="6607646" cy="759618"/>
+          </a:xfrm>
+        </p:spPr>
+        <p:txBody>
+          <a:bodyPr anchor="ctr">
+            <a:normAutofit/>
+          </a:bodyPr>
+          <a:lstStyle/>
+          <a:p>
+            <a:r>
+              <a:rPr lang="de-DE" altLang="en-US"/>
+              <a:t>Wichtige Code-Abschnitte</a:t>
+            </a:r>
+          </a:p>
+        </p:txBody>
+      </p:sp>
+      <p:sp>
+        <p:nvSpPr>
+          <p:cNvPr id="8" name="Footer Placeholder 7">
+            <a:extLst>
+              <a:ext uri="{FF2B5EF4-FFF2-40B4-BE49-F238E27FC236}">
+                <a16:creationId xmlns:a16="http://schemas.microsoft.com/office/drawing/2014/main" id="{2AA4766C-116B-0F05-584C-3E3644D430B6}"/>
+              </a:ext>
+            </a:extLst>
+          </p:cNvPr>
+          <p:cNvSpPr>
+            <a:spLocks noGrp="1"/>
+          </p:cNvSpPr>
+          <p:nvPr>
+            <p:ph type="ftr" sz="quarter" idx="11"/>
+          </p:nvPr>
+        </p:nvSpPr>
+        <p:spPr>
+          <a:xfrm>
+            <a:off x="3028950" y="6356351"/>
+            <a:ext cx="3086100" cy="365125"/>
+          </a:xfrm>
+        </p:spPr>
+        <p:txBody>
+          <a:bodyPr anchor="ctr">
+            <a:normAutofit/>
+          </a:bodyPr>
+          <a:lstStyle/>
+          <a:p>
+            <a:pPr>
+              <a:spcAft>
+                <a:spcPts val="600"/>
+              </a:spcAft>
+              <a:defRPr/>
+            </a:pPr>
+            <a:r>
+              <a:rPr lang="de-DE" dirty="0"/>
+              <a:t>DI(FH) Falkensteiner Markus</a:t>
+            </a:r>
+            <a:endParaRPr lang="de-DE"/>
+          </a:p>
+        </p:txBody>
+      </p:sp>
+      <p:sp>
+        <p:nvSpPr>
+          <p:cNvPr id="9" name="Slide Number Placeholder 8">
+            <a:extLst>
+              <a:ext uri="{FF2B5EF4-FFF2-40B4-BE49-F238E27FC236}">
+                <a16:creationId xmlns:a16="http://schemas.microsoft.com/office/drawing/2014/main" id="{AE59ABF3-CCF5-B6C9-5786-EED3AED432D8}"/>
+              </a:ext>
+            </a:extLst>
+          </p:cNvPr>
+          <p:cNvSpPr>
+            <a:spLocks noGrp="1"/>
+          </p:cNvSpPr>
+          <p:nvPr>
+            <p:ph type="sldNum" sz="quarter" idx="12"/>
+          </p:nvPr>
+        </p:nvSpPr>
+        <p:spPr>
+          <a:xfrm>
+            <a:off x="6457950" y="6356351"/>
+            <a:ext cx="2057400" cy="365125"/>
+          </a:xfrm>
+        </p:spPr>
+        <p:txBody>
+          <a:bodyPr anchor="ctr">
+            <a:normAutofit/>
+          </a:bodyPr>
+          <a:lstStyle/>
+          <a:p>
+            <a:pPr>
+              <a:spcAft>
+                <a:spcPts val="600"/>
+              </a:spcAft>
+              <a:defRPr/>
+            </a:pPr>
+            <a:fld id="{AE4538FE-AEB4-413B-B741-EC1BAEEF6B8F}" type="slidenum">
+              <a:rPr lang="de-AT" smtClean="0"/>
+              <a:pPr>
+                <a:spcAft>
+                  <a:spcPts val="600"/>
+                </a:spcAft>
+                <a:defRPr/>
+              </a:pPr>
+              <a:t>18</a:t>
+            </a:fld>
+            <a:endParaRPr lang="de-AT"/>
+          </a:p>
+        </p:txBody>
+      </p:sp>
+      <p:sp>
+        <p:nvSpPr>
+          <p:cNvPr id="20" name="Textfeld 19">
+            <a:extLst>
+              <a:ext uri="{FF2B5EF4-FFF2-40B4-BE49-F238E27FC236}">
+                <a16:creationId xmlns:a16="http://schemas.microsoft.com/office/drawing/2014/main" id="{22090431-30F3-2497-8E56-E8BEDD306415}"/>
+              </a:ext>
+            </a:extLst>
+          </p:cNvPr>
+          <p:cNvSpPr txBox="1"/>
+          <p:nvPr/>
+        </p:nvSpPr>
+        <p:spPr>
+          <a:xfrm>
+            <a:off x="1681316" y="1661927"/>
+            <a:ext cx="5702710" cy="800219"/>
+          </a:xfrm>
+          <a:prstGeom prst="rect">
+            <a:avLst/>
+          </a:prstGeom>
+          <a:noFill/>
+        </p:spPr>
+        <p:txBody>
+          <a:bodyPr wrap="square" rtlCol="0">
+            <a:spAutoFit/>
+          </a:bodyPr>
+          <a:lstStyle/>
+          <a:p>
+            <a:pPr algn="ctr"/>
+            <a:r>
+              <a:rPr lang="de-DE" sz="2300" b="1" dirty="0"/>
+              <a:t>Variablen bei einem Fehler oder einem Verbindungsabbruch zurücksetzen </a:t>
+            </a:r>
+          </a:p>
+        </p:txBody>
+      </p:sp>
+      <p:pic>
+        <p:nvPicPr>
+          <p:cNvPr id="4" name="Grafik 3">
+            <a:extLst>
+              <a:ext uri="{FF2B5EF4-FFF2-40B4-BE49-F238E27FC236}">
+                <a16:creationId xmlns:a16="http://schemas.microsoft.com/office/drawing/2014/main" id="{52B62E32-9325-4CFE-DFE5-60B6987933A7}"/>
+              </a:ext>
+            </a:extLst>
+          </p:cNvPr>
+          <p:cNvPicPr>
+            <a:picLocks noChangeAspect="1"/>
+          </p:cNvPicPr>
+          <p:nvPr/>
+        </p:nvPicPr>
+        <p:blipFill>
+          <a:blip r:embed="rId3"/>
+          <a:stretch>
+            <a:fillRect/>
+          </a:stretch>
+        </p:blipFill>
+        <p:spPr>
+          <a:xfrm>
+            <a:off x="0" y="2462146"/>
+            <a:ext cx="10057938" cy="3402500"/>
+          </a:xfrm>
+          <a:prstGeom prst="rect">
+            <a:avLst/>
+          </a:prstGeom>
+        </p:spPr>
+      </p:pic>
+    </p:spTree>
+    <p:extLst>
+      <p:ext uri="{BB962C8B-B14F-4D97-AF65-F5344CB8AC3E}">
+        <p14:creationId xmlns:p14="http://schemas.microsoft.com/office/powerpoint/2010/main" val="1646292508"/>
+      </p:ext>
+    </p:extLst>
+  </p:cSld>
+  <p:clrMapOvr>
+    <a:masterClrMapping/>
+  </p:clrMapOvr>
+  <mc:AlternateContent xmlns:mc="http://schemas.openxmlformats.org/markup-compatibility/2006">
+    <mc:Choice xmlns:p14="http://schemas.microsoft.com/office/powerpoint/2010/main" Requires="p14">
+      <p:transition spd="med" p14:dur="700">
+        <p:fade/>
+      </p:transition>
+    </mc:Choice>
+    <mc:Fallback>
+      <p:transition spd="med">
+        <p:fade/>
+      </p:transition>
+    </mc:Fallback>
+  </mc:AlternateContent>
+</p:sld>
+</file>
+
+<file path=ppt/slides/slide19.xml><?xml version="1.0" encoding="utf-8"?>
 <p:sld xmlns:a="http://schemas.openxmlformats.org/drawingml/2006/main" xmlns:r="http://schemas.openxmlformats.org/officeDocument/2006/relationships" xmlns:p="http://schemas.openxmlformats.org/presentationml/2006/main">
   <p:cSld>
     <p:spTree>
@@ -7590,7 +9282,7 @@
             </a:pPr>
             <a:fld id="{AE4538FE-AEB4-413B-B741-EC1BAEEF6B8F}" type="slidenum">
               <a:rPr lang="de-AT" smtClean="0"/>
-              <a:t>14</a:t>
+              <a:t>19</a:t>
             </a:fld>
             <a:endParaRPr lang="de-AT"/>
           </a:p>
@@ -8790,13 +10482,13 @@
   <p:clrMapOvr>
     <a:masterClrMapping/>
   </p:clrMapOvr>
-  <mc:AlternateContent xmlns:mc="http://schemas.openxmlformats.org/markup-compatibility/2006">
-    <mc:Choice xmlns:p14="http://schemas.microsoft.com/office/powerpoint/2010/main" Requires="p14">
+  <mc:AlternateContent xmlns:mc="http://schemas.openxmlformats.org/markup-compatibility/2006" xmlns:p14="http://schemas.microsoft.com/office/powerpoint/2010/main">
+    <mc:Choice Requires="p14">
       <p:transition spd="med" p14:dur="700">
         <p:fade/>
       </p:transition>
     </mc:Choice>
-    <mc:Fallback>
+    <mc:Fallback xmlns="">
       <p:transition spd="med">
         <p:fade/>
       </p:transition>
@@ -9996,13 +11688,13 @@
   <p:clrMapOvr>
     <a:masterClrMapping/>
   </p:clrMapOvr>
-  <mc:AlternateContent xmlns:mc="http://schemas.openxmlformats.org/markup-compatibility/2006">
-    <mc:Choice xmlns:p14="http://schemas.microsoft.com/office/powerpoint/2010/main" Requires="p14">
+  <mc:AlternateContent xmlns:mc="http://schemas.openxmlformats.org/markup-compatibility/2006" xmlns:p14="http://schemas.microsoft.com/office/powerpoint/2010/main">
+    <mc:Choice Requires="p14">
       <p:transition spd="med" p14:dur="700">
         <p:fade/>
       </p:transition>
     </mc:Choice>
-    <mc:Fallback>
+    <mc:Fallback xmlns="">
       <p:transition spd="med">
         <p:fade/>
       </p:transition>
@@ -10310,13 +12002,13 @@
   <p:clrMapOvr>
     <a:masterClrMapping/>
   </p:clrMapOvr>
-  <mc:AlternateContent xmlns:mc="http://schemas.openxmlformats.org/markup-compatibility/2006">
-    <mc:Choice xmlns:p14="http://schemas.microsoft.com/office/powerpoint/2010/main" Requires="p14">
+  <mc:AlternateContent xmlns:mc="http://schemas.openxmlformats.org/markup-compatibility/2006" xmlns:p14="http://schemas.microsoft.com/office/powerpoint/2010/main">
+    <mc:Choice Requires="p14">
       <p:transition spd="med" p14:dur="700">
         <p:fade/>
       </p:transition>
     </mc:Choice>
-    <mc:Fallback>
+    <mc:Fallback xmlns="">
       <p:transition spd="med">
         <p:fade/>
       </p:transition>
@@ -10650,13 +12342,13 @@
   <p:clrMapOvr>
     <a:masterClrMapping/>
   </p:clrMapOvr>
-  <mc:AlternateContent xmlns:mc="http://schemas.openxmlformats.org/markup-compatibility/2006">
-    <mc:Choice xmlns:p14="http://schemas.microsoft.com/office/powerpoint/2010/main" Requires="p14">
+  <mc:AlternateContent xmlns:mc="http://schemas.openxmlformats.org/markup-compatibility/2006" xmlns:p14="http://schemas.microsoft.com/office/powerpoint/2010/main">
+    <mc:Choice Requires="p14">
       <p:transition spd="med" p14:dur="700">
         <p:fade/>
       </p:transition>
     </mc:Choice>
-    <mc:Fallback>
+    <mc:Fallback xmlns="">
       <p:transition spd="med">
         <p:fade/>
       </p:transition>

</xml_diff>

<commit_message>
docs: Update project documentation with project summary and attachments
</commit_message>
<xml_diff>
--- a/02_Backend/!_Docs/INF4_SYP_Gruppe1_Abschlusspräsentation.pptx
+++ b/02_Backend/!_Docs/INF4_SYP_Gruppe1_Abschlusspräsentation.pptx
@@ -832,7 +832,7 @@
             </a:pPr>
             <a:fld id="{3953DA5E-C6E2-4FA2-8BC8-7FF9A5EB6734}" type="datetimeFigureOut">
               <a:rPr lang="de-DE"/>
-              <a:t>28.05.2025</a:t>
+              <a:t>04.06.2025</a:t>
             </a:fld>
             <a:endParaRPr lang="de-DE"/>
           </a:p>
@@ -1013,7 +1013,7 @@
           <a:p>
             <a:fld id="{88DE360A-102B-474E-BEC0-79AC7566E430}" type="datetimeFigureOut">
               <a:rPr lang="en-US" smtClean="0"/>
-              <a:t>5/28/2025</a:t>
+              <a:t>6/4/2025</a:t>
             </a:fld>
             <a:endParaRPr lang="en-US"/>
           </a:p>
@@ -8066,13 +8066,13 @@
   <p:clrMapOvr>
     <a:masterClrMapping/>
   </p:clrMapOvr>
-  <mc:AlternateContent xmlns:mc="http://schemas.openxmlformats.org/markup-compatibility/2006">
-    <mc:Choice xmlns:p14="http://schemas.microsoft.com/office/powerpoint/2010/main" Requires="p14">
+  <mc:AlternateContent xmlns:mc="http://schemas.openxmlformats.org/markup-compatibility/2006" xmlns:p14="http://schemas.microsoft.com/office/powerpoint/2010/main">
+    <mc:Choice Requires="p14">
       <p:transition spd="med" p14:dur="700">
         <p:fade/>
       </p:transition>
     </mc:Choice>
-    <mc:Fallback>
+    <mc:Fallback xmlns="">
       <p:transition spd="med">
         <p:fade/>
       </p:transition>
@@ -8242,13 +8242,13 @@
   <p:clrMapOvr>
     <a:masterClrMapping/>
   </p:clrMapOvr>
-  <mc:AlternateContent xmlns:mc="http://schemas.openxmlformats.org/markup-compatibility/2006">
-    <mc:Choice xmlns:p14="http://schemas.microsoft.com/office/powerpoint/2010/main" Requires="p14">
+  <mc:AlternateContent xmlns:mc="http://schemas.openxmlformats.org/markup-compatibility/2006" xmlns:p14="http://schemas.microsoft.com/office/powerpoint/2010/main">
+    <mc:Choice Requires="p14">
       <p:transition spd="med" p14:dur="700">
         <p:fade/>
       </p:transition>
     </mc:Choice>
-    <mc:Fallback>
+    <mc:Fallback xmlns="">
       <p:transition spd="med">
         <p:fade/>
       </p:transition>
@@ -8682,12 +8682,8 @@
           <a:p>
             <a:pPr algn="ctr"/>
             <a:r>
-              <a:rPr lang="de-DE" sz="2300" b="1" dirty="0"/>
-              <a:t>Drei </a:t>
-            </a:r>
-            <a:r>
-              <a:rPr lang="de-DE" sz="2300" b="1" dirty="0" err="1"/>
-              <a:t>Betirebsmodi</a:t>
+              <a:rPr lang="de-DE" sz="2300" b="1"/>
+              <a:t>Drei Betriebsmodi</a:t>
             </a:r>
             <a:endParaRPr lang="de-DE" sz="2300" b="1" dirty="0"/>
           </a:p>
@@ -8733,13 +8729,13 @@
   <p:clrMapOvr>
     <a:masterClrMapping/>
   </p:clrMapOvr>
-  <mc:AlternateContent xmlns:mc="http://schemas.openxmlformats.org/markup-compatibility/2006">
-    <mc:Choice xmlns:p14="http://schemas.microsoft.com/office/powerpoint/2010/main" Requires="p14">
+  <mc:AlternateContent xmlns:mc="http://schemas.openxmlformats.org/markup-compatibility/2006" xmlns:p14="http://schemas.microsoft.com/office/powerpoint/2010/main">
+    <mc:Choice Requires="p14">
       <p:transition spd="med" p14:dur="700">
         <p:fade/>
       </p:transition>
     </mc:Choice>
-    <mc:Fallback>
+    <mc:Fallback xmlns="">
       <p:transition spd="med">
         <p:fade/>
       </p:transition>
@@ -8972,13 +8968,13 @@
   <p:clrMapOvr>
     <a:masterClrMapping/>
   </p:clrMapOvr>
-  <mc:AlternateContent xmlns:mc="http://schemas.openxmlformats.org/markup-compatibility/2006">
-    <mc:Choice xmlns:p14="http://schemas.microsoft.com/office/powerpoint/2010/main" Requires="p14">
+  <mc:AlternateContent xmlns:mc="http://schemas.openxmlformats.org/markup-compatibility/2006" xmlns:p14="http://schemas.microsoft.com/office/powerpoint/2010/main">
+    <mc:Choice Requires="p14">
       <p:transition spd="med" p14:dur="700">
         <p:fade/>
       </p:transition>
     </mc:Choice>
-    <mc:Fallback>
+    <mc:Fallback xmlns="">
       <p:transition spd="med">
         <p:fade/>
       </p:transition>
@@ -9211,13 +9207,13 @@
   <p:clrMapOvr>
     <a:masterClrMapping/>
   </p:clrMapOvr>
-  <mc:AlternateContent xmlns:mc="http://schemas.openxmlformats.org/markup-compatibility/2006">
-    <mc:Choice xmlns:p14="http://schemas.microsoft.com/office/powerpoint/2010/main" Requires="p14">
+  <mc:AlternateContent xmlns:mc="http://schemas.openxmlformats.org/markup-compatibility/2006" xmlns:p14="http://schemas.microsoft.com/office/powerpoint/2010/main">
+    <mc:Choice Requires="p14">
       <p:transition spd="med" p14:dur="700">
         <p:fade/>
       </p:transition>
     </mc:Choice>
-    <mc:Fallback>
+    <mc:Fallback xmlns="">
       <p:transition spd="med">
         <p:fade/>
       </p:transition>
@@ -9450,13 +9446,13 @@
   <p:clrMapOvr>
     <a:masterClrMapping/>
   </p:clrMapOvr>
-  <mc:AlternateContent xmlns:mc="http://schemas.openxmlformats.org/markup-compatibility/2006">
-    <mc:Choice xmlns:p14="http://schemas.microsoft.com/office/powerpoint/2010/main" Requires="p14">
+  <mc:AlternateContent xmlns:mc="http://schemas.openxmlformats.org/markup-compatibility/2006" xmlns:p14="http://schemas.microsoft.com/office/powerpoint/2010/main">
+    <mc:Choice Requires="p14">
       <p:transition spd="med" p14:dur="700">
         <p:fade/>
       </p:transition>
     </mc:Choice>
-    <mc:Fallback>
+    <mc:Fallback xmlns="">
       <p:transition spd="med">
         <p:fade/>
       </p:transition>
@@ -13597,18 +13593,18 @@
 </file>
 
 <file path=customXml/item2.xml><?xml version="1.0" encoding="utf-8"?>
-<p:properties xmlns:p="http://schemas.microsoft.com/office/2006/metadata/properties" xmlns:xsi="http://www.w3.org/2001/XMLSchema-instance" xmlns:pc="http://schemas.microsoft.com/office/infopath/2007/PartnerControls">
-  <documentManagement/>
-</p:properties>
-</file>
-
-<file path=customXml/item3.xml><?xml version="1.0" encoding="utf-8"?>
 <?mso-contentType ?>
 <FormTemplates xmlns="http://schemas.microsoft.com/sharepoint/v3/contenttype/forms">
   <Display>DocumentLibraryForm</Display>
   <Edit>DocumentLibraryForm</Edit>
   <New>DocumentLibraryForm</New>
 </FormTemplates>
+</file>
+
+<file path=customXml/item3.xml><?xml version="1.0" encoding="utf-8"?>
+<p:properties xmlns:p="http://schemas.microsoft.com/office/2006/metadata/properties" xmlns:xsi="http://www.w3.org/2001/XMLSchema-instance" xmlns:pc="http://schemas.microsoft.com/office/infopath/2007/PartnerControls">
+  <documentManagement/>
+</p:properties>
 </file>
 
 <file path=customXml/itemProps1.xml><?xml version="1.0" encoding="utf-8"?>
@@ -13630,6 +13626,14 @@
 </file>
 
 <file path=customXml/itemProps2.xml><?xml version="1.0" encoding="utf-8"?>
+<ds:datastoreItem xmlns:ds="http://schemas.openxmlformats.org/officeDocument/2006/customXml" ds:itemID="{1981A0EB-802E-4D0E-9A2A-3AE4F15204D8}">
+  <ds:schemaRefs>
+    <ds:schemaRef ds:uri="http://schemas.microsoft.com/sharepoint/v3/contenttype/forms"/>
+  </ds:schemaRefs>
+</ds:datastoreItem>
+</file>
+
+<file path=customXml/itemProps3.xml><?xml version="1.0" encoding="utf-8"?>
 <ds:datastoreItem xmlns:ds="http://schemas.openxmlformats.org/officeDocument/2006/customXml" ds:itemID="{8354EFAF-31A0-41ED-A74D-DAE704B6C081}">
   <ds:schemaRefs>
     <ds:schemaRef ds:uri="http://schemas.openxmlformats.org/package/2006/metadata/core-properties"/>
@@ -13643,12 +13647,4 @@
     <ds:schemaRef ds:uri="http://purl.org/dc/terms/"/>
   </ds:schemaRefs>
 </ds:datastoreItem>
-</file>
-
-<file path=customXml/itemProps3.xml><?xml version="1.0" encoding="utf-8"?>
-<ds:datastoreItem xmlns:ds="http://schemas.openxmlformats.org/officeDocument/2006/customXml" ds:itemID="{1981A0EB-802E-4D0E-9A2A-3AE4F15204D8}">
-  <ds:schemaRefs>
-    <ds:schemaRef ds:uri="http://schemas.microsoft.com/sharepoint/v3/contenttype/forms"/>
-  </ds:schemaRefs>
-</ds:datastoreItem>
 </file>
</xml_diff>

<commit_message>
docs: Update Abschlusspräsentation presentation file
</commit_message>
<xml_diff>
--- a/02_Backend/!_Docs/INF4_SYP_Gruppe1_Abschlusspräsentation.pptx
+++ b/02_Backend/!_Docs/INF4_SYP_Gruppe1_Abschlusspräsentation.pptx
@@ -6,10 +6,10 @@
     <p:sldMasterId id="2147483665" r:id="rId5"/>
   </p:sldMasterIdLst>
   <p:notesMasterIdLst>
-    <p:notesMasterId r:id="rId26"/>
+    <p:notesMasterId r:id="rId27"/>
   </p:notesMasterIdLst>
   <p:handoutMasterIdLst>
-    <p:handoutMasterId r:id="rId27"/>
+    <p:handoutMasterId r:id="rId28"/>
   </p:handoutMasterIdLst>
   <p:sldIdLst>
     <p:sldId id="361" r:id="rId6"/>
@@ -25,13 +25,14 @@
     <p:sldId id="599" r:id="rId16"/>
     <p:sldId id="600" r:id="rId17"/>
     <p:sldId id="606" r:id="rId18"/>
-    <p:sldId id="607" r:id="rId19"/>
-    <p:sldId id="601" r:id="rId20"/>
-    <p:sldId id="602" r:id="rId21"/>
-    <p:sldId id="603" r:id="rId22"/>
-    <p:sldId id="605" r:id="rId23"/>
-    <p:sldId id="604" r:id="rId24"/>
-    <p:sldId id="587" r:id="rId25"/>
+    <p:sldId id="608" r:id="rId19"/>
+    <p:sldId id="607" r:id="rId20"/>
+    <p:sldId id="601" r:id="rId21"/>
+    <p:sldId id="602" r:id="rId22"/>
+    <p:sldId id="603" r:id="rId23"/>
+    <p:sldId id="605" r:id="rId24"/>
+    <p:sldId id="604" r:id="rId25"/>
+    <p:sldId id="587" r:id="rId26"/>
   </p:sldIdLst>
   <p:sldSz cx="9144000" cy="6858000" type="screen4x3"/>
   <p:notesSz cx="7099300" cy="10234613"/>
@@ -1368,6 +1369,114 @@
         <p:cNvPr id="1" name="">
           <a:extLst>
             <a:ext uri="{FF2B5EF4-FFF2-40B4-BE49-F238E27FC236}">
+              <a16:creationId xmlns:a16="http://schemas.microsoft.com/office/drawing/2014/main" id="{FDD920C2-9EFE-16E4-B5B3-78DE3744DF09}"/>
+            </a:ext>
+          </a:extLst>
+        </p:cNvPr>
+        <p:cNvGrpSpPr/>
+        <p:nvPr/>
+      </p:nvGrpSpPr>
+      <p:grpSpPr>
+        <a:xfrm>
+          <a:off x="0" y="0"/>
+          <a:ext cx="0" cy="0"/>
+          <a:chOff x="0" y="0"/>
+          <a:chExt cx="0" cy="0"/>
+        </a:xfrm>
+      </p:grpSpPr>
+      <p:sp>
+        <p:nvSpPr>
+          <p:cNvPr id="2" name="Folienbildplatzhalter 1">
+            <a:extLst>
+              <a:ext uri="{FF2B5EF4-FFF2-40B4-BE49-F238E27FC236}">
+                <a16:creationId xmlns:a16="http://schemas.microsoft.com/office/drawing/2014/main" id="{4DBA2B19-949B-BBE5-3479-150B50D84724}"/>
+              </a:ext>
+            </a:extLst>
+          </p:cNvPr>
+          <p:cNvSpPr>
+            <a:spLocks noGrp="1" noRot="1" noChangeAspect="1"/>
+          </p:cNvSpPr>
+          <p:nvPr>
+            <p:ph type="sldImg"/>
+          </p:nvPr>
+        </p:nvSpPr>
+        <p:spPr/>
+      </p:sp>
+      <p:sp>
+        <p:nvSpPr>
+          <p:cNvPr id="3" name="Notizenplatzhalter 2">
+            <a:extLst>
+              <a:ext uri="{FF2B5EF4-FFF2-40B4-BE49-F238E27FC236}">
+                <a16:creationId xmlns:a16="http://schemas.microsoft.com/office/drawing/2014/main" id="{BBBA73FC-4085-C0CA-9442-90E88AFFC848}"/>
+              </a:ext>
+            </a:extLst>
+          </p:cNvPr>
+          <p:cNvSpPr>
+            <a:spLocks noGrp="1"/>
+          </p:cNvSpPr>
+          <p:nvPr>
+            <p:ph type="body" idx="1"/>
+          </p:nvPr>
+        </p:nvSpPr>
+        <p:spPr/>
+        <p:txBody>
+          <a:bodyPr/>
+          <a:lstStyle/>
+          <a:p>
+            <a:endParaRPr lang="de-DE"/>
+          </a:p>
+        </p:txBody>
+      </p:sp>
+      <p:sp>
+        <p:nvSpPr>
+          <p:cNvPr id="4" name="Foliennummernplatzhalter 3">
+            <a:extLst>
+              <a:ext uri="{FF2B5EF4-FFF2-40B4-BE49-F238E27FC236}">
+                <a16:creationId xmlns:a16="http://schemas.microsoft.com/office/drawing/2014/main" id="{A5760DF4-CA6A-A330-CE89-546F9E553A65}"/>
+              </a:ext>
+            </a:extLst>
+          </p:cNvPr>
+          <p:cNvSpPr>
+            <a:spLocks noGrp="1"/>
+          </p:cNvSpPr>
+          <p:nvPr>
+            <p:ph type="sldNum" sz="quarter" idx="5"/>
+          </p:nvPr>
+        </p:nvSpPr>
+        <p:spPr/>
+        <p:txBody>
+          <a:bodyPr/>
+          <a:lstStyle/>
+          <a:p>
+            <a:fld id="{18D8EB10-9094-CC46-9BCA-615730AD1A2C}" type="slidenum">
+              <a:rPr lang="en-US" smtClean="0"/>
+              <a:t>15</a:t>
+            </a:fld>
+            <a:endParaRPr lang="en-US"/>
+          </a:p>
+        </p:txBody>
+      </p:sp>
+    </p:spTree>
+    <p:extLst>
+      <p:ext uri="{BB962C8B-B14F-4D97-AF65-F5344CB8AC3E}">
+        <p14:creationId xmlns:p14="http://schemas.microsoft.com/office/powerpoint/2010/main" val="4217853091"/>
+      </p:ext>
+    </p:extLst>
+  </p:cSld>
+  <p:clrMapOvr>
+    <a:masterClrMapping/>
+  </p:clrMapOvr>
+</p:notes>
+</file>
+
+<file path=ppt/notesSlides/notesSlide11.xml><?xml version="1.0" encoding="utf-8"?>
+<p:notes xmlns:a="http://schemas.openxmlformats.org/drawingml/2006/main" xmlns:r="http://schemas.openxmlformats.org/officeDocument/2006/relationships" xmlns:p="http://schemas.openxmlformats.org/presentationml/2006/main">
+  <p:cSld>
+    <p:spTree>
+      <p:nvGrpSpPr>
+        <p:cNvPr id="1" name="">
+          <a:extLst>
+            <a:ext uri="{FF2B5EF4-FFF2-40B4-BE49-F238E27FC236}">
               <a16:creationId xmlns:a16="http://schemas.microsoft.com/office/drawing/2014/main" id="{193D43B8-4591-87AE-E69A-FBDC69D41051}"/>
             </a:ext>
           </a:extLst>
@@ -1449,7 +1558,7 @@
           <a:p>
             <a:fld id="{18D8EB10-9094-CC46-9BCA-615730AD1A2C}" type="slidenum">
               <a:rPr lang="en-US" smtClean="0"/>
-              <a:t>15</a:t>
+              <a:t>16</a:t>
             </a:fld>
             <a:endParaRPr lang="en-US"/>
           </a:p>
@@ -1468,7 +1577,7 @@
 </p:notes>
 </file>
 
-<file path=ppt/notesSlides/notesSlide11.xml><?xml version="1.0" encoding="utf-8"?>
+<file path=ppt/notesSlides/notesSlide12.xml><?xml version="1.0" encoding="utf-8"?>
 <p:notes xmlns:a="http://schemas.openxmlformats.org/drawingml/2006/main" xmlns:r="http://schemas.openxmlformats.org/officeDocument/2006/relationships" xmlns:p="http://schemas.openxmlformats.org/presentationml/2006/main">
   <p:cSld>
     <p:spTree>
@@ -1557,7 +1666,7 @@
           <a:p>
             <a:fld id="{18D8EB10-9094-CC46-9BCA-615730AD1A2C}" type="slidenum">
               <a:rPr lang="en-US" smtClean="0"/>
-              <a:t>16</a:t>
+              <a:t>17</a:t>
             </a:fld>
             <a:endParaRPr lang="en-US"/>
           </a:p>
@@ -1576,7 +1685,7 @@
 </p:notes>
 </file>
 
-<file path=ppt/notesSlides/notesSlide12.xml><?xml version="1.0" encoding="utf-8"?>
+<file path=ppt/notesSlides/notesSlide13.xml><?xml version="1.0" encoding="utf-8"?>
 <p:notes xmlns:a="http://schemas.openxmlformats.org/drawingml/2006/main" xmlns:r="http://schemas.openxmlformats.org/officeDocument/2006/relationships" xmlns:p="http://schemas.openxmlformats.org/presentationml/2006/main">
   <p:cSld>
     <p:spTree>
@@ -1665,7 +1774,7 @@
           <a:p>
             <a:fld id="{18D8EB10-9094-CC46-9BCA-615730AD1A2C}" type="slidenum">
               <a:rPr lang="en-US" smtClean="0"/>
-              <a:t>17</a:t>
+              <a:t>18</a:t>
             </a:fld>
             <a:endParaRPr lang="en-US"/>
           </a:p>
@@ -1684,7 +1793,7 @@
 </p:notes>
 </file>
 
-<file path=ppt/notesSlides/notesSlide13.xml><?xml version="1.0" encoding="utf-8"?>
+<file path=ppt/notesSlides/notesSlide14.xml><?xml version="1.0" encoding="utf-8"?>
 <p:notes xmlns:a="http://schemas.openxmlformats.org/drawingml/2006/main" xmlns:r="http://schemas.openxmlformats.org/officeDocument/2006/relationships" xmlns:p="http://schemas.openxmlformats.org/presentationml/2006/main">
   <p:cSld>
     <p:spTree>
@@ -1773,7 +1882,7 @@
           <a:p>
             <a:fld id="{18D8EB10-9094-CC46-9BCA-615730AD1A2C}" type="slidenum">
               <a:rPr lang="en-US" smtClean="0"/>
-              <a:t>18</a:t>
+              <a:t>19</a:t>
             </a:fld>
             <a:endParaRPr lang="en-US"/>
           </a:p>
@@ -1792,7 +1901,7 @@
 </p:notes>
 </file>
 
-<file path=ppt/notesSlides/notesSlide14.xml><?xml version="1.0" encoding="utf-8"?>
+<file path=ppt/notesSlides/notesSlide15.xml><?xml version="1.0" encoding="utf-8"?>
 <p:notes xmlns:a="http://schemas.openxmlformats.org/drawingml/2006/main" xmlns:r="http://schemas.openxmlformats.org/officeDocument/2006/relationships" xmlns:p="http://schemas.openxmlformats.org/presentationml/2006/main">
   <p:cSld>
     <p:spTree>
@@ -1881,7 +1990,7 @@
           <a:p>
             <a:fld id="{18D8EB10-9094-CC46-9BCA-615730AD1A2C}" type="slidenum">
               <a:rPr lang="en-US" smtClean="0"/>
-              <a:t>19</a:t>
+              <a:t>20</a:t>
             </a:fld>
             <a:endParaRPr lang="en-US"/>
           </a:p>
@@ -2664,7 +2773,7 @@
         <p:cNvPr id="1" name="">
           <a:extLst>
             <a:ext uri="{FF2B5EF4-FFF2-40B4-BE49-F238E27FC236}">
-              <a16:creationId xmlns:a16="http://schemas.microsoft.com/office/drawing/2014/main" id="{FDD920C2-9EFE-16E4-B5B3-78DE3744DF09}"/>
+              <a16:creationId xmlns:a16="http://schemas.microsoft.com/office/drawing/2014/main" id="{893306F6-4EA1-035B-7510-F8EAEDDB252B}"/>
             </a:ext>
           </a:extLst>
         </p:cNvPr>
@@ -2684,7 +2793,7 @@
           <p:cNvPr id="2" name="Folienbildplatzhalter 1">
             <a:extLst>
               <a:ext uri="{FF2B5EF4-FFF2-40B4-BE49-F238E27FC236}">
-                <a16:creationId xmlns:a16="http://schemas.microsoft.com/office/drawing/2014/main" id="{4DBA2B19-949B-BBE5-3479-150B50D84724}"/>
+                <a16:creationId xmlns:a16="http://schemas.microsoft.com/office/drawing/2014/main" id="{9FB5D876-B4C8-DB21-8EE2-9B548A0C0474}"/>
               </a:ext>
             </a:extLst>
           </p:cNvPr>
@@ -2702,7 +2811,7 @@
           <p:cNvPr id="3" name="Notizenplatzhalter 2">
             <a:extLst>
               <a:ext uri="{FF2B5EF4-FFF2-40B4-BE49-F238E27FC236}">
-                <a16:creationId xmlns:a16="http://schemas.microsoft.com/office/drawing/2014/main" id="{BBBA73FC-4085-C0CA-9442-90E88AFFC848}"/>
+                <a16:creationId xmlns:a16="http://schemas.microsoft.com/office/drawing/2014/main" id="{4172CF17-2298-A450-491D-118318381BAA}"/>
               </a:ext>
             </a:extLst>
           </p:cNvPr>
@@ -2727,7 +2836,7 @@
           <p:cNvPr id="4" name="Foliennummernplatzhalter 3">
             <a:extLst>
               <a:ext uri="{FF2B5EF4-FFF2-40B4-BE49-F238E27FC236}">
-                <a16:creationId xmlns:a16="http://schemas.microsoft.com/office/drawing/2014/main" id="{A5760DF4-CA6A-A330-CE89-546F9E553A65}"/>
+                <a16:creationId xmlns:a16="http://schemas.microsoft.com/office/drawing/2014/main" id="{76BA6864-03AD-BC75-B902-889D93E6CF53}"/>
               </a:ext>
             </a:extLst>
           </p:cNvPr>
@@ -2754,7 +2863,7 @@
     </p:spTree>
     <p:extLst>
       <p:ext uri="{BB962C8B-B14F-4D97-AF65-F5344CB8AC3E}">
-        <p14:creationId xmlns:p14="http://schemas.microsoft.com/office/powerpoint/2010/main" val="4217853091"/>
+        <p14:creationId xmlns:p14="http://schemas.microsoft.com/office/powerpoint/2010/main" val="2630713013"/>
       </p:ext>
     </p:extLst>
   </p:cSld>
@@ -11245,7 +11354,7 @@
         <p:spPr>
           <a:xfrm>
             <a:off x="235974" y="245806"/>
-            <a:ext cx="3333136" cy="9971961"/>
+            <a:ext cx="3333136" cy="13526780"/>
           </a:xfrm>
           <a:prstGeom prst="rect">
             <a:avLst/>
@@ -11264,49 +11373,138 @@
             </a:r>
           </a:p>
           <a:p>
-            <a:endParaRPr lang="de-AT" sz="2800" b="1" dirty="0"/>
-          </a:p>
-          <a:p>
-            <a:r>
-              <a:rPr lang="de-AT" b="1" dirty="0"/>
+            <a:endParaRPr lang="de-AT" sz="800" b="1" dirty="0"/>
+          </a:p>
+          <a:p>
+            <a:endParaRPr lang="de-AT" sz="800" b="1" dirty="0"/>
+          </a:p>
+          <a:p>
+            <a:r>
+              <a:rPr lang="de-AT" sz="2100" b="1" dirty="0"/>
               <a:t>PC-</a:t>
             </a:r>
             <a:r>
-              <a:rPr lang="de-AT" b="1" dirty="0" err="1"/>
+              <a:rPr lang="de-AT" sz="2100" b="1" dirty="0" err="1"/>
               <a:t>Hosted</a:t>
             </a:r>
             <a:r>
-              <a:rPr lang="de-AT" b="1" dirty="0"/>
+              <a:rPr lang="de-AT" sz="2100" b="1" dirty="0"/>
               <a:t> Backend</a:t>
             </a:r>
           </a:p>
           <a:p>
+            <a:r>
+              <a:rPr lang="de-AT" sz="1900" dirty="0"/>
+              <a:t>Die gesamte Backend-</a:t>
+            </a:r>
+            <a:r>
+              <a:rPr lang="de-AT" sz="1900" dirty="0" err="1"/>
+              <a:t>Application</a:t>
+            </a:r>
+            <a:r>
+              <a:rPr lang="de-AT" sz="1900" dirty="0"/>
+              <a:t> wird mittels einem PC </a:t>
+            </a:r>
+            <a:r>
+              <a:rPr lang="de-AT" sz="1900" dirty="0" err="1"/>
+              <a:t>gehosted</a:t>
+            </a:r>
+            <a:endParaRPr lang="de-AT" sz="1900" dirty="0"/>
+          </a:p>
+          <a:p>
+            <a:endParaRPr lang="de-AT" sz="500" dirty="0"/>
+          </a:p>
+          <a:p>
+            <a:endParaRPr lang="de-AT" sz="500" b="1" dirty="0"/>
+          </a:p>
+          <a:p>
+            <a:r>
+              <a:rPr lang="de-AT" sz="2100" b="1" dirty="0"/>
+              <a:t>Service-Manager</a:t>
+            </a:r>
+          </a:p>
+          <a:p>
+            <a:r>
+              <a:rPr lang="de-AT" sz="1900" b="1" dirty="0"/>
+              <a:t>Frontend-Bridge</a:t>
+            </a:r>
+            <a:endParaRPr lang="de-AT" sz="500" dirty="0"/>
+          </a:p>
+          <a:p>
+            <a:r>
+              <a:rPr lang="de-AT" sz="1900" b="1" dirty="0" err="1"/>
+              <a:t>MBot</a:t>
+            </a:r>
+            <a:r>
+              <a:rPr lang="de-AT" sz="1900" b="1" dirty="0"/>
+              <a:t>-Bridge</a:t>
+            </a:r>
+          </a:p>
+          <a:p>
+            <a:r>
+              <a:rPr lang="de-AT" sz="1900" b="1" dirty="0"/>
+              <a:t>DB-Bridge</a:t>
+            </a:r>
+          </a:p>
+          <a:p>
+            <a:endParaRPr lang="de-AT" sz="500" b="1" dirty="0"/>
+          </a:p>
+          <a:p>
+            <a:endParaRPr lang="de-AT" sz="500" b="1" dirty="0"/>
+          </a:p>
+          <a:p>
+            <a:r>
+              <a:rPr lang="de-AT" sz="2100" b="1" dirty="0" err="1"/>
+              <a:t>Locally-Stored</a:t>
+            </a:r>
+            <a:r>
+              <a:rPr lang="de-AT" sz="2100" b="1" dirty="0"/>
+              <a:t> Logs</a:t>
+            </a:r>
+          </a:p>
+          <a:p>
+            <a:r>
+              <a:rPr lang="de-AT" dirty="0"/>
+              <a:t>Temporäre Speicherung der Fahrstrecken zur </a:t>
+            </a:r>
+            <a:r>
+              <a:rPr lang="de-AT" dirty="0" err="1"/>
+              <a:t>spätern</a:t>
+            </a:r>
+            <a:r>
+              <a:rPr lang="de-AT" dirty="0"/>
+              <a:t> Verarbeitung</a:t>
+            </a:r>
+          </a:p>
+          <a:p>
+            <a:endParaRPr lang="de-AT" sz="500" b="1" dirty="0"/>
+          </a:p>
+          <a:p>
+            <a:endParaRPr lang="de-AT" sz="500" b="1" dirty="0"/>
+          </a:p>
+          <a:p>
+            <a:endParaRPr lang="de-AT" sz="500" b="1" dirty="0"/>
+          </a:p>
+          <a:p>
+            <a:endParaRPr lang="de-AT" sz="500" b="1" dirty="0"/>
+          </a:p>
+          <a:p>
+            <a:r>
+              <a:rPr lang="de-AT" sz="2100" b="1" dirty="0"/>
+              <a:t>MongoDB Datenbank</a:t>
+            </a:r>
+          </a:p>
+          <a:p>
+            <a:r>
+              <a:rPr lang="de-AT" dirty="0"/>
+              <a:t>Konsistente Speicherung der Fahrstrecken</a:t>
+            </a:r>
+          </a:p>
+          <a:p>
+            <a:endParaRPr lang="de-AT" sz="2100" b="1" dirty="0"/>
+          </a:p>
+          <a:p>
             <a:endParaRPr lang="de-AT" b="1" dirty="0"/>
-          </a:p>
-          <a:p>
-            <a:endParaRPr lang="de-AT" b="1" dirty="0"/>
-          </a:p>
-          <a:p>
-            <a:r>
-              <a:rPr lang="de-AT" b="1" dirty="0"/>
-              <a:t>MongoDB Datenbank</a:t>
-            </a:r>
-          </a:p>
-          <a:p>
-            <a:endParaRPr lang="de-AT" b="1"/>
-          </a:p>
-          <a:p>
-            <a:endParaRPr lang="de-AT" b="1" dirty="0"/>
-          </a:p>
-          <a:p>
-            <a:r>
-              <a:rPr lang="de-AT" b="1" dirty="0" err="1"/>
-              <a:t>Locally-Stored</a:t>
-            </a:r>
-            <a:r>
-              <a:rPr lang="de-AT" b="1" dirty="0"/>
-              <a:t> Logs</a:t>
-            </a:r>
           </a:p>
           <a:p>
             <a:endParaRPr lang="de-AT" b="1" dirty="0"/>
@@ -11410,6 +11608,364 @@
 <file path=ppt/slides/slide14.xml><?xml version="1.0" encoding="utf-8"?>
 <p:sld xmlns:a="http://schemas.openxmlformats.org/drawingml/2006/main" xmlns:r="http://schemas.openxmlformats.org/officeDocument/2006/relationships" xmlns:p="http://schemas.openxmlformats.org/presentationml/2006/main">
   <p:cSld>
+    <p:bg>
+      <p:bgPr>
+        <a:solidFill>
+          <a:schemeClr val="bg1"/>
+        </a:solidFill>
+        <a:effectLst/>
+      </p:bgPr>
+    </p:bg>
+    <p:spTree>
+      <p:nvGrpSpPr>
+        <p:cNvPr id="1" name="">
+          <a:extLst>
+            <a:ext uri="{FF2B5EF4-FFF2-40B4-BE49-F238E27FC236}">
+              <a16:creationId xmlns:a16="http://schemas.microsoft.com/office/drawing/2014/main" id="{AA398BD4-509B-084B-04BF-D79C0A190CC4}"/>
+            </a:ext>
+          </a:extLst>
+        </p:cNvPr>
+        <p:cNvGrpSpPr/>
+        <p:nvPr/>
+      </p:nvGrpSpPr>
+      <p:grpSpPr>
+        <a:xfrm>
+          <a:off x="0" y="0"/>
+          <a:ext cx="0" cy="0"/>
+          <a:chOff x="0" y="0"/>
+          <a:chExt cx="0" cy="0"/>
+        </a:xfrm>
+      </p:grpSpPr>
+      <p:pic>
+        <p:nvPicPr>
+          <p:cNvPr id="15" name="Grafik 14">
+            <a:extLst>
+              <a:ext uri="{FF2B5EF4-FFF2-40B4-BE49-F238E27FC236}">
+                <a16:creationId xmlns:a16="http://schemas.microsoft.com/office/drawing/2014/main" id="{7096DA1A-9F25-EB63-4C32-3FDDB7AFBF19}"/>
+              </a:ext>
+            </a:extLst>
+          </p:cNvPr>
+          <p:cNvPicPr>
+            <a:picLocks noChangeAspect="1"/>
+          </p:cNvPicPr>
+          <p:nvPr/>
+        </p:nvPicPr>
+        <p:blipFill>
+          <a:blip r:embed="rId3">
+            <a:extLst>
+              <a:ext uri="{96DAC541-7B7A-43D3-8B79-37D633B846F1}">
+                <asvg:svgBlip xmlns:asvg="http://schemas.microsoft.com/office/drawing/2016/SVG/main" r:embed="rId4"/>
+              </a:ext>
+            </a:extLst>
+          </a:blip>
+          <a:srcRect t="3579"/>
+          <a:stretch>
+            <a:fillRect/>
+          </a:stretch>
+        </p:blipFill>
+        <p:spPr>
+          <a:xfrm>
+            <a:off x="3640637" y="142568"/>
+            <a:ext cx="5352032" cy="6715432"/>
+          </a:xfrm>
+          <a:prstGeom prst="rect">
+            <a:avLst/>
+          </a:prstGeom>
+        </p:spPr>
+      </p:pic>
+      <p:sp>
+        <p:nvSpPr>
+          <p:cNvPr id="9" name="Slide Number Placeholder 8">
+            <a:extLst>
+              <a:ext uri="{FF2B5EF4-FFF2-40B4-BE49-F238E27FC236}">
+                <a16:creationId xmlns:a16="http://schemas.microsoft.com/office/drawing/2014/main" id="{3429B672-5809-E829-E65F-AA3D3BE9CABE}"/>
+              </a:ext>
+            </a:extLst>
+          </p:cNvPr>
+          <p:cNvSpPr>
+            <a:spLocks noGrp="1"/>
+          </p:cNvSpPr>
+          <p:nvPr>
+            <p:ph type="sldNum" sz="quarter" idx="12"/>
+          </p:nvPr>
+        </p:nvSpPr>
+        <p:spPr>
+          <a:xfrm>
+            <a:off x="7086600" y="6492875"/>
+            <a:ext cx="2057400" cy="365125"/>
+          </a:xfrm>
+        </p:spPr>
+        <p:txBody>
+          <a:bodyPr>
+            <a:normAutofit/>
+          </a:bodyPr>
+          <a:lstStyle/>
+          <a:p>
+            <a:pPr>
+              <a:spcAft>
+                <a:spcPts val="600"/>
+              </a:spcAft>
+              <a:defRPr/>
+            </a:pPr>
+            <a:fld id="{AE4538FE-AEB4-413B-B741-EC1BAEEF6B8F}" type="slidenum">
+              <a:rPr lang="de-AT" smtClean="0"/>
+              <a:pPr>
+                <a:spcAft>
+                  <a:spcPts val="600"/>
+                </a:spcAft>
+                <a:defRPr/>
+              </a:pPr>
+              <a:t>14</a:t>
+            </a:fld>
+            <a:endParaRPr lang="de-AT" dirty="0"/>
+          </a:p>
+        </p:txBody>
+      </p:sp>
+      <p:sp>
+        <p:nvSpPr>
+          <p:cNvPr id="16" name="Textfeld 15">
+            <a:extLst>
+              <a:ext uri="{FF2B5EF4-FFF2-40B4-BE49-F238E27FC236}">
+                <a16:creationId xmlns:a16="http://schemas.microsoft.com/office/drawing/2014/main" id="{1A877A64-0A40-8F54-A187-36A7D5087E69}"/>
+              </a:ext>
+            </a:extLst>
+          </p:cNvPr>
+          <p:cNvSpPr txBox="1"/>
+          <p:nvPr/>
+        </p:nvSpPr>
+        <p:spPr>
+          <a:xfrm>
+            <a:off x="235974" y="245806"/>
+            <a:ext cx="3333136" cy="13649891"/>
+          </a:xfrm>
+          <a:prstGeom prst="rect">
+            <a:avLst/>
+          </a:prstGeom>
+          <a:noFill/>
+        </p:spPr>
+        <p:txBody>
+          <a:bodyPr wrap="square" rtlCol="0">
+            <a:spAutoFit/>
+          </a:bodyPr>
+          <a:lstStyle/>
+          <a:p>
+            <a:r>
+              <a:rPr lang="de-AT" sz="2800" b="1" dirty="0"/>
+              <a:t>Funktionalität und Systemverteilung</a:t>
+            </a:r>
+          </a:p>
+          <a:p>
+            <a:endParaRPr lang="de-AT" sz="800" b="1" dirty="0"/>
+          </a:p>
+          <a:p>
+            <a:endParaRPr lang="de-AT" sz="800" b="1" dirty="0"/>
+          </a:p>
+          <a:p>
+            <a:r>
+              <a:rPr lang="de-AT" sz="1500" b="1" dirty="0"/>
+              <a:t>PC-</a:t>
+            </a:r>
+            <a:r>
+              <a:rPr lang="de-AT" sz="1500" b="1" dirty="0" err="1"/>
+              <a:t>Hosted</a:t>
+            </a:r>
+            <a:r>
+              <a:rPr lang="de-AT" sz="1500" b="1" dirty="0"/>
+              <a:t> Backend</a:t>
+            </a:r>
+          </a:p>
+          <a:p>
+            <a:endParaRPr lang="de-AT" sz="500" dirty="0"/>
+          </a:p>
+          <a:p>
+            <a:endParaRPr lang="de-AT" sz="500" b="1" dirty="0"/>
+          </a:p>
+          <a:p>
+            <a:r>
+              <a:rPr lang="de-AT" sz="2100" b="1" dirty="0"/>
+              <a:t>Service-Manager</a:t>
+            </a:r>
+          </a:p>
+          <a:p>
+            <a:r>
+              <a:rPr lang="de-AT" sz="1900" b="1" dirty="0"/>
+              <a:t>Frontend-Bridge</a:t>
+            </a:r>
+          </a:p>
+          <a:p>
+            <a:r>
+              <a:rPr lang="de-AT" sz="1900" dirty="0"/>
+              <a:t>Endpoints / Zentrale Kommunikationsschnittstelle mit dem Frontend</a:t>
+            </a:r>
+          </a:p>
+          <a:p>
+            <a:endParaRPr lang="de-AT" sz="500" dirty="0"/>
+          </a:p>
+          <a:p>
+            <a:r>
+              <a:rPr lang="de-AT" sz="1900" b="1" dirty="0"/>
+              <a:t>MBot-Bridge</a:t>
+            </a:r>
+          </a:p>
+          <a:p>
+            <a:r>
+              <a:rPr lang="de-AT" sz="1900" dirty="0"/>
+              <a:t>Kommunikationsebene für </a:t>
+            </a:r>
+            <a:r>
+              <a:rPr lang="de-AT" sz="1900" dirty="0" err="1"/>
+              <a:t>Mbot</a:t>
+            </a:r>
+            <a:r>
+              <a:rPr lang="de-AT" sz="1900" dirty="0"/>
+              <a:t> Anweisungen</a:t>
+            </a:r>
+          </a:p>
+          <a:p>
+            <a:endParaRPr lang="de-AT" sz="1900" b="1" dirty="0"/>
+          </a:p>
+          <a:p>
+            <a:r>
+              <a:rPr lang="de-AT" sz="1900" b="1" dirty="0"/>
+              <a:t>DB-Bridge</a:t>
+            </a:r>
+          </a:p>
+          <a:p>
+            <a:r>
+              <a:rPr lang="de-AT" sz="1900" dirty="0"/>
+              <a:t>Lokale Daten auf die Datenbank verschieben, Abrufen von Datenbankeinträgen</a:t>
+            </a:r>
+          </a:p>
+          <a:p>
+            <a:endParaRPr lang="de-AT" sz="500" b="1" dirty="0"/>
+          </a:p>
+          <a:p>
+            <a:endParaRPr lang="de-AT" sz="500" b="1" dirty="0"/>
+          </a:p>
+          <a:p>
+            <a:r>
+              <a:rPr lang="de-AT" sz="1500" b="1" dirty="0" err="1"/>
+              <a:t>Locally-Stored</a:t>
+            </a:r>
+            <a:r>
+              <a:rPr lang="de-AT" sz="1500" b="1" dirty="0"/>
+              <a:t> Logs</a:t>
+            </a:r>
+          </a:p>
+          <a:p>
+            <a:r>
+              <a:rPr lang="de-AT" sz="1500" b="1" dirty="0"/>
+              <a:t>MongoDB Datenbank</a:t>
+            </a:r>
+          </a:p>
+          <a:p>
+            <a:endParaRPr lang="de-AT" sz="2100" b="1" dirty="0"/>
+          </a:p>
+          <a:p>
+            <a:endParaRPr lang="de-AT" b="1" dirty="0"/>
+          </a:p>
+          <a:p>
+            <a:endParaRPr lang="de-AT" b="1" dirty="0"/>
+          </a:p>
+          <a:p>
+            <a:endParaRPr lang="de-AT" b="1" dirty="0"/>
+          </a:p>
+          <a:p>
+            <a:endParaRPr lang="de-AT" dirty="0"/>
+          </a:p>
+          <a:p>
+            <a:endParaRPr lang="de-AT" dirty="0"/>
+          </a:p>
+          <a:p>
+            <a:endParaRPr lang="de-AT" dirty="0"/>
+          </a:p>
+          <a:p>
+            <a:endParaRPr lang="de-AT" dirty="0"/>
+          </a:p>
+          <a:p>
+            <a:endParaRPr lang="de-AT" dirty="0"/>
+          </a:p>
+          <a:p>
+            <a:endParaRPr lang="de-AT" dirty="0"/>
+          </a:p>
+          <a:p>
+            <a:endParaRPr lang="de-AT" dirty="0"/>
+          </a:p>
+          <a:p>
+            <a:endParaRPr lang="de-AT" dirty="0"/>
+          </a:p>
+          <a:p>
+            <a:endParaRPr lang="de-AT" dirty="0"/>
+          </a:p>
+          <a:p>
+            <a:endParaRPr lang="de-AT" dirty="0"/>
+          </a:p>
+          <a:p>
+            <a:endParaRPr lang="de-AT" dirty="0"/>
+          </a:p>
+          <a:p>
+            <a:endParaRPr lang="de-AT" dirty="0"/>
+          </a:p>
+          <a:p>
+            <a:endParaRPr lang="de-AT" dirty="0"/>
+          </a:p>
+          <a:p>
+            <a:endParaRPr lang="de-AT" dirty="0"/>
+          </a:p>
+          <a:p>
+            <a:endParaRPr lang="de-AT" dirty="0"/>
+          </a:p>
+          <a:p>
+            <a:endParaRPr lang="de-AT" dirty="0"/>
+          </a:p>
+          <a:p>
+            <a:endParaRPr lang="de-AT" dirty="0"/>
+          </a:p>
+          <a:p>
+            <a:endParaRPr lang="de-AT" dirty="0"/>
+          </a:p>
+          <a:p>
+            <a:endParaRPr lang="de-AT" dirty="0"/>
+          </a:p>
+          <a:p>
+            <a:endParaRPr lang="de-AT" dirty="0"/>
+          </a:p>
+          <a:p>
+            <a:endParaRPr lang="de-AT" dirty="0"/>
+          </a:p>
+          <a:p>
+            <a:endParaRPr lang="de-AT" dirty="0"/>
+          </a:p>
+        </p:txBody>
+      </p:sp>
+    </p:spTree>
+    <p:extLst>
+      <p:ext uri="{BB962C8B-B14F-4D97-AF65-F5344CB8AC3E}">
+        <p14:creationId xmlns:p14="http://schemas.microsoft.com/office/powerpoint/2010/main" val="2267849235"/>
+      </p:ext>
+    </p:extLst>
+  </p:cSld>
+  <p:clrMapOvr>
+    <a:masterClrMapping/>
+  </p:clrMapOvr>
+  <mc:AlternateContent xmlns:mc="http://schemas.openxmlformats.org/markup-compatibility/2006">
+    <mc:Choice xmlns:p159="http://schemas.microsoft.com/office/powerpoint/2015/09/main" Requires="p159">
+      <p:transition xmlns:p14="http://schemas.microsoft.com/office/powerpoint/2010/main" spd="slow" p14:dur="2000">
+        <p159:morph option="byWord"/>
+      </p:transition>
+    </mc:Choice>
+    <mc:Fallback>
+      <p:transition spd="slow">
+        <p:fade/>
+      </p:transition>
+    </mc:Fallback>
+  </mc:AlternateContent>
+</p:sld>
+</file>
+
+<file path=ppt/slides/slide15.xml><?xml version="1.0" encoding="utf-8"?>
+<p:sld xmlns:a="http://schemas.openxmlformats.org/drawingml/2006/main" xmlns:r="http://schemas.openxmlformats.org/officeDocument/2006/relationships" xmlns:p="http://schemas.openxmlformats.org/presentationml/2006/main">
+  <p:cSld>
     <p:spTree>
       <p:nvGrpSpPr>
         <p:cNvPr id="1" name="">
@@ -11522,7 +12078,7 @@
             </a:pPr>
             <a:fld id="{AE4538FE-AEB4-413B-B741-EC1BAEEF6B8F}" type="slidenum">
               <a:rPr lang="de-AT" smtClean="0"/>
-              <a:t>14</a:t>
+              <a:t>15</a:t>
             </a:fld>
             <a:endParaRPr lang="de-AT"/>
           </a:p>
@@ -11584,7 +12140,7 @@
 </p:sld>
 </file>
 
-<file path=ppt/slides/slide15.xml><?xml version="1.0" encoding="utf-8"?>
+<file path=ppt/slides/slide16.xml><?xml version="1.0" encoding="utf-8"?>
 <p:sld xmlns:a="http://schemas.openxmlformats.org/drawingml/2006/main" xmlns:r="http://schemas.openxmlformats.org/officeDocument/2006/relationships" xmlns:p="http://schemas.openxmlformats.org/presentationml/2006/main">
   <p:cSld>
     <p:spTree>
@@ -11725,7 +12281,7 @@
                 </a:spcAft>
                 <a:defRPr/>
               </a:pPr>
-              <a:t>15</a:t>
+              <a:t>16</a:t>
             </a:fld>
             <a:endParaRPr lang="de-AT"/>
           </a:p>
@@ -11827,7 +12383,7 @@
 </p:sld>
 </file>
 
-<file path=ppt/slides/slide16.xml><?xml version="1.0" encoding="utf-8"?>
+<file path=ppt/slides/slide17.xml><?xml version="1.0" encoding="utf-8"?>
 <p:sld xmlns:a="http://schemas.openxmlformats.org/drawingml/2006/main" xmlns:r="http://schemas.openxmlformats.org/officeDocument/2006/relationships" xmlns:p="http://schemas.openxmlformats.org/presentationml/2006/main">
   <p:cSld>
     <p:spTree>
@@ -11969,7 +12525,7 @@
                 </a:spcAft>
                 <a:defRPr/>
               </a:pPr>
-              <a:t>16</a:t>
+              <a:t>17</a:t>
             </a:fld>
             <a:endParaRPr lang="de-AT"/>
           </a:p>
@@ -12067,7 +12623,7 @@
 </p:sld>
 </file>
 
-<file path=ppt/slides/slide17.xml><?xml version="1.0" encoding="utf-8"?>
+<file path=ppt/slides/slide18.xml><?xml version="1.0" encoding="utf-8"?>
 <p:sld xmlns:a="http://schemas.openxmlformats.org/drawingml/2006/main" xmlns:r="http://schemas.openxmlformats.org/officeDocument/2006/relationships" xmlns:p="http://schemas.openxmlformats.org/presentationml/2006/main">
   <p:cSld>
     <p:spTree>
@@ -12209,7 +12765,7 @@
                 </a:spcAft>
                 <a:defRPr/>
               </a:pPr>
-              <a:t>17</a:t>
+              <a:t>18</a:t>
             </a:fld>
             <a:endParaRPr lang="de-AT"/>
           </a:p>
@@ -12306,7 +12862,7 @@
 </p:sld>
 </file>
 
-<file path=ppt/slides/slide18.xml><?xml version="1.0" encoding="utf-8"?>
+<file path=ppt/slides/slide19.xml><?xml version="1.0" encoding="utf-8"?>
 <p:sld xmlns:a="http://schemas.openxmlformats.org/drawingml/2006/main" xmlns:r="http://schemas.openxmlformats.org/officeDocument/2006/relationships" xmlns:p="http://schemas.openxmlformats.org/presentationml/2006/main">
   <p:cSld>
     <p:spTree>
@@ -12448,7 +13004,7 @@
                 </a:spcAft>
                 <a:defRPr/>
               </a:pPr>
-              <a:t>18</a:t>
+              <a:t>19</a:t>
             </a:fld>
             <a:endParaRPr lang="de-AT"/>
           </a:p>
@@ -12528,245 +13084,6 @@
     <p:extLst>
       <p:ext uri="{BB962C8B-B14F-4D97-AF65-F5344CB8AC3E}">
         <p14:creationId xmlns:p14="http://schemas.microsoft.com/office/powerpoint/2010/main" val="698079570"/>
-      </p:ext>
-    </p:extLst>
-  </p:cSld>
-  <p:clrMapOvr>
-    <a:masterClrMapping/>
-  </p:clrMapOvr>
-  <mc:AlternateContent xmlns:mc="http://schemas.openxmlformats.org/markup-compatibility/2006" xmlns:p14="http://schemas.microsoft.com/office/powerpoint/2010/main">
-    <mc:Choice Requires="p14">
-      <p:transition spd="med" p14:dur="700">
-        <p:fade/>
-      </p:transition>
-    </mc:Choice>
-    <mc:Fallback xmlns="">
-      <p:transition spd="med">
-        <p:fade/>
-      </p:transition>
-    </mc:Fallback>
-  </mc:AlternateContent>
-</p:sld>
-</file>
-
-<file path=ppt/slides/slide19.xml><?xml version="1.0" encoding="utf-8"?>
-<p:sld xmlns:a="http://schemas.openxmlformats.org/drawingml/2006/main" xmlns:r="http://schemas.openxmlformats.org/officeDocument/2006/relationships" xmlns:p="http://schemas.openxmlformats.org/presentationml/2006/main">
-  <p:cSld>
-    <p:spTree>
-      <p:nvGrpSpPr>
-        <p:cNvPr id="1" name="">
-          <a:extLst>
-            <a:ext uri="{FF2B5EF4-FFF2-40B4-BE49-F238E27FC236}">
-              <a16:creationId xmlns:a16="http://schemas.microsoft.com/office/drawing/2014/main" id="{C30EC4AF-87D1-CE42-09B5-9EC797B957D1}"/>
-            </a:ext>
-          </a:extLst>
-        </p:cNvPr>
-        <p:cNvGrpSpPr/>
-        <p:nvPr/>
-      </p:nvGrpSpPr>
-      <p:grpSpPr>
-        <a:xfrm>
-          <a:off x="0" y="0"/>
-          <a:ext cx="0" cy="0"/>
-          <a:chOff x="0" y="0"/>
-          <a:chExt cx="0" cy="0"/>
-        </a:xfrm>
-      </p:grpSpPr>
-      <p:sp>
-        <p:nvSpPr>
-          <p:cNvPr id="2" name="Title 1">
-            <a:extLst>
-              <a:ext uri="{FF2B5EF4-FFF2-40B4-BE49-F238E27FC236}">
-                <a16:creationId xmlns:a16="http://schemas.microsoft.com/office/drawing/2014/main" id="{E5D9DC35-5A0F-E698-3A93-DD48A888452C}"/>
-              </a:ext>
-            </a:extLst>
-          </p:cNvPr>
-          <p:cNvSpPr>
-            <a:spLocks noGrp="1"/>
-          </p:cNvSpPr>
-          <p:nvPr>
-            <p:ph type="title"/>
-          </p:nvPr>
-        </p:nvSpPr>
-        <p:spPr>
-          <a:xfrm>
-            <a:off x="1907704" y="365127"/>
-            <a:ext cx="6607646" cy="759618"/>
-          </a:xfrm>
-        </p:spPr>
-        <p:txBody>
-          <a:bodyPr anchor="ctr">
-            <a:normAutofit/>
-          </a:bodyPr>
-          <a:lstStyle/>
-          <a:p>
-            <a:r>
-              <a:rPr lang="de-DE" altLang="en-US"/>
-              <a:t>Wichtige Code-Abschnitte</a:t>
-            </a:r>
-          </a:p>
-        </p:txBody>
-      </p:sp>
-      <p:sp>
-        <p:nvSpPr>
-          <p:cNvPr id="8" name="Footer Placeholder 7">
-            <a:extLst>
-              <a:ext uri="{FF2B5EF4-FFF2-40B4-BE49-F238E27FC236}">
-                <a16:creationId xmlns:a16="http://schemas.microsoft.com/office/drawing/2014/main" id="{2AA4766C-116B-0F05-584C-3E3644D430B6}"/>
-              </a:ext>
-            </a:extLst>
-          </p:cNvPr>
-          <p:cNvSpPr>
-            <a:spLocks noGrp="1"/>
-          </p:cNvSpPr>
-          <p:nvPr>
-            <p:ph type="ftr" sz="quarter" idx="11"/>
-          </p:nvPr>
-        </p:nvSpPr>
-        <p:spPr>
-          <a:xfrm>
-            <a:off x="3028950" y="6356351"/>
-            <a:ext cx="3086100" cy="365125"/>
-          </a:xfrm>
-        </p:spPr>
-        <p:txBody>
-          <a:bodyPr anchor="ctr">
-            <a:normAutofit/>
-          </a:bodyPr>
-          <a:lstStyle/>
-          <a:p>
-            <a:pPr>
-              <a:spcAft>
-                <a:spcPts val="600"/>
-              </a:spcAft>
-              <a:defRPr/>
-            </a:pPr>
-            <a:r>
-              <a:rPr lang="de-DE" dirty="0"/>
-              <a:t>DI(FH) Falkensteiner Markus</a:t>
-            </a:r>
-            <a:endParaRPr lang="de-DE"/>
-          </a:p>
-        </p:txBody>
-      </p:sp>
-      <p:sp>
-        <p:nvSpPr>
-          <p:cNvPr id="9" name="Slide Number Placeholder 8">
-            <a:extLst>
-              <a:ext uri="{FF2B5EF4-FFF2-40B4-BE49-F238E27FC236}">
-                <a16:creationId xmlns:a16="http://schemas.microsoft.com/office/drawing/2014/main" id="{AE59ABF3-CCF5-B6C9-5786-EED3AED432D8}"/>
-              </a:ext>
-            </a:extLst>
-          </p:cNvPr>
-          <p:cNvSpPr>
-            <a:spLocks noGrp="1"/>
-          </p:cNvSpPr>
-          <p:nvPr>
-            <p:ph type="sldNum" sz="quarter" idx="12"/>
-          </p:nvPr>
-        </p:nvSpPr>
-        <p:spPr>
-          <a:xfrm>
-            <a:off x="6457950" y="6356351"/>
-            <a:ext cx="2057400" cy="365125"/>
-          </a:xfrm>
-        </p:spPr>
-        <p:txBody>
-          <a:bodyPr anchor="ctr">
-            <a:normAutofit/>
-          </a:bodyPr>
-          <a:lstStyle/>
-          <a:p>
-            <a:pPr>
-              <a:spcAft>
-                <a:spcPts val="600"/>
-              </a:spcAft>
-              <a:defRPr/>
-            </a:pPr>
-            <a:fld id="{AE4538FE-AEB4-413B-B741-EC1BAEEF6B8F}" type="slidenum">
-              <a:rPr lang="de-AT" smtClean="0"/>
-              <a:pPr>
-                <a:spcAft>
-                  <a:spcPts val="600"/>
-                </a:spcAft>
-                <a:defRPr/>
-              </a:pPr>
-              <a:t>19</a:t>
-            </a:fld>
-            <a:endParaRPr lang="de-AT"/>
-          </a:p>
-        </p:txBody>
-      </p:sp>
-      <p:sp>
-        <p:nvSpPr>
-          <p:cNvPr id="20" name="Textfeld 19">
-            <a:extLst>
-              <a:ext uri="{FF2B5EF4-FFF2-40B4-BE49-F238E27FC236}">
-                <a16:creationId xmlns:a16="http://schemas.microsoft.com/office/drawing/2014/main" id="{22090431-30F3-2497-8E56-E8BEDD306415}"/>
-              </a:ext>
-            </a:extLst>
-          </p:cNvPr>
-          <p:cNvSpPr txBox="1"/>
-          <p:nvPr/>
-        </p:nvSpPr>
-        <p:spPr>
-          <a:xfrm>
-            <a:off x="1474838" y="1868404"/>
-            <a:ext cx="6194323" cy="446276"/>
-          </a:xfrm>
-          <a:prstGeom prst="rect">
-            <a:avLst/>
-          </a:prstGeom>
-          <a:noFill/>
-        </p:spPr>
-        <p:txBody>
-          <a:bodyPr wrap="square" rtlCol="0">
-            <a:spAutoFit/>
-          </a:bodyPr>
-          <a:lstStyle/>
-          <a:p>
-            <a:pPr algn="ctr"/>
-            <a:r>
-              <a:rPr lang="de-DE" sz="2300" b="1" dirty="0"/>
-              <a:t>Zurücksetzen der Variablen bei Logout-Prozess</a:t>
-            </a:r>
-          </a:p>
-        </p:txBody>
-      </p:sp>
-      <p:pic>
-        <p:nvPicPr>
-          <p:cNvPr id="4" name="Grafik 3">
-            <a:extLst>
-              <a:ext uri="{FF2B5EF4-FFF2-40B4-BE49-F238E27FC236}">
-                <a16:creationId xmlns:a16="http://schemas.microsoft.com/office/drawing/2014/main" id="{52B62E32-9325-4CFE-DFE5-60B6987933A7}"/>
-              </a:ext>
-            </a:extLst>
-          </p:cNvPr>
-          <p:cNvPicPr>
-            <a:picLocks noChangeAspect="1"/>
-          </p:cNvPicPr>
-          <p:nvPr/>
-        </p:nvPicPr>
-        <p:blipFill>
-          <a:blip r:embed="rId3"/>
-          <a:stretch>
-            <a:fillRect/>
-          </a:stretch>
-        </p:blipFill>
-        <p:spPr>
-          <a:xfrm>
-            <a:off x="0" y="2462146"/>
-            <a:ext cx="10057938" cy="3402500"/>
-          </a:xfrm>
-          <a:prstGeom prst="rect">
-            <a:avLst/>
-          </a:prstGeom>
-        </p:spPr>
-      </p:pic>
-    </p:spTree>
-    <p:extLst>
-      <p:ext uri="{BB962C8B-B14F-4D97-AF65-F5344CB8AC3E}">
-        <p14:creationId xmlns:p14="http://schemas.microsoft.com/office/powerpoint/2010/main" val="1646292508"/>
       </p:ext>
     </p:extLst>
   </p:cSld>
@@ -13264,6 +13581,245 @@
   <p:cSld>
     <p:spTree>
       <p:nvGrpSpPr>
+        <p:cNvPr id="1" name="">
+          <a:extLst>
+            <a:ext uri="{FF2B5EF4-FFF2-40B4-BE49-F238E27FC236}">
+              <a16:creationId xmlns:a16="http://schemas.microsoft.com/office/drawing/2014/main" id="{C30EC4AF-87D1-CE42-09B5-9EC797B957D1}"/>
+            </a:ext>
+          </a:extLst>
+        </p:cNvPr>
+        <p:cNvGrpSpPr/>
+        <p:nvPr/>
+      </p:nvGrpSpPr>
+      <p:grpSpPr>
+        <a:xfrm>
+          <a:off x="0" y="0"/>
+          <a:ext cx="0" cy="0"/>
+          <a:chOff x="0" y="0"/>
+          <a:chExt cx="0" cy="0"/>
+        </a:xfrm>
+      </p:grpSpPr>
+      <p:sp>
+        <p:nvSpPr>
+          <p:cNvPr id="2" name="Title 1">
+            <a:extLst>
+              <a:ext uri="{FF2B5EF4-FFF2-40B4-BE49-F238E27FC236}">
+                <a16:creationId xmlns:a16="http://schemas.microsoft.com/office/drawing/2014/main" id="{E5D9DC35-5A0F-E698-3A93-DD48A888452C}"/>
+              </a:ext>
+            </a:extLst>
+          </p:cNvPr>
+          <p:cNvSpPr>
+            <a:spLocks noGrp="1"/>
+          </p:cNvSpPr>
+          <p:nvPr>
+            <p:ph type="title"/>
+          </p:nvPr>
+        </p:nvSpPr>
+        <p:spPr>
+          <a:xfrm>
+            <a:off x="1907704" y="365127"/>
+            <a:ext cx="6607646" cy="759618"/>
+          </a:xfrm>
+        </p:spPr>
+        <p:txBody>
+          <a:bodyPr anchor="ctr">
+            <a:normAutofit/>
+          </a:bodyPr>
+          <a:lstStyle/>
+          <a:p>
+            <a:r>
+              <a:rPr lang="de-DE" altLang="en-US"/>
+              <a:t>Wichtige Code-Abschnitte</a:t>
+            </a:r>
+          </a:p>
+        </p:txBody>
+      </p:sp>
+      <p:sp>
+        <p:nvSpPr>
+          <p:cNvPr id="8" name="Footer Placeholder 7">
+            <a:extLst>
+              <a:ext uri="{FF2B5EF4-FFF2-40B4-BE49-F238E27FC236}">
+                <a16:creationId xmlns:a16="http://schemas.microsoft.com/office/drawing/2014/main" id="{2AA4766C-116B-0F05-584C-3E3644D430B6}"/>
+              </a:ext>
+            </a:extLst>
+          </p:cNvPr>
+          <p:cNvSpPr>
+            <a:spLocks noGrp="1"/>
+          </p:cNvSpPr>
+          <p:nvPr>
+            <p:ph type="ftr" sz="quarter" idx="11"/>
+          </p:nvPr>
+        </p:nvSpPr>
+        <p:spPr>
+          <a:xfrm>
+            <a:off x="3028950" y="6356351"/>
+            <a:ext cx="3086100" cy="365125"/>
+          </a:xfrm>
+        </p:spPr>
+        <p:txBody>
+          <a:bodyPr anchor="ctr">
+            <a:normAutofit/>
+          </a:bodyPr>
+          <a:lstStyle/>
+          <a:p>
+            <a:pPr>
+              <a:spcAft>
+                <a:spcPts val="600"/>
+              </a:spcAft>
+              <a:defRPr/>
+            </a:pPr>
+            <a:r>
+              <a:rPr lang="de-DE" dirty="0"/>
+              <a:t>DI(FH) Falkensteiner Markus</a:t>
+            </a:r>
+            <a:endParaRPr lang="de-DE"/>
+          </a:p>
+        </p:txBody>
+      </p:sp>
+      <p:sp>
+        <p:nvSpPr>
+          <p:cNvPr id="9" name="Slide Number Placeholder 8">
+            <a:extLst>
+              <a:ext uri="{FF2B5EF4-FFF2-40B4-BE49-F238E27FC236}">
+                <a16:creationId xmlns:a16="http://schemas.microsoft.com/office/drawing/2014/main" id="{AE59ABF3-CCF5-B6C9-5786-EED3AED432D8}"/>
+              </a:ext>
+            </a:extLst>
+          </p:cNvPr>
+          <p:cNvSpPr>
+            <a:spLocks noGrp="1"/>
+          </p:cNvSpPr>
+          <p:nvPr>
+            <p:ph type="sldNum" sz="quarter" idx="12"/>
+          </p:nvPr>
+        </p:nvSpPr>
+        <p:spPr>
+          <a:xfrm>
+            <a:off x="6457950" y="6356351"/>
+            <a:ext cx="2057400" cy="365125"/>
+          </a:xfrm>
+        </p:spPr>
+        <p:txBody>
+          <a:bodyPr anchor="ctr">
+            <a:normAutofit/>
+          </a:bodyPr>
+          <a:lstStyle/>
+          <a:p>
+            <a:pPr>
+              <a:spcAft>
+                <a:spcPts val="600"/>
+              </a:spcAft>
+              <a:defRPr/>
+            </a:pPr>
+            <a:fld id="{AE4538FE-AEB4-413B-B741-EC1BAEEF6B8F}" type="slidenum">
+              <a:rPr lang="de-AT" smtClean="0"/>
+              <a:pPr>
+                <a:spcAft>
+                  <a:spcPts val="600"/>
+                </a:spcAft>
+                <a:defRPr/>
+              </a:pPr>
+              <a:t>20</a:t>
+            </a:fld>
+            <a:endParaRPr lang="de-AT"/>
+          </a:p>
+        </p:txBody>
+      </p:sp>
+      <p:sp>
+        <p:nvSpPr>
+          <p:cNvPr id="20" name="Textfeld 19">
+            <a:extLst>
+              <a:ext uri="{FF2B5EF4-FFF2-40B4-BE49-F238E27FC236}">
+                <a16:creationId xmlns:a16="http://schemas.microsoft.com/office/drawing/2014/main" id="{22090431-30F3-2497-8E56-E8BEDD306415}"/>
+              </a:ext>
+            </a:extLst>
+          </p:cNvPr>
+          <p:cNvSpPr txBox="1"/>
+          <p:nvPr/>
+        </p:nvSpPr>
+        <p:spPr>
+          <a:xfrm>
+            <a:off x="1474838" y="1868404"/>
+            <a:ext cx="6194323" cy="446276"/>
+          </a:xfrm>
+          <a:prstGeom prst="rect">
+            <a:avLst/>
+          </a:prstGeom>
+          <a:noFill/>
+        </p:spPr>
+        <p:txBody>
+          <a:bodyPr wrap="square" rtlCol="0">
+            <a:spAutoFit/>
+          </a:bodyPr>
+          <a:lstStyle/>
+          <a:p>
+            <a:pPr algn="ctr"/>
+            <a:r>
+              <a:rPr lang="de-DE" sz="2300" b="1" dirty="0"/>
+              <a:t>Zurücksetzen der Variablen bei Logout-Prozess</a:t>
+            </a:r>
+          </a:p>
+        </p:txBody>
+      </p:sp>
+      <p:pic>
+        <p:nvPicPr>
+          <p:cNvPr id="4" name="Grafik 3">
+            <a:extLst>
+              <a:ext uri="{FF2B5EF4-FFF2-40B4-BE49-F238E27FC236}">
+                <a16:creationId xmlns:a16="http://schemas.microsoft.com/office/drawing/2014/main" id="{52B62E32-9325-4CFE-DFE5-60B6987933A7}"/>
+              </a:ext>
+            </a:extLst>
+          </p:cNvPr>
+          <p:cNvPicPr>
+            <a:picLocks noChangeAspect="1"/>
+          </p:cNvPicPr>
+          <p:nvPr/>
+        </p:nvPicPr>
+        <p:blipFill>
+          <a:blip r:embed="rId3"/>
+          <a:stretch>
+            <a:fillRect/>
+          </a:stretch>
+        </p:blipFill>
+        <p:spPr>
+          <a:xfrm>
+            <a:off x="0" y="2462146"/>
+            <a:ext cx="10057938" cy="3402500"/>
+          </a:xfrm>
+          <a:prstGeom prst="rect">
+            <a:avLst/>
+          </a:prstGeom>
+        </p:spPr>
+      </p:pic>
+    </p:spTree>
+    <p:extLst>
+      <p:ext uri="{BB962C8B-B14F-4D97-AF65-F5344CB8AC3E}">
+        <p14:creationId xmlns:p14="http://schemas.microsoft.com/office/powerpoint/2010/main" val="1646292508"/>
+      </p:ext>
+    </p:extLst>
+  </p:cSld>
+  <p:clrMapOvr>
+    <a:masterClrMapping/>
+  </p:clrMapOvr>
+  <mc:AlternateContent xmlns:mc="http://schemas.openxmlformats.org/markup-compatibility/2006" xmlns:p14="http://schemas.microsoft.com/office/powerpoint/2010/main">
+    <mc:Choice Requires="p14">
+      <p:transition spd="med" p14:dur="700">
+        <p:fade/>
+      </p:transition>
+    </mc:Choice>
+    <mc:Fallback xmlns="">
+      <p:transition spd="med">
+        <p:fade/>
+      </p:transition>
+    </mc:Fallback>
+  </mc:AlternateContent>
+</p:sld>
+</file>
+
+<file path=ppt/slides/slide21.xml><?xml version="1.0" encoding="utf-8"?>
+<p:sld xmlns:a="http://schemas.openxmlformats.org/drawingml/2006/main" xmlns:r="http://schemas.openxmlformats.org/officeDocument/2006/relationships" xmlns:p="http://schemas.openxmlformats.org/presentationml/2006/main">
+  <p:cSld>
+    <p:spTree>
+      <p:nvGrpSpPr>
         <p:cNvPr id="1" name=""/>
         <p:cNvGrpSpPr/>
         <p:nvPr/>
@@ -13361,7 +13917,7 @@
             </a:pPr>
             <a:fld id="{AE4538FE-AEB4-413B-B741-EC1BAEEF6B8F}" type="slidenum">
               <a:rPr lang="de-AT" smtClean="0"/>
-              <a:t>20</a:t>
+              <a:t>21</a:t>
             </a:fld>
             <a:endParaRPr lang="de-AT"/>
           </a:p>
@@ -17302,15 +17858,6 @@
 </file>
 
 <file path=customXml/item1.xml><?xml version="1.0" encoding="utf-8"?>
-<?mso-contentType ?>
-<FormTemplates xmlns="http://schemas.microsoft.com/sharepoint/v3/contenttype/forms">
-  <Display>DocumentLibraryForm</Display>
-  <Edit>DocumentLibraryForm</Edit>
-  <New>DocumentLibraryForm</New>
-</FormTemplates>
-</file>
-
-<file path=customXml/item2.xml><?xml version="1.0" encoding="utf-8"?>
 <ct:contentTypeSchema xmlns:ct="http://schemas.microsoft.com/office/2006/metadata/contentType" xmlns:ma="http://schemas.microsoft.com/office/2006/metadata/properties/metaAttributes" ct:_="" ma:_="" ma:contentTypeName="Dokument" ma:contentTypeID="0x01010091FD76AC810CD946AFF2048135E5AED8" ma:contentTypeVersion="4" ma:contentTypeDescription="Ein neues Dokument erstellen." ma:contentTypeScope="" ma:versionID="f1a1cd72032fc8609ea7c3f0b5cd8b51">
   <xsd:schema xmlns:xsd="http://www.w3.org/2001/XMLSchema" xmlns:xs="http://www.w3.org/2001/XMLSchema" xmlns:p="http://schemas.microsoft.com/office/2006/metadata/properties" xmlns:ns2="e330c3bd-b73b-44bd-ae32-0c4bdfdcab8e" targetNamespace="http://schemas.microsoft.com/office/2006/metadata/properties" ma:root="true" ma:fieldsID="a8427e112a34e63d5c426854409c5fee" ns2:_="">
     <xsd:import namespace="e330c3bd-b73b-44bd-ae32-0c4bdfdcab8e"/>
@@ -17454,6 +18001,15 @@
 </ct:contentTypeSchema>
 </file>
 
+<file path=customXml/item2.xml><?xml version="1.0" encoding="utf-8"?>
+<?mso-contentType ?>
+<FormTemplates xmlns="http://schemas.microsoft.com/sharepoint/v3/contenttype/forms">
+  <Display>DocumentLibraryForm</Display>
+  <Edit>DocumentLibraryForm</Edit>
+  <New>DocumentLibraryForm</New>
+</FormTemplates>
+</file>
+
 <file path=customXml/item3.xml><?xml version="1.0" encoding="utf-8"?>
 <p:properties xmlns:p="http://schemas.microsoft.com/office/2006/metadata/properties" xmlns:xsi="http://www.w3.org/2001/XMLSchema-instance" xmlns:pc="http://schemas.microsoft.com/office/infopath/2007/PartnerControls">
   <documentManagement/>
@@ -17461,14 +18017,6 @@
 </file>
 
 <file path=customXml/itemProps1.xml><?xml version="1.0" encoding="utf-8"?>
-<ds:datastoreItem xmlns:ds="http://schemas.openxmlformats.org/officeDocument/2006/customXml" ds:itemID="{1981A0EB-802E-4D0E-9A2A-3AE4F15204D8}">
-  <ds:schemaRefs>
-    <ds:schemaRef ds:uri="http://schemas.microsoft.com/sharepoint/v3/contenttype/forms"/>
-  </ds:schemaRefs>
-</ds:datastoreItem>
-</file>
-
-<file path=customXml/itemProps2.xml><?xml version="1.0" encoding="utf-8"?>
 <ds:datastoreItem xmlns:ds="http://schemas.openxmlformats.org/officeDocument/2006/customXml" ds:itemID="{B3B628B2-85F5-4AD2-9E28-9130197E5E7C}">
   <ds:schemaRefs>
     <ds:schemaRef ds:uri="e330c3bd-b73b-44bd-ae32-0c4bdfdcab8e"/>
@@ -17482,6 +18030,14 @@
     <ds:schemaRef ds:uri="http://schemas.microsoft.com/office/infopath/2007/PartnerControls"/>
     <ds:schemaRef ds:uri="http://schemas.openxmlformats.org/package/2006/metadata/core-properties"/>
     <ds:schemaRef ds:uri="http://www.w3.org/2001/XMLSchema"/>
+  </ds:schemaRefs>
+</ds:datastoreItem>
+</file>
+
+<file path=customXml/itemProps2.xml><?xml version="1.0" encoding="utf-8"?>
+<ds:datastoreItem xmlns:ds="http://schemas.openxmlformats.org/officeDocument/2006/customXml" ds:itemID="{1981A0EB-802E-4D0E-9A2A-3AE4F15204D8}">
+  <ds:schemaRefs>
+    <ds:schemaRef ds:uri="http://schemas.microsoft.com/sharepoint/v3/contenttype/forms"/>
   </ds:schemaRefs>
 </ds:datastoreItem>
 </file>

</xml_diff>

<commit_message>
Update Presentation & Documentation
</commit_message>
<xml_diff>
--- a/02_Backend/!_Docs/INF4_SYP_Gruppe1_Abschlusspräsentation.pptx
+++ b/02_Backend/!_Docs/INF4_SYP_Gruppe1_Abschlusspräsentation.pptx
@@ -13,12 +13,12 @@
   </p:handoutMasterIdLst>
   <p:sldIdLst>
     <p:sldId id="361" r:id="rId6"/>
-    <p:sldId id="582" r:id="rId7"/>
-    <p:sldId id="586" r:id="rId8"/>
-    <p:sldId id="594" r:id="rId9"/>
-    <p:sldId id="584" r:id="rId10"/>
-    <p:sldId id="583" r:id="rId11"/>
-    <p:sldId id="595" r:id="rId12"/>
+    <p:sldId id="595" r:id="rId7"/>
+    <p:sldId id="582" r:id="rId8"/>
+    <p:sldId id="586" r:id="rId9"/>
+    <p:sldId id="594" r:id="rId10"/>
+    <p:sldId id="584" r:id="rId11"/>
+    <p:sldId id="583" r:id="rId12"/>
     <p:sldId id="596" r:id="rId13"/>
     <p:sldId id="597" r:id="rId14"/>
     <p:sldId id="600" r:id="rId15"/>
@@ -1282,7 +1282,13 @@
   <p:cSld>
     <p:spTree>
       <p:nvGrpSpPr>
-        <p:cNvPr id="1" name=""/>
+        <p:cNvPr id="1" name="">
+          <a:extLst>
+            <a:ext uri="{FF2B5EF4-FFF2-40B4-BE49-F238E27FC236}">
+              <a16:creationId xmlns:a16="http://schemas.microsoft.com/office/drawing/2014/main" id="{3628A3A2-01AD-A199-54CC-63BE763EC3C7}"/>
+            </a:ext>
+          </a:extLst>
+        </p:cNvPr>
         <p:cNvGrpSpPr/>
         <p:nvPr/>
       </p:nvGrpSpPr>
@@ -1296,7 +1302,13 @@
       </p:grpSpPr>
       <p:sp>
         <p:nvSpPr>
-          <p:cNvPr id="2" name="Folienbildplatzhalter 1"/>
+          <p:cNvPr id="2" name="Folienbildplatzhalter 1">
+            <a:extLst>
+              <a:ext uri="{FF2B5EF4-FFF2-40B4-BE49-F238E27FC236}">
+                <a16:creationId xmlns:a16="http://schemas.microsoft.com/office/drawing/2014/main" id="{F3CC57B3-805A-3C09-1F56-3520815B66E8}"/>
+              </a:ext>
+            </a:extLst>
+          </p:cNvPr>
           <p:cNvSpPr>
             <a:spLocks noGrp="1" noRot="1" noChangeAspect="1"/>
           </p:cNvSpPr>
@@ -1308,7 +1320,13 @@
       </p:sp>
       <p:sp>
         <p:nvSpPr>
-          <p:cNvPr id="3" name="Notizenplatzhalter 2"/>
+          <p:cNvPr id="3" name="Notizenplatzhalter 2">
+            <a:extLst>
+              <a:ext uri="{FF2B5EF4-FFF2-40B4-BE49-F238E27FC236}">
+                <a16:creationId xmlns:a16="http://schemas.microsoft.com/office/drawing/2014/main" id="{567D9B22-A10A-3ED6-5EC1-E0FCF9F347E6}"/>
+              </a:ext>
+            </a:extLst>
+          </p:cNvPr>
           <p:cNvSpPr>
             <a:spLocks noGrp="1"/>
           </p:cNvSpPr>
@@ -1327,7 +1345,13 @@
       </p:sp>
       <p:sp>
         <p:nvSpPr>
-          <p:cNvPr id="4" name="Foliennummernplatzhalter 3"/>
+          <p:cNvPr id="4" name="Foliennummernplatzhalter 3">
+            <a:extLst>
+              <a:ext uri="{FF2B5EF4-FFF2-40B4-BE49-F238E27FC236}">
+                <a16:creationId xmlns:a16="http://schemas.microsoft.com/office/drawing/2014/main" id="{9E8E838E-504C-50B9-E715-A8881936D92A}"/>
+              </a:ext>
+            </a:extLst>
+          </p:cNvPr>
           <p:cNvSpPr>
             <a:spLocks noGrp="1"/>
           </p:cNvSpPr>
@@ -1342,7 +1366,7 @@
           <a:p>
             <a:fld id="{18D8EB10-9094-CC46-9BCA-615730AD1A2C}" type="slidenum">
               <a:rPr lang="en-US" smtClean="0"/>
-              <a:t>6</a:t>
+              <a:t>2</a:t>
             </a:fld>
             <a:endParaRPr lang="en-US"/>
           </a:p>
@@ -1351,7 +1375,7 @@
     </p:spTree>
     <p:extLst>
       <p:ext uri="{BB962C8B-B14F-4D97-AF65-F5344CB8AC3E}">
-        <p14:creationId xmlns:p14="http://schemas.microsoft.com/office/powerpoint/2010/main" val="3111698589"/>
+        <p14:creationId xmlns:p14="http://schemas.microsoft.com/office/powerpoint/2010/main" val="1486668350"/>
       </p:ext>
     </p:extLst>
   </p:cSld>
@@ -2014,13 +2038,7 @@
   <p:cSld>
     <p:spTree>
       <p:nvGrpSpPr>
-        <p:cNvPr id="1" name="">
-          <a:extLst>
-            <a:ext uri="{FF2B5EF4-FFF2-40B4-BE49-F238E27FC236}">
-              <a16:creationId xmlns:a16="http://schemas.microsoft.com/office/drawing/2014/main" id="{3628A3A2-01AD-A199-54CC-63BE763EC3C7}"/>
-            </a:ext>
-          </a:extLst>
-        </p:cNvPr>
+        <p:cNvPr id="1" name=""/>
         <p:cNvGrpSpPr/>
         <p:nvPr/>
       </p:nvGrpSpPr>
@@ -2034,13 +2052,7 @@
       </p:grpSpPr>
       <p:sp>
         <p:nvSpPr>
-          <p:cNvPr id="2" name="Folienbildplatzhalter 1">
-            <a:extLst>
-              <a:ext uri="{FF2B5EF4-FFF2-40B4-BE49-F238E27FC236}">
-                <a16:creationId xmlns:a16="http://schemas.microsoft.com/office/drawing/2014/main" id="{F3CC57B3-805A-3C09-1F56-3520815B66E8}"/>
-              </a:ext>
-            </a:extLst>
-          </p:cNvPr>
+          <p:cNvPr id="2" name="Folienbildplatzhalter 1"/>
           <p:cNvSpPr>
             <a:spLocks noGrp="1" noRot="1" noChangeAspect="1"/>
           </p:cNvSpPr>
@@ -2052,13 +2064,7 @@
       </p:sp>
       <p:sp>
         <p:nvSpPr>
-          <p:cNvPr id="3" name="Notizenplatzhalter 2">
-            <a:extLst>
-              <a:ext uri="{FF2B5EF4-FFF2-40B4-BE49-F238E27FC236}">
-                <a16:creationId xmlns:a16="http://schemas.microsoft.com/office/drawing/2014/main" id="{567D9B22-A10A-3ED6-5EC1-E0FCF9F347E6}"/>
-              </a:ext>
-            </a:extLst>
-          </p:cNvPr>
+          <p:cNvPr id="3" name="Notizenplatzhalter 2"/>
           <p:cNvSpPr>
             <a:spLocks noGrp="1"/>
           </p:cNvSpPr>
@@ -2077,13 +2083,7 @@
       </p:sp>
       <p:sp>
         <p:nvSpPr>
-          <p:cNvPr id="4" name="Foliennummernplatzhalter 3">
-            <a:extLst>
-              <a:ext uri="{FF2B5EF4-FFF2-40B4-BE49-F238E27FC236}">
-                <a16:creationId xmlns:a16="http://schemas.microsoft.com/office/drawing/2014/main" id="{9E8E838E-504C-50B9-E715-A8881936D92A}"/>
-              </a:ext>
-            </a:extLst>
-          </p:cNvPr>
+          <p:cNvPr id="4" name="Foliennummernplatzhalter 3"/>
           <p:cNvSpPr>
             <a:spLocks noGrp="1"/>
           </p:cNvSpPr>
@@ -2107,7 +2107,7 @@
     </p:spTree>
     <p:extLst>
       <p:ext uri="{BB962C8B-B14F-4D97-AF65-F5344CB8AC3E}">
-        <p14:creationId xmlns:p14="http://schemas.microsoft.com/office/powerpoint/2010/main" val="1486668350"/>
+        <p14:creationId xmlns:p14="http://schemas.microsoft.com/office/powerpoint/2010/main" val="3111698589"/>
       </p:ext>
     </p:extLst>
   </p:cSld>
@@ -13084,6 +13084,553 @@
   <p:cSld>
     <p:spTree>
       <p:nvGrpSpPr>
+        <p:cNvPr id="1" name="">
+          <a:extLst>
+            <a:ext uri="{FF2B5EF4-FFF2-40B4-BE49-F238E27FC236}">
+              <a16:creationId xmlns:a16="http://schemas.microsoft.com/office/drawing/2014/main" id="{BC7CAB39-4755-BCF6-4198-E800346FA0EB}"/>
+            </a:ext>
+          </a:extLst>
+        </p:cNvPr>
+        <p:cNvGrpSpPr/>
+        <p:nvPr/>
+      </p:nvGrpSpPr>
+      <p:grpSpPr>
+        <a:xfrm>
+          <a:off x="0" y="0"/>
+          <a:ext cx="0" cy="0"/>
+          <a:chOff x="0" y="0"/>
+          <a:chExt cx="0" cy="0"/>
+        </a:xfrm>
+      </p:grpSpPr>
+      <p:sp>
+        <p:nvSpPr>
+          <p:cNvPr id="2" name="Title 1">
+            <a:extLst>
+              <a:ext uri="{FF2B5EF4-FFF2-40B4-BE49-F238E27FC236}">
+                <a16:creationId xmlns:a16="http://schemas.microsoft.com/office/drawing/2014/main" id="{AA70ABD0-FFDE-DB5F-B928-A482B3DB08FA}"/>
+              </a:ext>
+            </a:extLst>
+          </p:cNvPr>
+          <p:cNvSpPr>
+            <a:spLocks noGrp="1"/>
+          </p:cNvSpPr>
+          <p:nvPr>
+            <p:ph type="title"/>
+          </p:nvPr>
+        </p:nvSpPr>
+        <p:spPr>
+          <a:xfrm>
+            <a:off x="1937231" y="303130"/>
+            <a:ext cx="6607646" cy="759618"/>
+          </a:xfrm>
+        </p:spPr>
+        <p:txBody>
+          <a:bodyPr/>
+          <a:lstStyle/>
+          <a:p>
+            <a:r>
+              <a:rPr lang="de-DE" altLang="en-US" dirty="0">
+                <a:latin typeface="Calibri" panose="020F0502020204030204" charset="0"/>
+              </a:rPr>
+              <a:t>Abschlusspräsentation</a:t>
+            </a:r>
+          </a:p>
+        </p:txBody>
+      </p:sp>
+      <p:sp>
+        <p:nvSpPr>
+          <p:cNvPr id="8" name="Footer Placeholder 7">
+            <a:extLst>
+              <a:ext uri="{FF2B5EF4-FFF2-40B4-BE49-F238E27FC236}">
+                <a16:creationId xmlns:a16="http://schemas.microsoft.com/office/drawing/2014/main" id="{07B643CF-C65D-A5B2-1A39-608329B3DE0D}"/>
+              </a:ext>
+            </a:extLst>
+          </p:cNvPr>
+          <p:cNvSpPr>
+            <a:spLocks noGrp="1"/>
+          </p:cNvSpPr>
+          <p:nvPr>
+            <p:ph type="ftr" sz="quarter" idx="11"/>
+          </p:nvPr>
+        </p:nvSpPr>
+        <p:spPr/>
+        <p:txBody>
+          <a:bodyPr/>
+          <a:lstStyle/>
+          <a:p>
+            <a:pPr>
+              <a:defRPr/>
+            </a:pPr>
+            <a:r>
+              <a:rPr lang="de-DE" dirty="0"/>
+              <a:t>DI(FH) Falkensteiner Markus</a:t>
+            </a:r>
+          </a:p>
+        </p:txBody>
+      </p:sp>
+      <p:sp>
+        <p:nvSpPr>
+          <p:cNvPr id="9" name="Slide Number Placeholder 8">
+            <a:extLst>
+              <a:ext uri="{FF2B5EF4-FFF2-40B4-BE49-F238E27FC236}">
+                <a16:creationId xmlns:a16="http://schemas.microsoft.com/office/drawing/2014/main" id="{70AAFB3E-1BEB-D2B0-9A45-90A00B87C5C5}"/>
+              </a:ext>
+            </a:extLst>
+          </p:cNvPr>
+          <p:cNvSpPr>
+            <a:spLocks noGrp="1"/>
+          </p:cNvSpPr>
+          <p:nvPr>
+            <p:ph type="sldNum" sz="quarter" idx="12"/>
+          </p:nvPr>
+        </p:nvSpPr>
+        <p:spPr/>
+        <p:txBody>
+          <a:bodyPr/>
+          <a:lstStyle/>
+          <a:p>
+            <a:pPr>
+              <a:defRPr/>
+            </a:pPr>
+            <a:fld id="{AE4538FE-AEB4-413B-B741-EC1BAEEF6B8F}" type="slidenum">
+              <a:rPr lang="de-AT" smtClean="0"/>
+              <a:t>2</a:t>
+            </a:fld>
+            <a:endParaRPr lang="de-AT"/>
+          </a:p>
+        </p:txBody>
+      </p:sp>
+      <p:sp>
+        <p:nvSpPr>
+          <p:cNvPr id="3" name="Textfeld 2">
+            <a:extLst>
+              <a:ext uri="{FF2B5EF4-FFF2-40B4-BE49-F238E27FC236}">
+                <a16:creationId xmlns:a16="http://schemas.microsoft.com/office/drawing/2014/main" id="{30EAFC73-CD4F-93E0-9551-0DD00510D28B}"/>
+              </a:ext>
+            </a:extLst>
+          </p:cNvPr>
+          <p:cNvSpPr txBox="1"/>
+          <p:nvPr/>
+        </p:nvSpPr>
+        <p:spPr>
+          <a:xfrm>
+            <a:off x="668593" y="1843950"/>
+            <a:ext cx="8043402" cy="3789948"/>
+          </a:xfrm>
+          <a:prstGeom prst="rect">
+            <a:avLst/>
+          </a:prstGeom>
+          <a:noFill/>
+        </p:spPr>
+        <p:txBody>
+          <a:bodyPr wrap="square" rtlCol="0">
+            <a:spAutoFit/>
+          </a:bodyPr>
+          <a:lstStyle/>
+          <a:p>
+            <a:r>
+              <a:rPr lang="de-DE" sz="2800" b="1" u="sng" dirty="0"/>
+              <a:t>Inhalt</a:t>
+            </a:r>
+            <a:endParaRPr lang="de-DE" sz="2200" dirty="0"/>
+          </a:p>
+          <a:p>
+            <a:pPr marL="342900" indent="-342900">
+              <a:lnSpc>
+                <a:spcPct val="150000"/>
+              </a:lnSpc>
+              <a:buFont typeface="Symbol" panose="05050102010706020507" pitchFamily="18" charset="2"/>
+              <a:buChar char="-"/>
+            </a:pPr>
+            <a:r>
+              <a:rPr lang="de-DE" sz="2400" dirty="0"/>
+              <a:t>Allgemeines &amp; Sprint V</a:t>
+            </a:r>
+            <a:endParaRPr lang="de-DE" sz="500" dirty="0"/>
+          </a:p>
+          <a:p>
+            <a:pPr marL="342900" indent="-342900">
+              <a:lnSpc>
+                <a:spcPct val="150000"/>
+              </a:lnSpc>
+              <a:buFont typeface="Symbol" panose="05050102010706020507" pitchFamily="18" charset="2"/>
+              <a:buChar char="-"/>
+            </a:pPr>
+            <a:r>
+              <a:rPr lang="de-DE" sz="2400" dirty="0"/>
+              <a:t>Retrospektive</a:t>
+            </a:r>
+          </a:p>
+          <a:p>
+            <a:pPr marL="342900" indent="-342900">
+              <a:lnSpc>
+                <a:spcPct val="150000"/>
+              </a:lnSpc>
+              <a:buFont typeface="Symbol" panose="05050102010706020507" pitchFamily="18" charset="2"/>
+              <a:buChar char="-"/>
+            </a:pPr>
+            <a:r>
+              <a:rPr lang="de-DE" sz="2400" dirty="0"/>
+              <a:t>Technische Details</a:t>
+            </a:r>
+          </a:p>
+          <a:p>
+            <a:pPr marL="342900" indent="-342900">
+              <a:lnSpc>
+                <a:spcPct val="150000"/>
+              </a:lnSpc>
+              <a:buFont typeface="Symbol" panose="05050102010706020507" pitchFamily="18" charset="2"/>
+              <a:buChar char="-"/>
+            </a:pPr>
+            <a:r>
+              <a:rPr lang="de-DE" sz="2400" dirty="0"/>
+              <a:t>Demo</a:t>
+            </a:r>
+          </a:p>
+          <a:p>
+            <a:pPr marL="342900" indent="-342900">
+              <a:lnSpc>
+                <a:spcPct val="150000"/>
+              </a:lnSpc>
+              <a:buFont typeface="Symbol" panose="05050102010706020507" pitchFamily="18" charset="2"/>
+              <a:buChar char="-"/>
+            </a:pPr>
+            <a:r>
+              <a:rPr lang="de-DE" sz="2400" dirty="0"/>
+              <a:t>Wichtige Codeabschnitte</a:t>
+            </a:r>
+          </a:p>
+          <a:p>
+            <a:pPr marL="342900" indent="-342900">
+              <a:lnSpc>
+                <a:spcPct val="150000"/>
+              </a:lnSpc>
+              <a:buFont typeface="Symbol" panose="05050102010706020507" pitchFamily="18" charset="2"/>
+              <a:buChar char="-"/>
+            </a:pPr>
+            <a:r>
+              <a:rPr lang="de-DE" sz="2400" dirty="0"/>
+              <a:t>Dokumentation</a:t>
+            </a:r>
+          </a:p>
+        </p:txBody>
+      </p:sp>
+      <p:pic>
+        <p:nvPicPr>
+          <p:cNvPr id="1028" name="Picture 4">
+            <a:extLst>
+              <a:ext uri="{FF2B5EF4-FFF2-40B4-BE49-F238E27FC236}">
+                <a16:creationId xmlns:a16="http://schemas.microsoft.com/office/drawing/2014/main" id="{C33E6BF7-AA3C-CCC2-094A-AAD012E1D65E}"/>
+              </a:ext>
+            </a:extLst>
+          </p:cNvPr>
+          <p:cNvPicPr>
+            <a:picLocks noChangeAspect="1" noChangeArrowheads="1"/>
+          </p:cNvPicPr>
+          <p:nvPr/>
+        </p:nvPicPr>
+        <p:blipFill>
+          <a:blip r:embed="rId3">
+            <a:extLst>
+              <a:ext uri="{28A0092B-C50C-407E-A947-70E740481C1C}">
+                <a14:useLocalDpi xmlns:a14="http://schemas.microsoft.com/office/drawing/2010/main" val="0"/>
+              </a:ext>
+            </a:extLst>
+          </a:blip>
+          <a:srcRect/>
+          <a:stretch>
+            <a:fillRect/>
+          </a:stretch>
+        </p:blipFill>
+        <p:spPr bwMode="auto">
+          <a:xfrm>
+            <a:off x="4337869" y="1555139"/>
+            <a:ext cx="4240161" cy="4240161"/>
+          </a:xfrm>
+          <a:prstGeom prst="rect">
+            <a:avLst/>
+          </a:prstGeom>
+          <a:noFill/>
+          <a:extLst>
+            <a:ext uri="{909E8E84-426E-40DD-AFC4-6F175D3DCCD1}">
+              <a14:hiddenFill xmlns:a14="http://schemas.microsoft.com/office/drawing/2010/main">
+                <a:solidFill>
+                  <a:srgbClr val="FFFFFF"/>
+                </a:solidFill>
+              </a14:hiddenFill>
+            </a:ext>
+          </a:extLst>
+        </p:spPr>
+      </p:pic>
+    </p:spTree>
+    <p:extLst>
+      <p:ext uri="{BB962C8B-B14F-4D97-AF65-F5344CB8AC3E}">
+        <p14:creationId xmlns:p14="http://schemas.microsoft.com/office/powerpoint/2010/main" val="3040514452"/>
+      </p:ext>
+    </p:extLst>
+  </p:cSld>
+  <p:clrMapOvr>
+    <a:masterClrMapping/>
+  </p:clrMapOvr>
+  <mc:AlternateContent xmlns:mc="http://schemas.openxmlformats.org/markup-compatibility/2006" xmlns:p14="http://schemas.microsoft.com/office/powerpoint/2010/main">
+    <mc:Choice Requires="p14">
+      <p:transition spd="med" p14:dur="700">
+        <p:fade/>
+      </p:transition>
+    </mc:Choice>
+    <mc:Fallback xmlns="">
+      <p:transition spd="med">
+        <p:fade/>
+      </p:transition>
+    </mc:Fallback>
+  </mc:AlternateContent>
+</p:sld>
+</file>
+
+<file path=ppt/slides/slide20.xml><?xml version="1.0" encoding="utf-8"?>
+<p:sld xmlns:a="http://schemas.openxmlformats.org/drawingml/2006/main" xmlns:r="http://schemas.openxmlformats.org/officeDocument/2006/relationships" xmlns:p="http://schemas.openxmlformats.org/presentationml/2006/main">
+  <p:cSld>
+    <p:spTree>
+      <p:nvGrpSpPr>
+        <p:cNvPr id="1" name="">
+          <a:extLst>
+            <a:ext uri="{FF2B5EF4-FFF2-40B4-BE49-F238E27FC236}">
+              <a16:creationId xmlns:a16="http://schemas.microsoft.com/office/drawing/2014/main" id="{C30EC4AF-87D1-CE42-09B5-9EC797B957D1}"/>
+            </a:ext>
+          </a:extLst>
+        </p:cNvPr>
+        <p:cNvGrpSpPr/>
+        <p:nvPr/>
+      </p:nvGrpSpPr>
+      <p:grpSpPr>
+        <a:xfrm>
+          <a:off x="0" y="0"/>
+          <a:ext cx="0" cy="0"/>
+          <a:chOff x="0" y="0"/>
+          <a:chExt cx="0" cy="0"/>
+        </a:xfrm>
+      </p:grpSpPr>
+      <p:sp>
+        <p:nvSpPr>
+          <p:cNvPr id="2" name="Title 1">
+            <a:extLst>
+              <a:ext uri="{FF2B5EF4-FFF2-40B4-BE49-F238E27FC236}">
+                <a16:creationId xmlns:a16="http://schemas.microsoft.com/office/drawing/2014/main" id="{E5D9DC35-5A0F-E698-3A93-DD48A888452C}"/>
+              </a:ext>
+            </a:extLst>
+          </p:cNvPr>
+          <p:cNvSpPr>
+            <a:spLocks noGrp="1"/>
+          </p:cNvSpPr>
+          <p:nvPr>
+            <p:ph type="title"/>
+          </p:nvPr>
+        </p:nvSpPr>
+        <p:spPr>
+          <a:xfrm>
+            <a:off x="1907704" y="365127"/>
+            <a:ext cx="6607646" cy="759618"/>
+          </a:xfrm>
+        </p:spPr>
+        <p:txBody>
+          <a:bodyPr anchor="ctr">
+            <a:normAutofit/>
+          </a:bodyPr>
+          <a:lstStyle/>
+          <a:p>
+            <a:r>
+              <a:rPr lang="de-DE" altLang="en-US"/>
+              <a:t>Wichtige Code-Abschnitte</a:t>
+            </a:r>
+          </a:p>
+        </p:txBody>
+      </p:sp>
+      <p:sp>
+        <p:nvSpPr>
+          <p:cNvPr id="8" name="Footer Placeholder 7">
+            <a:extLst>
+              <a:ext uri="{FF2B5EF4-FFF2-40B4-BE49-F238E27FC236}">
+                <a16:creationId xmlns:a16="http://schemas.microsoft.com/office/drawing/2014/main" id="{2AA4766C-116B-0F05-584C-3E3644D430B6}"/>
+              </a:ext>
+            </a:extLst>
+          </p:cNvPr>
+          <p:cNvSpPr>
+            <a:spLocks noGrp="1"/>
+          </p:cNvSpPr>
+          <p:nvPr>
+            <p:ph type="ftr" sz="quarter" idx="11"/>
+          </p:nvPr>
+        </p:nvSpPr>
+        <p:spPr>
+          <a:xfrm>
+            <a:off x="3028950" y="6356351"/>
+            <a:ext cx="3086100" cy="365125"/>
+          </a:xfrm>
+        </p:spPr>
+        <p:txBody>
+          <a:bodyPr anchor="ctr">
+            <a:normAutofit/>
+          </a:bodyPr>
+          <a:lstStyle/>
+          <a:p>
+            <a:pPr>
+              <a:spcAft>
+                <a:spcPts val="600"/>
+              </a:spcAft>
+              <a:defRPr/>
+            </a:pPr>
+            <a:r>
+              <a:rPr lang="de-DE" dirty="0"/>
+              <a:t>DI(FH) Falkensteiner Markus</a:t>
+            </a:r>
+            <a:endParaRPr lang="de-DE"/>
+          </a:p>
+        </p:txBody>
+      </p:sp>
+      <p:sp>
+        <p:nvSpPr>
+          <p:cNvPr id="9" name="Slide Number Placeholder 8">
+            <a:extLst>
+              <a:ext uri="{FF2B5EF4-FFF2-40B4-BE49-F238E27FC236}">
+                <a16:creationId xmlns:a16="http://schemas.microsoft.com/office/drawing/2014/main" id="{AE59ABF3-CCF5-B6C9-5786-EED3AED432D8}"/>
+              </a:ext>
+            </a:extLst>
+          </p:cNvPr>
+          <p:cNvSpPr>
+            <a:spLocks noGrp="1"/>
+          </p:cNvSpPr>
+          <p:nvPr>
+            <p:ph type="sldNum" sz="quarter" idx="12"/>
+          </p:nvPr>
+        </p:nvSpPr>
+        <p:spPr>
+          <a:xfrm>
+            <a:off x="6457950" y="6356351"/>
+            <a:ext cx="2057400" cy="365125"/>
+          </a:xfrm>
+        </p:spPr>
+        <p:txBody>
+          <a:bodyPr anchor="ctr">
+            <a:normAutofit/>
+          </a:bodyPr>
+          <a:lstStyle/>
+          <a:p>
+            <a:pPr>
+              <a:spcAft>
+                <a:spcPts val="600"/>
+              </a:spcAft>
+              <a:defRPr/>
+            </a:pPr>
+            <a:fld id="{AE4538FE-AEB4-413B-B741-EC1BAEEF6B8F}" type="slidenum">
+              <a:rPr lang="de-AT" smtClean="0"/>
+              <a:pPr>
+                <a:spcAft>
+                  <a:spcPts val="600"/>
+                </a:spcAft>
+                <a:defRPr/>
+              </a:pPr>
+              <a:t>20</a:t>
+            </a:fld>
+            <a:endParaRPr lang="de-AT"/>
+          </a:p>
+        </p:txBody>
+      </p:sp>
+      <p:sp>
+        <p:nvSpPr>
+          <p:cNvPr id="20" name="Textfeld 19">
+            <a:extLst>
+              <a:ext uri="{FF2B5EF4-FFF2-40B4-BE49-F238E27FC236}">
+                <a16:creationId xmlns:a16="http://schemas.microsoft.com/office/drawing/2014/main" id="{22090431-30F3-2497-8E56-E8BEDD306415}"/>
+              </a:ext>
+            </a:extLst>
+          </p:cNvPr>
+          <p:cNvSpPr txBox="1"/>
+          <p:nvPr/>
+        </p:nvSpPr>
+        <p:spPr>
+          <a:xfrm>
+            <a:off x="1474838" y="1868404"/>
+            <a:ext cx="6194323" cy="446276"/>
+          </a:xfrm>
+          <a:prstGeom prst="rect">
+            <a:avLst/>
+          </a:prstGeom>
+          <a:noFill/>
+        </p:spPr>
+        <p:txBody>
+          <a:bodyPr wrap="square" rtlCol="0">
+            <a:spAutoFit/>
+          </a:bodyPr>
+          <a:lstStyle/>
+          <a:p>
+            <a:pPr algn="ctr"/>
+            <a:r>
+              <a:rPr lang="de-DE" sz="2300" b="1" dirty="0"/>
+              <a:t>Zurücksetzen der Variablen bei Logout-Prozess</a:t>
+            </a:r>
+          </a:p>
+        </p:txBody>
+      </p:sp>
+      <p:pic>
+        <p:nvPicPr>
+          <p:cNvPr id="4" name="Grafik 3">
+            <a:extLst>
+              <a:ext uri="{FF2B5EF4-FFF2-40B4-BE49-F238E27FC236}">
+                <a16:creationId xmlns:a16="http://schemas.microsoft.com/office/drawing/2014/main" id="{52B62E32-9325-4CFE-DFE5-60B6987933A7}"/>
+              </a:ext>
+            </a:extLst>
+          </p:cNvPr>
+          <p:cNvPicPr>
+            <a:picLocks noChangeAspect="1"/>
+          </p:cNvPicPr>
+          <p:nvPr/>
+        </p:nvPicPr>
+        <p:blipFill>
+          <a:blip r:embed="rId3"/>
+          <a:stretch>
+            <a:fillRect/>
+          </a:stretch>
+        </p:blipFill>
+        <p:spPr>
+          <a:xfrm>
+            <a:off x="0" y="2462146"/>
+            <a:ext cx="10057938" cy="3402500"/>
+          </a:xfrm>
+          <a:prstGeom prst="rect">
+            <a:avLst/>
+          </a:prstGeom>
+        </p:spPr>
+      </p:pic>
+    </p:spTree>
+    <p:extLst>
+      <p:ext uri="{BB962C8B-B14F-4D97-AF65-F5344CB8AC3E}">
+        <p14:creationId xmlns:p14="http://schemas.microsoft.com/office/powerpoint/2010/main" val="1646292508"/>
+      </p:ext>
+    </p:extLst>
+  </p:cSld>
+  <p:clrMapOvr>
+    <a:masterClrMapping/>
+  </p:clrMapOvr>
+  <mc:AlternateContent xmlns:mc="http://schemas.openxmlformats.org/markup-compatibility/2006" xmlns:p14="http://schemas.microsoft.com/office/powerpoint/2010/main">
+    <mc:Choice Requires="p14">
+      <p:transition spd="med" p14:dur="700">
+        <p:fade/>
+      </p:transition>
+    </mc:Choice>
+    <mc:Fallback xmlns="">
+      <p:transition spd="med">
+        <p:fade/>
+      </p:transition>
+    </mc:Fallback>
+  </mc:AlternateContent>
+</p:sld>
+</file>
+
+<file path=ppt/slides/slide21.xml><?xml version="1.0" encoding="utf-8"?>
+<p:sld xmlns:a="http://schemas.openxmlformats.org/drawingml/2006/main" xmlns:r="http://schemas.openxmlformats.org/officeDocument/2006/relationships" xmlns:p="http://schemas.openxmlformats.org/presentationml/2006/main">
+  <p:cSld>
+    <p:spTree>
+      <p:nvGrpSpPr>
         <p:cNvPr id="1" name=""/>
         <p:cNvGrpSpPr/>
         <p:nvPr/>
@@ -13098,7 +13645,13 @@
       </p:grpSpPr>
       <p:sp>
         <p:nvSpPr>
-          <p:cNvPr id="2" name="Title 1"/>
+          <p:cNvPr id="2" name="Titel 1">
+            <a:extLst>
+              <a:ext uri="{FF2B5EF4-FFF2-40B4-BE49-F238E27FC236}">
+                <a16:creationId xmlns:a16="http://schemas.microsoft.com/office/drawing/2014/main" id="{1A023566-529E-043A-5868-33CEE76861A5}"/>
+              </a:ext>
+            </a:extLst>
+          </p:cNvPr>
           <p:cNvSpPr>
             <a:spLocks noGrp="1"/>
           </p:cNvSpPr>
@@ -13112,17 +13665,21 @@
           <a:lstStyle/>
           <a:p>
             <a:r>
-              <a:rPr lang="de-DE" altLang="en-US" dirty="0">
-                <a:cs typeface="+mj-lt"/>
-              </a:rPr>
-              <a:t>Sprint V Review</a:t>
-            </a:r>
-          </a:p>
-        </p:txBody>
-      </p:sp>
-      <p:sp>
-        <p:nvSpPr>
-          <p:cNvPr id="8" name="Footer Placeholder 7"/>
+              <a:rPr lang="de-AT" b="1"/>
+              <a:t>Vielen Dank für Eure Aufmerksamkeit</a:t>
+            </a:r>
+          </a:p>
+        </p:txBody>
+      </p:sp>
+      <p:sp>
+        <p:nvSpPr>
+          <p:cNvPr id="4" name="Fußzeilenplatzhalter 3">
+            <a:extLst>
+              <a:ext uri="{FF2B5EF4-FFF2-40B4-BE49-F238E27FC236}">
+                <a16:creationId xmlns:a16="http://schemas.microsoft.com/office/drawing/2014/main" id="{D942A9F4-5A19-123D-9935-AB9D4F939C04}"/>
+              </a:ext>
+            </a:extLst>
+          </p:cNvPr>
           <p:cNvSpPr>
             <a:spLocks noGrp="1"/>
           </p:cNvSpPr>
@@ -13139,7 +13696,7 @@
               <a:defRPr/>
             </a:pPr>
             <a:r>
-              <a:rPr lang="de-DE" dirty="0"/>
+              <a:rPr lang="de-DE"/>
               <a:t>DI(FH) Falkensteiner Markus</a:t>
             </a:r>
           </a:p>
@@ -13147,7 +13704,13 @@
       </p:sp>
       <p:sp>
         <p:nvSpPr>
-          <p:cNvPr id="9" name="Slide Number Placeholder 8"/>
+          <p:cNvPr id="5" name="Foliennummernplatzhalter 4">
+            <a:extLst>
+              <a:ext uri="{FF2B5EF4-FFF2-40B4-BE49-F238E27FC236}">
+                <a16:creationId xmlns:a16="http://schemas.microsoft.com/office/drawing/2014/main" id="{A8CC9DD3-4AFF-88C7-B3EE-688A0CE837D8}"/>
+              </a:ext>
+            </a:extLst>
+          </p:cNvPr>
           <p:cNvSpPr>
             <a:spLocks noGrp="1"/>
           </p:cNvSpPr>
@@ -13165,7 +13728,330 @@
             </a:pPr>
             <a:fld id="{AE4538FE-AEB4-413B-B741-EC1BAEEF6B8F}" type="slidenum">
               <a:rPr lang="de-AT" smtClean="0"/>
-              <a:t>2</a:t>
+              <a:t>21</a:t>
+            </a:fld>
+            <a:endParaRPr lang="de-AT"/>
+          </a:p>
+        </p:txBody>
+      </p:sp>
+      <p:pic>
+        <p:nvPicPr>
+          <p:cNvPr id="1026" name="Picture 2" descr="mBot - Mobile01">
+            <a:extLst>
+              <a:ext uri="{FF2B5EF4-FFF2-40B4-BE49-F238E27FC236}">
+                <a16:creationId xmlns:a16="http://schemas.microsoft.com/office/drawing/2014/main" id="{61152454-6CA8-15FF-58A1-3E5CA20CF369}"/>
+              </a:ext>
+            </a:extLst>
+          </p:cNvPr>
+          <p:cNvPicPr>
+            <a:picLocks noGrp="1" noChangeAspect="1" noChangeArrowheads="1"/>
+          </p:cNvPicPr>
+          <p:nvPr>
+            <p:ph idx="1"/>
+          </p:nvPr>
+        </p:nvPicPr>
+        <p:blipFill>
+          <a:blip r:embed="rId2">
+            <a:extLst>
+              <a:ext uri="{28A0092B-C50C-407E-A947-70E740481C1C}">
+                <a14:useLocalDpi xmlns:a14="http://schemas.microsoft.com/office/drawing/2010/main" val="0"/>
+              </a:ext>
+            </a:extLst>
+          </a:blip>
+          <a:srcRect/>
+          <a:stretch>
+            <a:fillRect/>
+          </a:stretch>
+        </p:blipFill>
+        <p:spPr bwMode="auto">
+          <a:xfrm>
+            <a:off x="1185773" y="1556792"/>
+            <a:ext cx="6772453" cy="5072196"/>
+          </a:xfrm>
+          <a:prstGeom prst="rect">
+            <a:avLst/>
+          </a:prstGeom>
+          <a:noFill/>
+          <a:effectLst>
+            <a:softEdge rad="317500"/>
+          </a:effectLst>
+          <a:extLst>
+            <a:ext uri="{909E8E84-426E-40DD-AFC4-6F175D3DCCD1}">
+              <a14:hiddenFill xmlns:a14="http://schemas.microsoft.com/office/drawing/2010/main">
+                <a:solidFill>
+                  <a:srgbClr val="FFFFFF"/>
+                </a:solidFill>
+              </a14:hiddenFill>
+            </a:ext>
+          </a:extLst>
+        </p:spPr>
+      </p:pic>
+      <p:pic>
+        <p:nvPicPr>
+          <p:cNvPr id="6" name="Grafik 5" descr="Ein Bild, das Text, Cartoon, Schwarzweiß enthält.&#10;&#10;KI-generierte Inhalte können fehlerhaft sein.">
+            <a:extLst>
+              <a:ext uri="{FF2B5EF4-FFF2-40B4-BE49-F238E27FC236}">
+                <a16:creationId xmlns:a16="http://schemas.microsoft.com/office/drawing/2014/main" id="{8D1BE6BB-123F-D7F6-E490-2400006F654E}"/>
+              </a:ext>
+            </a:extLst>
+          </p:cNvPr>
+          <p:cNvPicPr>
+            <a:picLocks noChangeAspect="1"/>
+          </p:cNvPicPr>
+          <p:nvPr/>
+        </p:nvPicPr>
+        <p:blipFill>
+          <a:blip r:embed="rId3">
+            <a:extLst>
+              <a:ext uri="{28A0092B-C50C-407E-A947-70E740481C1C}">
+                <a14:useLocalDpi xmlns:a14="http://schemas.microsoft.com/office/drawing/2010/main" val="0"/>
+              </a:ext>
+            </a:extLst>
+          </a:blip>
+          <a:stretch>
+            <a:fillRect/>
+          </a:stretch>
+        </p:blipFill>
+        <p:spPr>
+          <a:xfrm>
+            <a:off x="1188712" y="1556949"/>
+            <a:ext cx="6769514" cy="5074086"/>
+          </a:xfrm>
+          <a:prstGeom prst="rect">
+            <a:avLst/>
+          </a:prstGeom>
+        </p:spPr>
+      </p:pic>
+    </p:spTree>
+    <p:extLst>
+      <p:ext uri="{BB962C8B-B14F-4D97-AF65-F5344CB8AC3E}">
+        <p14:creationId xmlns:p14="http://schemas.microsoft.com/office/powerpoint/2010/main" val="753394004"/>
+      </p:ext>
+    </p:extLst>
+  </p:cSld>
+  <p:clrMapOvr>
+    <a:masterClrMapping/>
+  </p:clrMapOvr>
+  <mc:AlternateContent xmlns:mc="http://schemas.openxmlformats.org/markup-compatibility/2006" xmlns:p14="http://schemas.microsoft.com/office/powerpoint/2010/main">
+    <mc:Choice Requires="p14">
+      <p:transition spd="med" p14:dur="700">
+        <p:fade/>
+      </p:transition>
+    </mc:Choice>
+    <mc:Fallback xmlns="">
+      <p:transition spd="med">
+        <p:fade/>
+      </p:transition>
+    </mc:Fallback>
+  </mc:AlternateContent>
+  <p:timing>
+    <p:tnLst>
+      <p:par>
+        <p:cTn id="1" dur="indefinite" restart="never" nodeType="tmRoot">
+          <p:childTnLst>
+            <p:seq concurrent="1" nextAc="seek">
+              <p:cTn id="2" dur="indefinite" nodeType="mainSeq">
+                <p:childTnLst>
+                  <p:par>
+                    <p:cTn id="3" fill="hold">
+                      <p:stCondLst>
+                        <p:cond delay="indefinite"/>
+                      </p:stCondLst>
+                      <p:childTnLst>
+                        <p:par>
+                          <p:cTn id="4" fill="hold">
+                            <p:stCondLst>
+                              <p:cond delay="0"/>
+                            </p:stCondLst>
+                            <p:childTnLst>
+                              <p:par>
+                                <p:cTn id="5" presetID="10" presetClass="entr" presetSubtype="0" fill="hold" nodeType="clickEffect">
+                                  <p:stCondLst>
+                                    <p:cond delay="0"/>
+                                  </p:stCondLst>
+                                  <p:childTnLst>
+                                    <p:set>
+                                      <p:cBhvr>
+                                        <p:cTn id="6" dur="1" fill="hold">
+                                          <p:stCondLst>
+                                            <p:cond delay="0"/>
+                                          </p:stCondLst>
+                                        </p:cTn>
+                                        <p:tgtEl>
+                                          <p:spTgt spid="1026"/>
+                                        </p:tgtEl>
+                                        <p:attrNameLst>
+                                          <p:attrName>style.visibility</p:attrName>
+                                        </p:attrNameLst>
+                                      </p:cBhvr>
+                                      <p:to>
+                                        <p:strVal val="visible"/>
+                                      </p:to>
+                                    </p:set>
+                                    <p:animEffect transition="in" filter="fade">
+                                      <p:cBhvr>
+                                        <p:cTn id="7" dur="1750"/>
+                                        <p:tgtEl>
+                                          <p:spTgt spid="1026"/>
+                                        </p:tgtEl>
+                                      </p:cBhvr>
+                                    </p:animEffect>
+                                  </p:childTnLst>
+                                </p:cTn>
+                              </p:par>
+                              <p:par>
+                                <p:cTn id="8" presetID="10" presetClass="entr" presetSubtype="0" fill="hold" nodeType="withEffect">
+                                  <p:stCondLst>
+                                    <p:cond delay="0"/>
+                                  </p:stCondLst>
+                                  <p:childTnLst>
+                                    <p:set>
+                                      <p:cBhvr>
+                                        <p:cTn id="9" dur="1" fill="hold">
+                                          <p:stCondLst>
+                                            <p:cond delay="0"/>
+                                          </p:stCondLst>
+                                        </p:cTn>
+                                        <p:tgtEl>
+                                          <p:spTgt spid="6"/>
+                                        </p:tgtEl>
+                                        <p:attrNameLst>
+                                          <p:attrName>style.visibility</p:attrName>
+                                        </p:attrNameLst>
+                                      </p:cBhvr>
+                                      <p:to>
+                                        <p:strVal val="visible"/>
+                                      </p:to>
+                                    </p:set>
+                                    <p:animEffect transition="in" filter="fade">
+                                      <p:cBhvr>
+                                        <p:cTn id="10" dur="1750"/>
+                                        <p:tgtEl>
+                                          <p:spTgt spid="6"/>
+                                        </p:tgtEl>
+                                      </p:cBhvr>
+                                    </p:animEffect>
+                                  </p:childTnLst>
+                                </p:cTn>
+                              </p:par>
+                            </p:childTnLst>
+                          </p:cTn>
+                        </p:par>
+                      </p:childTnLst>
+                    </p:cTn>
+                  </p:par>
+                </p:childTnLst>
+              </p:cTn>
+              <p:prevCondLst>
+                <p:cond evt="onPrev" delay="0">
+                  <p:tgtEl>
+                    <p:sldTgt/>
+                  </p:tgtEl>
+                </p:cond>
+              </p:prevCondLst>
+              <p:nextCondLst>
+                <p:cond evt="onNext" delay="0">
+                  <p:tgtEl>
+                    <p:sldTgt/>
+                  </p:tgtEl>
+                </p:cond>
+              </p:nextCondLst>
+            </p:seq>
+          </p:childTnLst>
+        </p:cTn>
+      </p:par>
+    </p:tnLst>
+  </p:timing>
+</p:sld>
+</file>
+
+<file path=ppt/slides/slide3.xml><?xml version="1.0" encoding="utf-8"?>
+<p:sld xmlns:a="http://schemas.openxmlformats.org/drawingml/2006/main" xmlns:r="http://schemas.openxmlformats.org/officeDocument/2006/relationships" xmlns:p="http://schemas.openxmlformats.org/presentationml/2006/main">
+  <p:cSld>
+    <p:spTree>
+      <p:nvGrpSpPr>
+        <p:cNvPr id="1" name=""/>
+        <p:cNvGrpSpPr/>
+        <p:nvPr/>
+      </p:nvGrpSpPr>
+      <p:grpSpPr>
+        <a:xfrm>
+          <a:off x="0" y="0"/>
+          <a:ext cx="0" cy="0"/>
+          <a:chOff x="0" y="0"/>
+          <a:chExt cx="0" cy="0"/>
+        </a:xfrm>
+      </p:grpSpPr>
+      <p:sp>
+        <p:nvSpPr>
+          <p:cNvPr id="2" name="Title 1"/>
+          <p:cNvSpPr>
+            <a:spLocks noGrp="1"/>
+          </p:cNvSpPr>
+          <p:nvPr>
+            <p:ph type="title"/>
+          </p:nvPr>
+        </p:nvSpPr>
+        <p:spPr/>
+        <p:txBody>
+          <a:bodyPr/>
+          <a:lstStyle/>
+          <a:p>
+            <a:r>
+              <a:rPr lang="de-DE" altLang="en-US" dirty="0">
+                <a:cs typeface="+mj-lt"/>
+              </a:rPr>
+              <a:t>Sprint V Review</a:t>
+            </a:r>
+          </a:p>
+        </p:txBody>
+      </p:sp>
+      <p:sp>
+        <p:nvSpPr>
+          <p:cNvPr id="8" name="Footer Placeholder 7"/>
+          <p:cNvSpPr>
+            <a:spLocks noGrp="1"/>
+          </p:cNvSpPr>
+          <p:nvPr>
+            <p:ph type="ftr" sz="quarter" idx="11"/>
+          </p:nvPr>
+        </p:nvSpPr>
+        <p:spPr/>
+        <p:txBody>
+          <a:bodyPr/>
+          <a:lstStyle/>
+          <a:p>
+            <a:pPr>
+              <a:defRPr/>
+            </a:pPr>
+            <a:r>
+              <a:rPr lang="de-DE" dirty="0"/>
+              <a:t>DI(FH) Falkensteiner Markus</a:t>
+            </a:r>
+          </a:p>
+        </p:txBody>
+      </p:sp>
+      <p:sp>
+        <p:nvSpPr>
+          <p:cNvPr id="9" name="Slide Number Placeholder 8"/>
+          <p:cNvSpPr>
+            <a:spLocks noGrp="1"/>
+          </p:cNvSpPr>
+          <p:nvPr>
+            <p:ph type="sldNum" sz="quarter" idx="12"/>
+          </p:nvPr>
+        </p:nvSpPr>
+        <p:spPr/>
+        <p:txBody>
+          <a:bodyPr/>
+          <a:lstStyle/>
+          <a:p>
+            <a:pPr>
+              <a:defRPr/>
+            </a:pPr>
+            <a:fld id="{AE4538FE-AEB4-413B-B741-EC1BAEEF6B8F}" type="slidenum">
+              <a:rPr lang="de-AT" smtClean="0"/>
+              <a:t>3</a:t>
             </a:fld>
             <a:endParaRPr lang="de-AT"/>
           </a:p>
@@ -13550,585 +14436,7 @@
 </p:sld>
 </file>
 
-<file path=ppt/slides/slide20.xml><?xml version="1.0" encoding="utf-8"?>
-<p:sld xmlns:a="http://schemas.openxmlformats.org/drawingml/2006/main" xmlns:r="http://schemas.openxmlformats.org/officeDocument/2006/relationships" xmlns:p="http://schemas.openxmlformats.org/presentationml/2006/main">
-  <p:cSld>
-    <p:spTree>
-      <p:nvGrpSpPr>
-        <p:cNvPr id="1" name="">
-          <a:extLst>
-            <a:ext uri="{FF2B5EF4-FFF2-40B4-BE49-F238E27FC236}">
-              <a16:creationId xmlns:a16="http://schemas.microsoft.com/office/drawing/2014/main" id="{C30EC4AF-87D1-CE42-09B5-9EC797B957D1}"/>
-            </a:ext>
-          </a:extLst>
-        </p:cNvPr>
-        <p:cNvGrpSpPr/>
-        <p:nvPr/>
-      </p:nvGrpSpPr>
-      <p:grpSpPr>
-        <a:xfrm>
-          <a:off x="0" y="0"/>
-          <a:ext cx="0" cy="0"/>
-          <a:chOff x="0" y="0"/>
-          <a:chExt cx="0" cy="0"/>
-        </a:xfrm>
-      </p:grpSpPr>
-      <p:sp>
-        <p:nvSpPr>
-          <p:cNvPr id="2" name="Title 1">
-            <a:extLst>
-              <a:ext uri="{FF2B5EF4-FFF2-40B4-BE49-F238E27FC236}">
-                <a16:creationId xmlns:a16="http://schemas.microsoft.com/office/drawing/2014/main" id="{E5D9DC35-5A0F-E698-3A93-DD48A888452C}"/>
-              </a:ext>
-            </a:extLst>
-          </p:cNvPr>
-          <p:cNvSpPr>
-            <a:spLocks noGrp="1"/>
-          </p:cNvSpPr>
-          <p:nvPr>
-            <p:ph type="title"/>
-          </p:nvPr>
-        </p:nvSpPr>
-        <p:spPr>
-          <a:xfrm>
-            <a:off x="1907704" y="365127"/>
-            <a:ext cx="6607646" cy="759618"/>
-          </a:xfrm>
-        </p:spPr>
-        <p:txBody>
-          <a:bodyPr anchor="ctr">
-            <a:normAutofit/>
-          </a:bodyPr>
-          <a:lstStyle/>
-          <a:p>
-            <a:r>
-              <a:rPr lang="de-DE" altLang="en-US"/>
-              <a:t>Wichtige Code-Abschnitte</a:t>
-            </a:r>
-          </a:p>
-        </p:txBody>
-      </p:sp>
-      <p:sp>
-        <p:nvSpPr>
-          <p:cNvPr id="8" name="Footer Placeholder 7">
-            <a:extLst>
-              <a:ext uri="{FF2B5EF4-FFF2-40B4-BE49-F238E27FC236}">
-                <a16:creationId xmlns:a16="http://schemas.microsoft.com/office/drawing/2014/main" id="{2AA4766C-116B-0F05-584C-3E3644D430B6}"/>
-              </a:ext>
-            </a:extLst>
-          </p:cNvPr>
-          <p:cNvSpPr>
-            <a:spLocks noGrp="1"/>
-          </p:cNvSpPr>
-          <p:nvPr>
-            <p:ph type="ftr" sz="quarter" idx="11"/>
-          </p:nvPr>
-        </p:nvSpPr>
-        <p:spPr>
-          <a:xfrm>
-            <a:off x="3028950" y="6356351"/>
-            <a:ext cx="3086100" cy="365125"/>
-          </a:xfrm>
-        </p:spPr>
-        <p:txBody>
-          <a:bodyPr anchor="ctr">
-            <a:normAutofit/>
-          </a:bodyPr>
-          <a:lstStyle/>
-          <a:p>
-            <a:pPr>
-              <a:spcAft>
-                <a:spcPts val="600"/>
-              </a:spcAft>
-              <a:defRPr/>
-            </a:pPr>
-            <a:r>
-              <a:rPr lang="de-DE" dirty="0"/>
-              <a:t>DI(FH) Falkensteiner Markus</a:t>
-            </a:r>
-            <a:endParaRPr lang="de-DE"/>
-          </a:p>
-        </p:txBody>
-      </p:sp>
-      <p:sp>
-        <p:nvSpPr>
-          <p:cNvPr id="9" name="Slide Number Placeholder 8">
-            <a:extLst>
-              <a:ext uri="{FF2B5EF4-FFF2-40B4-BE49-F238E27FC236}">
-                <a16:creationId xmlns:a16="http://schemas.microsoft.com/office/drawing/2014/main" id="{AE59ABF3-CCF5-B6C9-5786-EED3AED432D8}"/>
-              </a:ext>
-            </a:extLst>
-          </p:cNvPr>
-          <p:cNvSpPr>
-            <a:spLocks noGrp="1"/>
-          </p:cNvSpPr>
-          <p:nvPr>
-            <p:ph type="sldNum" sz="quarter" idx="12"/>
-          </p:nvPr>
-        </p:nvSpPr>
-        <p:spPr>
-          <a:xfrm>
-            <a:off x="6457950" y="6356351"/>
-            <a:ext cx="2057400" cy="365125"/>
-          </a:xfrm>
-        </p:spPr>
-        <p:txBody>
-          <a:bodyPr anchor="ctr">
-            <a:normAutofit/>
-          </a:bodyPr>
-          <a:lstStyle/>
-          <a:p>
-            <a:pPr>
-              <a:spcAft>
-                <a:spcPts val="600"/>
-              </a:spcAft>
-              <a:defRPr/>
-            </a:pPr>
-            <a:fld id="{AE4538FE-AEB4-413B-B741-EC1BAEEF6B8F}" type="slidenum">
-              <a:rPr lang="de-AT" smtClean="0"/>
-              <a:pPr>
-                <a:spcAft>
-                  <a:spcPts val="600"/>
-                </a:spcAft>
-                <a:defRPr/>
-              </a:pPr>
-              <a:t>20</a:t>
-            </a:fld>
-            <a:endParaRPr lang="de-AT"/>
-          </a:p>
-        </p:txBody>
-      </p:sp>
-      <p:sp>
-        <p:nvSpPr>
-          <p:cNvPr id="20" name="Textfeld 19">
-            <a:extLst>
-              <a:ext uri="{FF2B5EF4-FFF2-40B4-BE49-F238E27FC236}">
-                <a16:creationId xmlns:a16="http://schemas.microsoft.com/office/drawing/2014/main" id="{22090431-30F3-2497-8E56-E8BEDD306415}"/>
-              </a:ext>
-            </a:extLst>
-          </p:cNvPr>
-          <p:cNvSpPr txBox="1"/>
-          <p:nvPr/>
-        </p:nvSpPr>
-        <p:spPr>
-          <a:xfrm>
-            <a:off x="1474838" y="1868404"/>
-            <a:ext cx="6194323" cy="446276"/>
-          </a:xfrm>
-          <a:prstGeom prst="rect">
-            <a:avLst/>
-          </a:prstGeom>
-          <a:noFill/>
-        </p:spPr>
-        <p:txBody>
-          <a:bodyPr wrap="square" rtlCol="0">
-            <a:spAutoFit/>
-          </a:bodyPr>
-          <a:lstStyle/>
-          <a:p>
-            <a:pPr algn="ctr"/>
-            <a:r>
-              <a:rPr lang="de-DE" sz="2300" b="1" dirty="0"/>
-              <a:t>Zurücksetzen der Variablen bei Logout-Prozess</a:t>
-            </a:r>
-          </a:p>
-        </p:txBody>
-      </p:sp>
-      <p:pic>
-        <p:nvPicPr>
-          <p:cNvPr id="4" name="Grafik 3">
-            <a:extLst>
-              <a:ext uri="{FF2B5EF4-FFF2-40B4-BE49-F238E27FC236}">
-                <a16:creationId xmlns:a16="http://schemas.microsoft.com/office/drawing/2014/main" id="{52B62E32-9325-4CFE-DFE5-60B6987933A7}"/>
-              </a:ext>
-            </a:extLst>
-          </p:cNvPr>
-          <p:cNvPicPr>
-            <a:picLocks noChangeAspect="1"/>
-          </p:cNvPicPr>
-          <p:nvPr/>
-        </p:nvPicPr>
-        <p:blipFill>
-          <a:blip r:embed="rId3"/>
-          <a:stretch>
-            <a:fillRect/>
-          </a:stretch>
-        </p:blipFill>
-        <p:spPr>
-          <a:xfrm>
-            <a:off x="0" y="2462146"/>
-            <a:ext cx="10057938" cy="3402500"/>
-          </a:xfrm>
-          <a:prstGeom prst="rect">
-            <a:avLst/>
-          </a:prstGeom>
-        </p:spPr>
-      </p:pic>
-    </p:spTree>
-    <p:extLst>
-      <p:ext uri="{BB962C8B-B14F-4D97-AF65-F5344CB8AC3E}">
-        <p14:creationId xmlns:p14="http://schemas.microsoft.com/office/powerpoint/2010/main" val="1646292508"/>
-      </p:ext>
-    </p:extLst>
-  </p:cSld>
-  <p:clrMapOvr>
-    <a:masterClrMapping/>
-  </p:clrMapOvr>
-  <mc:AlternateContent xmlns:mc="http://schemas.openxmlformats.org/markup-compatibility/2006" xmlns:p14="http://schemas.microsoft.com/office/powerpoint/2010/main">
-    <mc:Choice Requires="p14">
-      <p:transition spd="med" p14:dur="700">
-        <p:fade/>
-      </p:transition>
-    </mc:Choice>
-    <mc:Fallback xmlns="">
-      <p:transition spd="med">
-        <p:fade/>
-      </p:transition>
-    </mc:Fallback>
-  </mc:AlternateContent>
-</p:sld>
-</file>
-
-<file path=ppt/slides/slide21.xml><?xml version="1.0" encoding="utf-8"?>
-<p:sld xmlns:a="http://schemas.openxmlformats.org/drawingml/2006/main" xmlns:r="http://schemas.openxmlformats.org/officeDocument/2006/relationships" xmlns:p="http://schemas.openxmlformats.org/presentationml/2006/main">
-  <p:cSld>
-    <p:spTree>
-      <p:nvGrpSpPr>
-        <p:cNvPr id="1" name=""/>
-        <p:cNvGrpSpPr/>
-        <p:nvPr/>
-      </p:nvGrpSpPr>
-      <p:grpSpPr>
-        <a:xfrm>
-          <a:off x="0" y="0"/>
-          <a:ext cx="0" cy="0"/>
-          <a:chOff x="0" y="0"/>
-          <a:chExt cx="0" cy="0"/>
-        </a:xfrm>
-      </p:grpSpPr>
-      <p:sp>
-        <p:nvSpPr>
-          <p:cNvPr id="2" name="Titel 1">
-            <a:extLst>
-              <a:ext uri="{FF2B5EF4-FFF2-40B4-BE49-F238E27FC236}">
-                <a16:creationId xmlns:a16="http://schemas.microsoft.com/office/drawing/2014/main" id="{1A023566-529E-043A-5868-33CEE76861A5}"/>
-              </a:ext>
-            </a:extLst>
-          </p:cNvPr>
-          <p:cNvSpPr>
-            <a:spLocks noGrp="1"/>
-          </p:cNvSpPr>
-          <p:nvPr>
-            <p:ph type="title"/>
-          </p:nvPr>
-        </p:nvSpPr>
-        <p:spPr/>
-        <p:txBody>
-          <a:bodyPr/>
-          <a:lstStyle/>
-          <a:p>
-            <a:r>
-              <a:rPr lang="de-AT" b="1"/>
-              <a:t>Vielen Dank für Eure Aufmerksamkeit</a:t>
-            </a:r>
-          </a:p>
-        </p:txBody>
-      </p:sp>
-      <p:sp>
-        <p:nvSpPr>
-          <p:cNvPr id="4" name="Fußzeilenplatzhalter 3">
-            <a:extLst>
-              <a:ext uri="{FF2B5EF4-FFF2-40B4-BE49-F238E27FC236}">
-                <a16:creationId xmlns:a16="http://schemas.microsoft.com/office/drawing/2014/main" id="{D942A9F4-5A19-123D-9935-AB9D4F939C04}"/>
-              </a:ext>
-            </a:extLst>
-          </p:cNvPr>
-          <p:cNvSpPr>
-            <a:spLocks noGrp="1"/>
-          </p:cNvSpPr>
-          <p:nvPr>
-            <p:ph type="ftr" sz="quarter" idx="11"/>
-          </p:nvPr>
-        </p:nvSpPr>
-        <p:spPr/>
-        <p:txBody>
-          <a:bodyPr/>
-          <a:lstStyle/>
-          <a:p>
-            <a:pPr>
-              <a:defRPr/>
-            </a:pPr>
-            <a:r>
-              <a:rPr lang="de-DE"/>
-              <a:t>DI(FH) Falkensteiner Markus</a:t>
-            </a:r>
-          </a:p>
-        </p:txBody>
-      </p:sp>
-      <p:sp>
-        <p:nvSpPr>
-          <p:cNvPr id="5" name="Foliennummernplatzhalter 4">
-            <a:extLst>
-              <a:ext uri="{FF2B5EF4-FFF2-40B4-BE49-F238E27FC236}">
-                <a16:creationId xmlns:a16="http://schemas.microsoft.com/office/drawing/2014/main" id="{A8CC9DD3-4AFF-88C7-B3EE-688A0CE837D8}"/>
-              </a:ext>
-            </a:extLst>
-          </p:cNvPr>
-          <p:cNvSpPr>
-            <a:spLocks noGrp="1"/>
-          </p:cNvSpPr>
-          <p:nvPr>
-            <p:ph type="sldNum" sz="quarter" idx="12"/>
-          </p:nvPr>
-        </p:nvSpPr>
-        <p:spPr/>
-        <p:txBody>
-          <a:bodyPr/>
-          <a:lstStyle/>
-          <a:p>
-            <a:pPr>
-              <a:defRPr/>
-            </a:pPr>
-            <a:fld id="{AE4538FE-AEB4-413B-B741-EC1BAEEF6B8F}" type="slidenum">
-              <a:rPr lang="de-AT" smtClean="0"/>
-              <a:t>21</a:t>
-            </a:fld>
-            <a:endParaRPr lang="de-AT"/>
-          </a:p>
-        </p:txBody>
-      </p:sp>
-      <p:pic>
-        <p:nvPicPr>
-          <p:cNvPr id="1026" name="Picture 2" descr="mBot - Mobile01">
-            <a:extLst>
-              <a:ext uri="{FF2B5EF4-FFF2-40B4-BE49-F238E27FC236}">
-                <a16:creationId xmlns:a16="http://schemas.microsoft.com/office/drawing/2014/main" id="{61152454-6CA8-15FF-58A1-3E5CA20CF369}"/>
-              </a:ext>
-            </a:extLst>
-          </p:cNvPr>
-          <p:cNvPicPr>
-            <a:picLocks noGrp="1" noChangeAspect="1" noChangeArrowheads="1"/>
-          </p:cNvPicPr>
-          <p:nvPr>
-            <p:ph idx="1"/>
-          </p:nvPr>
-        </p:nvPicPr>
-        <p:blipFill>
-          <a:blip r:embed="rId2">
-            <a:extLst>
-              <a:ext uri="{28A0092B-C50C-407E-A947-70E740481C1C}">
-                <a14:useLocalDpi xmlns:a14="http://schemas.microsoft.com/office/drawing/2010/main" val="0"/>
-              </a:ext>
-            </a:extLst>
-          </a:blip>
-          <a:srcRect/>
-          <a:stretch>
-            <a:fillRect/>
-          </a:stretch>
-        </p:blipFill>
-        <p:spPr bwMode="auto">
-          <a:xfrm>
-            <a:off x="1185773" y="1556792"/>
-            <a:ext cx="6772453" cy="5072196"/>
-          </a:xfrm>
-          <a:prstGeom prst="rect">
-            <a:avLst/>
-          </a:prstGeom>
-          <a:noFill/>
-          <a:effectLst>
-            <a:softEdge rad="317500"/>
-          </a:effectLst>
-          <a:extLst>
-            <a:ext uri="{909E8E84-426E-40DD-AFC4-6F175D3DCCD1}">
-              <a14:hiddenFill xmlns:a14="http://schemas.microsoft.com/office/drawing/2010/main">
-                <a:solidFill>
-                  <a:srgbClr val="FFFFFF"/>
-                </a:solidFill>
-              </a14:hiddenFill>
-            </a:ext>
-          </a:extLst>
-        </p:spPr>
-      </p:pic>
-      <p:pic>
-        <p:nvPicPr>
-          <p:cNvPr id="6" name="Grafik 5" descr="Ein Bild, das Text, Cartoon, Schwarzweiß enthält.&#10;&#10;KI-generierte Inhalte können fehlerhaft sein.">
-            <a:extLst>
-              <a:ext uri="{FF2B5EF4-FFF2-40B4-BE49-F238E27FC236}">
-                <a16:creationId xmlns:a16="http://schemas.microsoft.com/office/drawing/2014/main" id="{8D1BE6BB-123F-D7F6-E490-2400006F654E}"/>
-              </a:ext>
-            </a:extLst>
-          </p:cNvPr>
-          <p:cNvPicPr>
-            <a:picLocks noChangeAspect="1"/>
-          </p:cNvPicPr>
-          <p:nvPr/>
-        </p:nvPicPr>
-        <p:blipFill>
-          <a:blip r:embed="rId3">
-            <a:extLst>
-              <a:ext uri="{28A0092B-C50C-407E-A947-70E740481C1C}">
-                <a14:useLocalDpi xmlns:a14="http://schemas.microsoft.com/office/drawing/2010/main" val="0"/>
-              </a:ext>
-            </a:extLst>
-          </a:blip>
-          <a:stretch>
-            <a:fillRect/>
-          </a:stretch>
-        </p:blipFill>
-        <p:spPr>
-          <a:xfrm>
-            <a:off x="1188712" y="1556949"/>
-            <a:ext cx="6769514" cy="5074086"/>
-          </a:xfrm>
-          <a:prstGeom prst="rect">
-            <a:avLst/>
-          </a:prstGeom>
-        </p:spPr>
-      </p:pic>
-    </p:spTree>
-    <p:extLst>
-      <p:ext uri="{BB962C8B-B14F-4D97-AF65-F5344CB8AC3E}">
-        <p14:creationId xmlns:p14="http://schemas.microsoft.com/office/powerpoint/2010/main" val="753394004"/>
-      </p:ext>
-    </p:extLst>
-  </p:cSld>
-  <p:clrMapOvr>
-    <a:masterClrMapping/>
-  </p:clrMapOvr>
-  <mc:AlternateContent xmlns:mc="http://schemas.openxmlformats.org/markup-compatibility/2006" xmlns:p14="http://schemas.microsoft.com/office/powerpoint/2010/main">
-    <mc:Choice Requires="p14">
-      <p:transition spd="med" p14:dur="700">
-        <p:fade/>
-      </p:transition>
-    </mc:Choice>
-    <mc:Fallback xmlns="">
-      <p:transition spd="med">
-        <p:fade/>
-      </p:transition>
-    </mc:Fallback>
-  </mc:AlternateContent>
-  <p:timing>
-    <p:tnLst>
-      <p:par>
-        <p:cTn id="1" dur="indefinite" restart="never" nodeType="tmRoot">
-          <p:childTnLst>
-            <p:seq concurrent="1" nextAc="seek">
-              <p:cTn id="2" dur="indefinite" nodeType="mainSeq">
-                <p:childTnLst>
-                  <p:par>
-                    <p:cTn id="3" fill="hold">
-                      <p:stCondLst>
-                        <p:cond delay="indefinite"/>
-                      </p:stCondLst>
-                      <p:childTnLst>
-                        <p:par>
-                          <p:cTn id="4" fill="hold">
-                            <p:stCondLst>
-                              <p:cond delay="0"/>
-                            </p:stCondLst>
-                            <p:childTnLst>
-                              <p:par>
-                                <p:cTn id="5" presetID="10" presetClass="entr" presetSubtype="0" fill="hold" nodeType="clickEffect">
-                                  <p:stCondLst>
-                                    <p:cond delay="0"/>
-                                  </p:stCondLst>
-                                  <p:childTnLst>
-                                    <p:set>
-                                      <p:cBhvr>
-                                        <p:cTn id="6" dur="1" fill="hold">
-                                          <p:stCondLst>
-                                            <p:cond delay="0"/>
-                                          </p:stCondLst>
-                                        </p:cTn>
-                                        <p:tgtEl>
-                                          <p:spTgt spid="1026"/>
-                                        </p:tgtEl>
-                                        <p:attrNameLst>
-                                          <p:attrName>style.visibility</p:attrName>
-                                        </p:attrNameLst>
-                                      </p:cBhvr>
-                                      <p:to>
-                                        <p:strVal val="visible"/>
-                                      </p:to>
-                                    </p:set>
-                                    <p:animEffect transition="in" filter="fade">
-                                      <p:cBhvr>
-                                        <p:cTn id="7" dur="1750"/>
-                                        <p:tgtEl>
-                                          <p:spTgt spid="1026"/>
-                                        </p:tgtEl>
-                                      </p:cBhvr>
-                                    </p:animEffect>
-                                  </p:childTnLst>
-                                </p:cTn>
-                              </p:par>
-                              <p:par>
-                                <p:cTn id="8" presetID="10" presetClass="entr" presetSubtype="0" fill="hold" nodeType="withEffect">
-                                  <p:stCondLst>
-                                    <p:cond delay="0"/>
-                                  </p:stCondLst>
-                                  <p:childTnLst>
-                                    <p:set>
-                                      <p:cBhvr>
-                                        <p:cTn id="9" dur="1" fill="hold">
-                                          <p:stCondLst>
-                                            <p:cond delay="0"/>
-                                          </p:stCondLst>
-                                        </p:cTn>
-                                        <p:tgtEl>
-                                          <p:spTgt spid="6"/>
-                                        </p:tgtEl>
-                                        <p:attrNameLst>
-                                          <p:attrName>style.visibility</p:attrName>
-                                        </p:attrNameLst>
-                                      </p:cBhvr>
-                                      <p:to>
-                                        <p:strVal val="visible"/>
-                                      </p:to>
-                                    </p:set>
-                                    <p:animEffect transition="in" filter="fade">
-                                      <p:cBhvr>
-                                        <p:cTn id="10" dur="1750"/>
-                                        <p:tgtEl>
-                                          <p:spTgt spid="6"/>
-                                        </p:tgtEl>
-                                      </p:cBhvr>
-                                    </p:animEffect>
-                                  </p:childTnLst>
-                                </p:cTn>
-                              </p:par>
-                            </p:childTnLst>
-                          </p:cTn>
-                        </p:par>
-                      </p:childTnLst>
-                    </p:cTn>
-                  </p:par>
-                </p:childTnLst>
-              </p:cTn>
-              <p:prevCondLst>
-                <p:cond evt="onPrev" delay="0">
-                  <p:tgtEl>
-                    <p:sldTgt/>
-                  </p:tgtEl>
-                </p:cond>
-              </p:prevCondLst>
-              <p:nextCondLst>
-                <p:cond evt="onNext" delay="0">
-                  <p:tgtEl>
-                    <p:sldTgt/>
-                  </p:tgtEl>
-                </p:cond>
-              </p:nextCondLst>
-            </p:seq>
-          </p:childTnLst>
-        </p:cTn>
-      </p:par>
-    </p:tnLst>
-  </p:timing>
-</p:sld>
-</file>
-
-<file path=ppt/slides/slide3.xml><?xml version="1.0" encoding="utf-8"?>
+<file path=ppt/slides/slide4.xml><?xml version="1.0" encoding="utf-8"?>
 <p:sld xmlns:a="http://schemas.openxmlformats.org/drawingml/2006/main" xmlns:r="http://schemas.openxmlformats.org/officeDocument/2006/relationships" xmlns:p="http://schemas.openxmlformats.org/presentationml/2006/main">
   <p:cSld>
     <p:spTree>
@@ -14238,7 +14546,7 @@
             </a:pPr>
             <a:fld id="{AE4538FE-AEB4-413B-B741-EC1BAEEF6B8F}" type="slidenum">
               <a:rPr lang="de-AT" smtClean="0"/>
-              <a:t>3</a:t>
+              <a:t>4</a:t>
             </a:fld>
             <a:endParaRPr lang="de-AT"/>
           </a:p>
@@ -14365,273 +14673,6 @@
     <p:extLst>
       <p:ext uri="{BB962C8B-B14F-4D97-AF65-F5344CB8AC3E}">
         <p14:creationId xmlns:p14="http://schemas.microsoft.com/office/powerpoint/2010/main" val="2169003669"/>
-      </p:ext>
-    </p:extLst>
-  </p:cSld>
-  <p:clrMapOvr>
-    <a:masterClrMapping/>
-  </p:clrMapOvr>
-  <mc:AlternateContent xmlns:mc="http://schemas.openxmlformats.org/markup-compatibility/2006" xmlns:p14="http://schemas.microsoft.com/office/powerpoint/2010/main">
-    <mc:Choice Requires="p14">
-      <p:transition spd="med" p14:dur="700">
-        <p:fade/>
-      </p:transition>
-    </mc:Choice>
-    <mc:Fallback xmlns="">
-      <p:transition spd="med">
-        <p:fade/>
-      </p:transition>
-    </mc:Fallback>
-  </mc:AlternateContent>
-</p:sld>
-</file>
-
-<file path=ppt/slides/slide4.xml><?xml version="1.0" encoding="utf-8"?>
-<p:sld xmlns:a="http://schemas.openxmlformats.org/drawingml/2006/main" xmlns:r="http://schemas.openxmlformats.org/officeDocument/2006/relationships" xmlns:p="http://schemas.openxmlformats.org/presentationml/2006/main">
-  <p:cSld>
-    <p:spTree>
-      <p:nvGrpSpPr>
-        <p:cNvPr id="1" name="">
-          <a:extLst>
-            <a:ext uri="{FF2B5EF4-FFF2-40B4-BE49-F238E27FC236}">
-              <a16:creationId xmlns:a16="http://schemas.microsoft.com/office/drawing/2014/main" id="{98AA9F47-B925-7544-B400-E45083A91847}"/>
-            </a:ext>
-          </a:extLst>
-        </p:cNvPr>
-        <p:cNvGrpSpPr/>
-        <p:nvPr/>
-      </p:nvGrpSpPr>
-      <p:grpSpPr>
-        <a:xfrm>
-          <a:off x="0" y="0"/>
-          <a:ext cx="0" cy="0"/>
-          <a:chOff x="0" y="0"/>
-          <a:chExt cx="0" cy="0"/>
-        </a:xfrm>
-      </p:grpSpPr>
-      <p:sp>
-        <p:nvSpPr>
-          <p:cNvPr id="2" name="Title 1">
-            <a:extLst>
-              <a:ext uri="{FF2B5EF4-FFF2-40B4-BE49-F238E27FC236}">
-                <a16:creationId xmlns:a16="http://schemas.microsoft.com/office/drawing/2014/main" id="{64FD2EBF-D2EA-1DE7-EA9B-F4653745BEFD}"/>
-              </a:ext>
-            </a:extLst>
-          </p:cNvPr>
-          <p:cNvSpPr>
-            <a:spLocks noGrp="1"/>
-          </p:cNvSpPr>
-          <p:nvPr>
-            <p:ph type="title"/>
-          </p:nvPr>
-        </p:nvSpPr>
-        <p:spPr/>
-        <p:txBody>
-          <a:bodyPr/>
-          <a:lstStyle/>
-          <a:p>
-            <a:r>
-              <a:rPr lang="de-DE" altLang="en-US">
-                <a:cs typeface="+mj-lt"/>
-              </a:rPr>
-              <a:t>Sprint Review</a:t>
-            </a:r>
-          </a:p>
-        </p:txBody>
-      </p:sp>
-      <p:sp>
-        <p:nvSpPr>
-          <p:cNvPr id="8" name="Footer Placeholder 7">
-            <a:extLst>
-              <a:ext uri="{FF2B5EF4-FFF2-40B4-BE49-F238E27FC236}">
-                <a16:creationId xmlns:a16="http://schemas.microsoft.com/office/drawing/2014/main" id="{A6FB916D-1BB9-41CC-0F97-20203DC53563}"/>
-              </a:ext>
-            </a:extLst>
-          </p:cNvPr>
-          <p:cNvSpPr>
-            <a:spLocks noGrp="1"/>
-          </p:cNvSpPr>
-          <p:nvPr>
-            <p:ph type="ftr" sz="quarter" idx="11"/>
-          </p:nvPr>
-        </p:nvSpPr>
-        <p:spPr/>
-        <p:txBody>
-          <a:bodyPr/>
-          <a:lstStyle/>
-          <a:p>
-            <a:pPr>
-              <a:defRPr/>
-            </a:pPr>
-            <a:r>
-              <a:rPr lang="de-DE" dirty="0"/>
-              <a:t>DI(FH) Falkensteiner Markus</a:t>
-            </a:r>
-          </a:p>
-        </p:txBody>
-      </p:sp>
-      <p:sp>
-        <p:nvSpPr>
-          <p:cNvPr id="9" name="Slide Number Placeholder 8">
-            <a:extLst>
-              <a:ext uri="{FF2B5EF4-FFF2-40B4-BE49-F238E27FC236}">
-                <a16:creationId xmlns:a16="http://schemas.microsoft.com/office/drawing/2014/main" id="{00D683A9-85AC-1B67-BF5B-FFAB2C53BD73}"/>
-              </a:ext>
-            </a:extLst>
-          </p:cNvPr>
-          <p:cNvSpPr>
-            <a:spLocks noGrp="1"/>
-          </p:cNvSpPr>
-          <p:nvPr>
-            <p:ph type="sldNum" sz="quarter" idx="12"/>
-          </p:nvPr>
-        </p:nvSpPr>
-        <p:spPr/>
-        <p:txBody>
-          <a:bodyPr/>
-          <a:lstStyle/>
-          <a:p>
-            <a:pPr>
-              <a:defRPr/>
-            </a:pPr>
-            <a:fld id="{AE4538FE-AEB4-413B-B741-EC1BAEEF6B8F}" type="slidenum">
-              <a:rPr lang="de-AT" smtClean="0"/>
-              <a:t>4</a:t>
-            </a:fld>
-            <a:endParaRPr lang="de-AT"/>
-          </a:p>
-        </p:txBody>
-      </p:sp>
-      <p:sp>
-        <p:nvSpPr>
-          <p:cNvPr id="3" name="Text Box 2">
-            <a:extLst>
-              <a:ext uri="{FF2B5EF4-FFF2-40B4-BE49-F238E27FC236}">
-                <a16:creationId xmlns:a16="http://schemas.microsoft.com/office/drawing/2014/main" id="{7EE115C0-B54C-5FCD-A957-B34FB12C5E44}"/>
-              </a:ext>
-            </a:extLst>
-          </p:cNvPr>
-          <p:cNvSpPr txBox="1"/>
-          <p:nvPr/>
-        </p:nvSpPr>
-        <p:spPr>
-          <a:xfrm>
-            <a:off x="628650" y="1643163"/>
-            <a:ext cx="8223250" cy="2539157"/>
-          </a:xfrm>
-          <a:prstGeom prst="rect">
-            <a:avLst/>
-          </a:prstGeom>
-          <a:noFill/>
-        </p:spPr>
-        <p:txBody>
-          <a:bodyPr wrap="square" rtlCol="0">
-            <a:spAutoFit/>
-          </a:bodyPr>
-          <a:lstStyle/>
-          <a:p>
-            <a:pPr indent="0">
-              <a:buFont typeface="Arial" panose="020B0604020202020204" pitchFamily="34" charset="0"/>
-              <a:buNone/>
-            </a:pPr>
-            <a:r>
-              <a:rPr lang="de-DE" altLang="en-US" sz="2400" b="1" dirty="0">
-                <a:latin typeface="Calibri" panose="020F0502020204030204" charset="0"/>
-              </a:rPr>
-              <a:t>Sprint V – Zieldefinition</a:t>
-            </a:r>
-          </a:p>
-          <a:p>
-            <a:pPr indent="0">
-              <a:buFont typeface="Arial" panose="020B0604020202020204" pitchFamily="34" charset="0"/>
-              <a:buNone/>
-            </a:pPr>
-            <a:endParaRPr lang="de-DE" altLang="en-US" sz="1400" b="1" dirty="0">
-              <a:latin typeface="Calibri" panose="020F0502020204030204" charset="0"/>
-            </a:endParaRPr>
-          </a:p>
-          <a:p>
-            <a:pPr indent="0">
-              <a:buFont typeface="Arial" panose="020B0604020202020204" pitchFamily="34" charset="0"/>
-              <a:buNone/>
-            </a:pPr>
-            <a:r>
-              <a:rPr lang="de-DE" altLang="en-US" sz="2200" b="1" dirty="0">
-                <a:latin typeface="Calibri" panose="020F0502020204030204" charset="0"/>
-              </a:rPr>
-              <a:t>Dokumentation</a:t>
-            </a:r>
-          </a:p>
-          <a:p>
-            <a:pPr indent="0">
-              <a:buFont typeface="Arial" panose="020B0604020202020204" pitchFamily="34" charset="0"/>
-              <a:buNone/>
-            </a:pPr>
-            <a:endParaRPr lang="de-DE" altLang="en-US" sz="500" b="1" dirty="0">
-              <a:latin typeface="Calibri" panose="020F0502020204030204" charset="0"/>
-            </a:endParaRPr>
-          </a:p>
-          <a:p>
-            <a:pPr marL="285750" indent="-285750">
-              <a:buFont typeface="Wingdings" panose="05000000000000000000" pitchFamily="2" charset="2"/>
-              <a:buChar char="ü"/>
-            </a:pPr>
-            <a:r>
-              <a:rPr lang="de-DE" altLang="en-US" sz="2000" dirty="0">
-                <a:solidFill>
-                  <a:srgbClr val="00B050"/>
-                </a:solidFill>
-                <a:latin typeface="Calibri" panose="020F0502020204030204" charset="0"/>
-              </a:rPr>
-              <a:t>UML-Diagramme</a:t>
-            </a:r>
-          </a:p>
-          <a:p>
-            <a:pPr marL="285750" indent="-285750">
-              <a:buFont typeface="Wingdings" panose="05000000000000000000" pitchFamily="2" charset="2"/>
-              <a:buChar char="ü"/>
-            </a:pPr>
-            <a:r>
-              <a:rPr lang="de-DE" altLang="en-US" sz="2000" dirty="0">
-                <a:solidFill>
-                  <a:srgbClr val="00B050"/>
-                </a:solidFill>
-                <a:latin typeface="Calibri" panose="020F0502020204030204" charset="0"/>
-              </a:rPr>
-              <a:t>Sprint-Dokumentation</a:t>
-            </a:r>
-          </a:p>
-          <a:p>
-            <a:pPr marL="285750" indent="-285750">
-              <a:buFont typeface="Wingdings" panose="05000000000000000000" pitchFamily="2" charset="2"/>
-              <a:buChar char="ü"/>
-            </a:pPr>
-            <a:r>
-              <a:rPr lang="de-DE" altLang="en-US" sz="2000" dirty="0">
-                <a:solidFill>
-                  <a:srgbClr val="00B050"/>
-                </a:solidFill>
-                <a:latin typeface="Calibri" panose="020F0502020204030204" charset="0"/>
-              </a:rPr>
-              <a:t>C4</a:t>
-            </a:r>
-          </a:p>
-          <a:p>
-            <a:endParaRPr lang="de-DE" sz="1700" dirty="0">
-              <a:latin typeface="Calibri" panose="020F0502020204030204" charset="0"/>
-            </a:endParaRPr>
-          </a:p>
-          <a:p>
-            <a:endParaRPr lang="de-DE" sz="1700" dirty="0">
-              <a:latin typeface="Calibri" panose="020F0502020204030204" charset="0"/>
-            </a:endParaRPr>
-          </a:p>
-        </p:txBody>
-      </p:sp>
-    </p:spTree>
-    <p:extLst>
-      <p:ext uri="{BB962C8B-B14F-4D97-AF65-F5344CB8AC3E}">
-        <p14:creationId xmlns:p14="http://schemas.microsoft.com/office/powerpoint/2010/main" val="3669490939"/>
       </p:ext>
     </p:extLst>
   </p:cSld>
@@ -14658,6 +14699,273 @@
   <p:cSld>
     <p:spTree>
       <p:nvGrpSpPr>
+        <p:cNvPr id="1" name="">
+          <a:extLst>
+            <a:ext uri="{FF2B5EF4-FFF2-40B4-BE49-F238E27FC236}">
+              <a16:creationId xmlns:a16="http://schemas.microsoft.com/office/drawing/2014/main" id="{98AA9F47-B925-7544-B400-E45083A91847}"/>
+            </a:ext>
+          </a:extLst>
+        </p:cNvPr>
+        <p:cNvGrpSpPr/>
+        <p:nvPr/>
+      </p:nvGrpSpPr>
+      <p:grpSpPr>
+        <a:xfrm>
+          <a:off x="0" y="0"/>
+          <a:ext cx="0" cy="0"/>
+          <a:chOff x="0" y="0"/>
+          <a:chExt cx="0" cy="0"/>
+        </a:xfrm>
+      </p:grpSpPr>
+      <p:sp>
+        <p:nvSpPr>
+          <p:cNvPr id="2" name="Title 1">
+            <a:extLst>
+              <a:ext uri="{FF2B5EF4-FFF2-40B4-BE49-F238E27FC236}">
+                <a16:creationId xmlns:a16="http://schemas.microsoft.com/office/drawing/2014/main" id="{64FD2EBF-D2EA-1DE7-EA9B-F4653745BEFD}"/>
+              </a:ext>
+            </a:extLst>
+          </p:cNvPr>
+          <p:cNvSpPr>
+            <a:spLocks noGrp="1"/>
+          </p:cNvSpPr>
+          <p:nvPr>
+            <p:ph type="title"/>
+          </p:nvPr>
+        </p:nvSpPr>
+        <p:spPr/>
+        <p:txBody>
+          <a:bodyPr/>
+          <a:lstStyle/>
+          <a:p>
+            <a:r>
+              <a:rPr lang="de-DE" altLang="en-US">
+                <a:cs typeface="+mj-lt"/>
+              </a:rPr>
+              <a:t>Sprint Review</a:t>
+            </a:r>
+          </a:p>
+        </p:txBody>
+      </p:sp>
+      <p:sp>
+        <p:nvSpPr>
+          <p:cNvPr id="8" name="Footer Placeholder 7">
+            <a:extLst>
+              <a:ext uri="{FF2B5EF4-FFF2-40B4-BE49-F238E27FC236}">
+                <a16:creationId xmlns:a16="http://schemas.microsoft.com/office/drawing/2014/main" id="{A6FB916D-1BB9-41CC-0F97-20203DC53563}"/>
+              </a:ext>
+            </a:extLst>
+          </p:cNvPr>
+          <p:cNvSpPr>
+            <a:spLocks noGrp="1"/>
+          </p:cNvSpPr>
+          <p:nvPr>
+            <p:ph type="ftr" sz="quarter" idx="11"/>
+          </p:nvPr>
+        </p:nvSpPr>
+        <p:spPr/>
+        <p:txBody>
+          <a:bodyPr/>
+          <a:lstStyle/>
+          <a:p>
+            <a:pPr>
+              <a:defRPr/>
+            </a:pPr>
+            <a:r>
+              <a:rPr lang="de-DE" dirty="0"/>
+              <a:t>DI(FH) Falkensteiner Markus</a:t>
+            </a:r>
+          </a:p>
+        </p:txBody>
+      </p:sp>
+      <p:sp>
+        <p:nvSpPr>
+          <p:cNvPr id="9" name="Slide Number Placeholder 8">
+            <a:extLst>
+              <a:ext uri="{FF2B5EF4-FFF2-40B4-BE49-F238E27FC236}">
+                <a16:creationId xmlns:a16="http://schemas.microsoft.com/office/drawing/2014/main" id="{00D683A9-85AC-1B67-BF5B-FFAB2C53BD73}"/>
+              </a:ext>
+            </a:extLst>
+          </p:cNvPr>
+          <p:cNvSpPr>
+            <a:spLocks noGrp="1"/>
+          </p:cNvSpPr>
+          <p:nvPr>
+            <p:ph type="sldNum" sz="quarter" idx="12"/>
+          </p:nvPr>
+        </p:nvSpPr>
+        <p:spPr/>
+        <p:txBody>
+          <a:bodyPr/>
+          <a:lstStyle/>
+          <a:p>
+            <a:pPr>
+              <a:defRPr/>
+            </a:pPr>
+            <a:fld id="{AE4538FE-AEB4-413B-B741-EC1BAEEF6B8F}" type="slidenum">
+              <a:rPr lang="de-AT" smtClean="0"/>
+              <a:t>5</a:t>
+            </a:fld>
+            <a:endParaRPr lang="de-AT"/>
+          </a:p>
+        </p:txBody>
+      </p:sp>
+      <p:sp>
+        <p:nvSpPr>
+          <p:cNvPr id="3" name="Text Box 2">
+            <a:extLst>
+              <a:ext uri="{FF2B5EF4-FFF2-40B4-BE49-F238E27FC236}">
+                <a16:creationId xmlns:a16="http://schemas.microsoft.com/office/drawing/2014/main" id="{7EE115C0-B54C-5FCD-A957-B34FB12C5E44}"/>
+              </a:ext>
+            </a:extLst>
+          </p:cNvPr>
+          <p:cNvSpPr txBox="1"/>
+          <p:nvPr/>
+        </p:nvSpPr>
+        <p:spPr>
+          <a:xfrm>
+            <a:off x="628650" y="1643163"/>
+            <a:ext cx="8223250" cy="2539157"/>
+          </a:xfrm>
+          <a:prstGeom prst="rect">
+            <a:avLst/>
+          </a:prstGeom>
+          <a:noFill/>
+        </p:spPr>
+        <p:txBody>
+          <a:bodyPr wrap="square" rtlCol="0">
+            <a:spAutoFit/>
+          </a:bodyPr>
+          <a:lstStyle/>
+          <a:p>
+            <a:pPr indent="0">
+              <a:buFont typeface="Arial" panose="020B0604020202020204" pitchFamily="34" charset="0"/>
+              <a:buNone/>
+            </a:pPr>
+            <a:r>
+              <a:rPr lang="de-DE" altLang="en-US" sz="2400" b="1" dirty="0">
+                <a:latin typeface="Calibri" panose="020F0502020204030204" charset="0"/>
+              </a:rPr>
+              <a:t>Sprint V – Zieldefinition</a:t>
+            </a:r>
+          </a:p>
+          <a:p>
+            <a:pPr indent="0">
+              <a:buFont typeface="Arial" panose="020B0604020202020204" pitchFamily="34" charset="0"/>
+              <a:buNone/>
+            </a:pPr>
+            <a:endParaRPr lang="de-DE" altLang="en-US" sz="1400" b="1" dirty="0">
+              <a:latin typeface="Calibri" panose="020F0502020204030204" charset="0"/>
+            </a:endParaRPr>
+          </a:p>
+          <a:p>
+            <a:pPr indent="0">
+              <a:buFont typeface="Arial" panose="020B0604020202020204" pitchFamily="34" charset="0"/>
+              <a:buNone/>
+            </a:pPr>
+            <a:r>
+              <a:rPr lang="de-DE" altLang="en-US" sz="2200" b="1" dirty="0">
+                <a:latin typeface="Calibri" panose="020F0502020204030204" charset="0"/>
+              </a:rPr>
+              <a:t>Dokumentation</a:t>
+            </a:r>
+          </a:p>
+          <a:p>
+            <a:pPr indent="0">
+              <a:buFont typeface="Arial" panose="020B0604020202020204" pitchFamily="34" charset="0"/>
+              <a:buNone/>
+            </a:pPr>
+            <a:endParaRPr lang="de-DE" altLang="en-US" sz="500" b="1" dirty="0">
+              <a:latin typeface="Calibri" panose="020F0502020204030204" charset="0"/>
+            </a:endParaRPr>
+          </a:p>
+          <a:p>
+            <a:pPr marL="285750" indent="-285750">
+              <a:buFont typeface="Wingdings" panose="05000000000000000000" pitchFamily="2" charset="2"/>
+              <a:buChar char="ü"/>
+            </a:pPr>
+            <a:r>
+              <a:rPr lang="de-DE" altLang="en-US" sz="2000" dirty="0">
+                <a:solidFill>
+                  <a:srgbClr val="00B050"/>
+                </a:solidFill>
+                <a:latin typeface="Calibri" panose="020F0502020204030204" charset="0"/>
+              </a:rPr>
+              <a:t>UML-Diagramme</a:t>
+            </a:r>
+          </a:p>
+          <a:p>
+            <a:pPr marL="285750" indent="-285750">
+              <a:buFont typeface="Wingdings" panose="05000000000000000000" pitchFamily="2" charset="2"/>
+              <a:buChar char="ü"/>
+            </a:pPr>
+            <a:r>
+              <a:rPr lang="de-DE" altLang="en-US" sz="2000" dirty="0">
+                <a:solidFill>
+                  <a:srgbClr val="00B050"/>
+                </a:solidFill>
+                <a:latin typeface="Calibri" panose="020F0502020204030204" charset="0"/>
+              </a:rPr>
+              <a:t>Sprint-Dokumentation</a:t>
+            </a:r>
+          </a:p>
+          <a:p>
+            <a:pPr marL="285750" indent="-285750">
+              <a:buFont typeface="Wingdings" panose="05000000000000000000" pitchFamily="2" charset="2"/>
+              <a:buChar char="ü"/>
+            </a:pPr>
+            <a:r>
+              <a:rPr lang="de-DE" altLang="en-US" sz="2000" dirty="0">
+                <a:solidFill>
+                  <a:srgbClr val="00B050"/>
+                </a:solidFill>
+                <a:latin typeface="Calibri" panose="020F0502020204030204" charset="0"/>
+              </a:rPr>
+              <a:t>C4</a:t>
+            </a:r>
+          </a:p>
+          <a:p>
+            <a:endParaRPr lang="de-DE" sz="1700" dirty="0">
+              <a:latin typeface="Calibri" panose="020F0502020204030204" charset="0"/>
+            </a:endParaRPr>
+          </a:p>
+          <a:p>
+            <a:endParaRPr lang="de-DE" sz="1700" dirty="0">
+              <a:latin typeface="Calibri" panose="020F0502020204030204" charset="0"/>
+            </a:endParaRPr>
+          </a:p>
+        </p:txBody>
+      </p:sp>
+    </p:spTree>
+    <p:extLst>
+      <p:ext uri="{BB962C8B-B14F-4D97-AF65-F5344CB8AC3E}">
+        <p14:creationId xmlns:p14="http://schemas.microsoft.com/office/powerpoint/2010/main" val="3669490939"/>
+      </p:ext>
+    </p:extLst>
+  </p:cSld>
+  <p:clrMapOvr>
+    <a:masterClrMapping/>
+  </p:clrMapOvr>
+  <mc:AlternateContent xmlns:mc="http://schemas.openxmlformats.org/markup-compatibility/2006" xmlns:p14="http://schemas.microsoft.com/office/powerpoint/2010/main">
+    <mc:Choice Requires="p14">
+      <p:transition spd="med" p14:dur="700">
+        <p:fade/>
+      </p:transition>
+    </mc:Choice>
+    <mc:Fallback xmlns="">
+      <p:transition spd="med">
+        <p:fade/>
+      </p:transition>
+    </mc:Fallback>
+  </mc:AlternateContent>
+</p:sld>
+</file>
+
+<file path=ppt/slides/slide6.xml><?xml version="1.0" encoding="utf-8"?>
+<p:sld xmlns:a="http://schemas.openxmlformats.org/drawingml/2006/main" xmlns:r="http://schemas.openxmlformats.org/officeDocument/2006/relationships" xmlns:p="http://schemas.openxmlformats.org/presentationml/2006/main">
+  <p:cSld>
+    <p:spTree>
+      <p:nvGrpSpPr>
         <p:cNvPr id="1" name=""/>
         <p:cNvGrpSpPr/>
         <p:nvPr/>
@@ -14792,7 +15100,7 @@
             </a:pPr>
             <a:fld id="{AE4538FE-AEB4-413B-B741-EC1BAEEF6B8F}" type="slidenum">
               <a:rPr lang="de-AT" smtClean="0"/>
-              <a:t>5</a:t>
+              <a:t>6</a:t>
             </a:fld>
             <a:endParaRPr lang="de-AT"/>
           </a:p>
@@ -14878,7 +15186,7 @@
 </p:sld>
 </file>
 
-<file path=ppt/slides/slide6.xml><?xml version="1.0" encoding="utf-8"?>
+<file path=ppt/slides/slide7.xml><?xml version="1.0" encoding="utf-8"?>
 <p:sld xmlns:a="http://schemas.openxmlformats.org/drawingml/2006/main" xmlns:r="http://schemas.openxmlformats.org/officeDocument/2006/relationships" xmlns:p="http://schemas.openxmlformats.org/presentationml/2006/main">
   <p:cSld>
     <p:spTree>
@@ -14933,7 +15241,7 @@
         <p:spPr>
           <a:xfrm>
             <a:off x="350674" y="1530036"/>
-            <a:ext cx="8171154" cy="4708981"/>
+            <a:ext cx="8171154" cy="5016758"/>
           </a:xfrm>
           <a:prstGeom prst="rect">
             <a:avLst/>
@@ -15043,6 +15351,18 @@
                 <a:latin typeface="Calibri" panose="020F0502020204030204" charset="0"/>
               </a:rPr>
               <a:t>Abschlusspräsentation</a:t>
+            </a:r>
+          </a:p>
+          <a:p>
+            <a:pPr marL="342900" indent="-342900" algn="just">
+              <a:buFont typeface="Symbol" panose="05050102010706020507" pitchFamily="18" charset="2"/>
+              <a:buChar char="-"/>
+            </a:pPr>
+            <a:r>
+              <a:rPr lang="de-DE" sz="2000" dirty="0">
+                <a:latin typeface="Calibri" panose="020F0502020204030204" charset="0"/>
+              </a:rPr>
+              <a:t>Komponentendiagramm</a:t>
             </a:r>
           </a:p>
           <a:p>
@@ -15165,7 +15485,7 @@
             </a:pPr>
             <a:fld id="{AE4538FE-AEB4-413B-B741-EC1BAEEF6B8F}" type="slidenum">
               <a:rPr lang="de-AT" smtClean="0"/>
-              <a:t>6</a:t>
+              <a:t>7</a:t>
             </a:fld>
             <a:endParaRPr lang="de-AT"/>
           </a:p>
@@ -15547,7 +15867,7 @@
                                         <p:tgtEl>
                                           <p:spTgt spid="5">
                                             <p:txEl>
-                                              <p:pRg st="13" end="13"/>
+                                              <p:pRg st="9" end="9"/>
                                             </p:txEl>
                                           </p:spTgt>
                                         </p:tgtEl>
@@ -15565,7 +15885,7 @@
                                         <p:tgtEl>
                                           <p:spTgt spid="5">
                                             <p:txEl>
-                                              <p:pRg st="13" end="13"/>
+                                              <p:pRg st="9" end="9"/>
                                             </p:txEl>
                                           </p:spTgt>
                                         </p:tgtEl>
@@ -15583,7 +15903,7 @@
                                         <p:tgtEl>
                                           <p:spTgt spid="5">
                                             <p:txEl>
-                                              <p:pRg st="13" end="13"/>
+                                              <p:pRg st="9" end="9"/>
                                             </p:txEl>
                                           </p:spTgt>
                                         </p:tgtEl>
@@ -15601,7 +15921,7 @@
                                         <p:tgtEl>
                                           <p:spTgt spid="5">
                                             <p:txEl>
-                                              <p:pRg st="13" end="13"/>
+                                              <p:pRg st="9" end="9"/>
                                             </p:txEl>
                                           </p:spTgt>
                                         </p:tgtEl>
@@ -15697,6 +16017,87 @@
                                   </p:childTnLst>
                                 </p:cTn>
                               </p:par>
+                              <p:par>
+                                <p:cTn id="35" presetID="19" presetClass="emph" presetSubtype="0" fill="hold" nodeType="withEffect">
+                                  <p:stCondLst>
+                                    <p:cond delay="0"/>
+                                  </p:stCondLst>
+                                  <p:childTnLst>
+                                    <p:animClr clrSpc="rgb" dir="cw">
+                                      <p:cBhvr override="childStyle">
+                                        <p:cTn id="36" dur="500" fill="hold"/>
+                                        <p:tgtEl>
+                                          <p:spTgt spid="5">
+                                            <p:txEl>
+                                              <p:pRg st="15" end="15"/>
+                                            </p:txEl>
+                                          </p:spTgt>
+                                        </p:tgtEl>
+                                        <p:attrNameLst>
+                                          <p:attrName>style.color</p:attrName>
+                                        </p:attrNameLst>
+                                      </p:cBhvr>
+                                      <p:to>
+                                        <a:schemeClr val="accent2"/>
+                                      </p:to>
+                                    </p:animClr>
+                                    <p:animClr clrSpc="rgb" dir="cw">
+                                      <p:cBhvr>
+                                        <p:cTn id="37" dur="500" fill="hold"/>
+                                        <p:tgtEl>
+                                          <p:spTgt spid="5">
+                                            <p:txEl>
+                                              <p:pRg st="15" end="15"/>
+                                            </p:txEl>
+                                          </p:spTgt>
+                                        </p:tgtEl>
+                                        <p:attrNameLst>
+                                          <p:attrName>fillcolor</p:attrName>
+                                        </p:attrNameLst>
+                                      </p:cBhvr>
+                                      <p:to>
+                                        <a:schemeClr val="accent2"/>
+                                      </p:to>
+                                    </p:animClr>
+                                    <p:set>
+                                      <p:cBhvr>
+                                        <p:cTn id="38" dur="500" fill="hold"/>
+                                        <p:tgtEl>
+                                          <p:spTgt spid="5">
+                                            <p:txEl>
+                                              <p:pRg st="15" end="15"/>
+                                            </p:txEl>
+                                          </p:spTgt>
+                                        </p:tgtEl>
+                                        <p:attrNameLst>
+                                          <p:attrName>fill.type</p:attrName>
+                                        </p:attrNameLst>
+                                      </p:cBhvr>
+                                      <p:to>
+                                        <p:strVal val="solid"/>
+                                      </p:to>
+                                    </p:set>
+                                    <p:set>
+                                      <p:cBhvr>
+                                        <p:cTn id="39" dur="500" fill="hold"/>
+                                        <p:tgtEl>
+                                          <p:spTgt spid="5">
+                                            <p:txEl>
+                                              <p:pRg st="15" end="15"/>
+                                            </p:txEl>
+                                          </p:spTgt>
+                                        </p:tgtEl>
+                                        <p:attrNameLst>
+                                          <p:attrName>fill.on</p:attrName>
+                                        </p:attrNameLst>
+                                      </p:cBhvr>
+                                      <p:to>
+                                        <p:strVal val="true"/>
+                                      </p:to>
+                                    </p:set>
+                                  </p:childTnLst>
+                                </p:cTn>
+                              </p:par>
                             </p:childTnLst>
                           </p:cTn>
                         </p:par>
@@ -15725,314 +16126,6 @@
       </p:par>
     </p:tnLst>
   </p:timing>
-</p:sld>
-</file>
-
-<file path=ppt/slides/slide7.xml><?xml version="1.0" encoding="utf-8"?>
-<p:sld xmlns:a="http://schemas.openxmlformats.org/drawingml/2006/main" xmlns:r="http://schemas.openxmlformats.org/officeDocument/2006/relationships" xmlns:p="http://schemas.openxmlformats.org/presentationml/2006/main">
-  <p:cSld>
-    <p:spTree>
-      <p:nvGrpSpPr>
-        <p:cNvPr id="1" name="">
-          <a:extLst>
-            <a:ext uri="{FF2B5EF4-FFF2-40B4-BE49-F238E27FC236}">
-              <a16:creationId xmlns:a16="http://schemas.microsoft.com/office/drawing/2014/main" id="{BC7CAB39-4755-BCF6-4198-E800346FA0EB}"/>
-            </a:ext>
-          </a:extLst>
-        </p:cNvPr>
-        <p:cNvGrpSpPr/>
-        <p:nvPr/>
-      </p:nvGrpSpPr>
-      <p:grpSpPr>
-        <a:xfrm>
-          <a:off x="0" y="0"/>
-          <a:ext cx="0" cy="0"/>
-          <a:chOff x="0" y="0"/>
-          <a:chExt cx="0" cy="0"/>
-        </a:xfrm>
-      </p:grpSpPr>
-      <p:sp>
-        <p:nvSpPr>
-          <p:cNvPr id="2" name="Title 1">
-            <a:extLst>
-              <a:ext uri="{FF2B5EF4-FFF2-40B4-BE49-F238E27FC236}">
-                <a16:creationId xmlns:a16="http://schemas.microsoft.com/office/drawing/2014/main" id="{AA70ABD0-FFDE-DB5F-B928-A482B3DB08FA}"/>
-              </a:ext>
-            </a:extLst>
-          </p:cNvPr>
-          <p:cNvSpPr>
-            <a:spLocks noGrp="1"/>
-          </p:cNvSpPr>
-          <p:nvPr>
-            <p:ph type="title"/>
-          </p:nvPr>
-        </p:nvSpPr>
-        <p:spPr>
-          <a:xfrm>
-            <a:off x="1937231" y="303130"/>
-            <a:ext cx="6607646" cy="759618"/>
-          </a:xfrm>
-        </p:spPr>
-        <p:txBody>
-          <a:bodyPr/>
-          <a:lstStyle/>
-          <a:p>
-            <a:r>
-              <a:rPr lang="de-DE" altLang="en-US" dirty="0">
-                <a:latin typeface="Calibri" panose="020F0502020204030204" charset="0"/>
-              </a:rPr>
-              <a:t>Abschlusspräsentation</a:t>
-            </a:r>
-          </a:p>
-        </p:txBody>
-      </p:sp>
-      <p:sp>
-        <p:nvSpPr>
-          <p:cNvPr id="8" name="Footer Placeholder 7">
-            <a:extLst>
-              <a:ext uri="{FF2B5EF4-FFF2-40B4-BE49-F238E27FC236}">
-                <a16:creationId xmlns:a16="http://schemas.microsoft.com/office/drawing/2014/main" id="{07B643CF-C65D-A5B2-1A39-608329B3DE0D}"/>
-              </a:ext>
-            </a:extLst>
-          </p:cNvPr>
-          <p:cNvSpPr>
-            <a:spLocks noGrp="1"/>
-          </p:cNvSpPr>
-          <p:nvPr>
-            <p:ph type="ftr" sz="quarter" idx="11"/>
-          </p:nvPr>
-        </p:nvSpPr>
-        <p:spPr/>
-        <p:txBody>
-          <a:bodyPr/>
-          <a:lstStyle/>
-          <a:p>
-            <a:pPr>
-              <a:defRPr/>
-            </a:pPr>
-            <a:r>
-              <a:rPr lang="de-DE" dirty="0"/>
-              <a:t>DI(FH) Falkensteiner Markus</a:t>
-            </a:r>
-          </a:p>
-        </p:txBody>
-      </p:sp>
-      <p:sp>
-        <p:nvSpPr>
-          <p:cNvPr id="9" name="Slide Number Placeholder 8">
-            <a:extLst>
-              <a:ext uri="{FF2B5EF4-FFF2-40B4-BE49-F238E27FC236}">
-                <a16:creationId xmlns:a16="http://schemas.microsoft.com/office/drawing/2014/main" id="{70AAFB3E-1BEB-D2B0-9A45-90A00B87C5C5}"/>
-              </a:ext>
-            </a:extLst>
-          </p:cNvPr>
-          <p:cNvSpPr>
-            <a:spLocks noGrp="1"/>
-          </p:cNvSpPr>
-          <p:nvPr>
-            <p:ph type="sldNum" sz="quarter" idx="12"/>
-          </p:nvPr>
-        </p:nvSpPr>
-        <p:spPr/>
-        <p:txBody>
-          <a:bodyPr/>
-          <a:lstStyle/>
-          <a:p>
-            <a:pPr>
-              <a:defRPr/>
-            </a:pPr>
-            <a:fld id="{AE4538FE-AEB4-413B-B741-EC1BAEEF6B8F}" type="slidenum">
-              <a:rPr lang="de-AT" smtClean="0"/>
-              <a:t>7</a:t>
-            </a:fld>
-            <a:endParaRPr lang="de-AT"/>
-          </a:p>
-        </p:txBody>
-      </p:sp>
-      <p:sp>
-        <p:nvSpPr>
-          <p:cNvPr id="3" name="Textfeld 2">
-            <a:extLst>
-              <a:ext uri="{FF2B5EF4-FFF2-40B4-BE49-F238E27FC236}">
-                <a16:creationId xmlns:a16="http://schemas.microsoft.com/office/drawing/2014/main" id="{30EAFC73-CD4F-93E0-9551-0DD00510D28B}"/>
-              </a:ext>
-            </a:extLst>
-          </p:cNvPr>
-          <p:cNvSpPr txBox="1"/>
-          <p:nvPr/>
-        </p:nvSpPr>
-        <p:spPr>
-          <a:xfrm>
-            <a:off x="668593" y="1843950"/>
-            <a:ext cx="8043402" cy="3789948"/>
-          </a:xfrm>
-          <a:prstGeom prst="rect">
-            <a:avLst/>
-          </a:prstGeom>
-          <a:noFill/>
-        </p:spPr>
-        <p:txBody>
-          <a:bodyPr wrap="square" rtlCol="0">
-            <a:spAutoFit/>
-          </a:bodyPr>
-          <a:lstStyle/>
-          <a:p>
-            <a:r>
-              <a:rPr lang="de-DE" sz="2800" b="1" u="sng" dirty="0"/>
-              <a:t>Inhalt</a:t>
-            </a:r>
-            <a:endParaRPr lang="de-DE" sz="2200" dirty="0"/>
-          </a:p>
-          <a:p>
-            <a:pPr marL="342900" indent="-342900">
-              <a:lnSpc>
-                <a:spcPct val="150000"/>
-              </a:lnSpc>
-              <a:buFont typeface="Symbol" panose="05050102010706020507" pitchFamily="18" charset="2"/>
-              <a:buChar char="-"/>
-            </a:pPr>
-            <a:r>
-              <a:rPr lang="de-DE" sz="2400" dirty="0"/>
-              <a:t>Allgemeines</a:t>
-            </a:r>
-            <a:endParaRPr lang="de-DE" sz="500" dirty="0"/>
-          </a:p>
-          <a:p>
-            <a:pPr marL="342900" indent="-342900">
-              <a:lnSpc>
-                <a:spcPct val="150000"/>
-              </a:lnSpc>
-              <a:buFont typeface="Symbol" panose="05050102010706020507" pitchFamily="18" charset="2"/>
-              <a:buChar char="-"/>
-            </a:pPr>
-            <a:r>
-              <a:rPr lang="de-DE" sz="2400" dirty="0"/>
-              <a:t>Retrospektive</a:t>
-            </a:r>
-          </a:p>
-          <a:p>
-            <a:pPr marL="342900" indent="-342900">
-              <a:lnSpc>
-                <a:spcPct val="150000"/>
-              </a:lnSpc>
-              <a:buFont typeface="Symbol" panose="05050102010706020507" pitchFamily="18" charset="2"/>
-              <a:buChar char="-"/>
-            </a:pPr>
-            <a:r>
-              <a:rPr lang="de-DE" sz="2400" dirty="0"/>
-              <a:t>Technische Details</a:t>
-            </a:r>
-          </a:p>
-          <a:p>
-            <a:pPr marL="342900" indent="-342900">
-              <a:lnSpc>
-                <a:spcPct val="150000"/>
-              </a:lnSpc>
-              <a:buFont typeface="Symbol" panose="05050102010706020507" pitchFamily="18" charset="2"/>
-              <a:buChar char="-"/>
-            </a:pPr>
-            <a:r>
-              <a:rPr lang="de-DE" sz="2400" dirty="0"/>
-              <a:t>Demo</a:t>
-            </a:r>
-          </a:p>
-          <a:p>
-            <a:pPr marL="342900" indent="-342900">
-              <a:lnSpc>
-                <a:spcPct val="150000"/>
-              </a:lnSpc>
-              <a:buFont typeface="Symbol" panose="05050102010706020507" pitchFamily="18" charset="2"/>
-              <a:buChar char="-"/>
-            </a:pPr>
-            <a:r>
-              <a:rPr lang="de-DE" sz="2400" dirty="0"/>
-              <a:t>Wichtige Codeabschnitte</a:t>
-            </a:r>
-          </a:p>
-          <a:p>
-            <a:pPr marL="342900" indent="-342900">
-              <a:lnSpc>
-                <a:spcPct val="150000"/>
-              </a:lnSpc>
-              <a:buFont typeface="Symbol" panose="05050102010706020507" pitchFamily="18" charset="2"/>
-              <a:buChar char="-"/>
-            </a:pPr>
-            <a:r>
-              <a:rPr lang="de-DE" sz="2400" dirty="0"/>
-              <a:t>Dokumentation</a:t>
-            </a:r>
-          </a:p>
-        </p:txBody>
-      </p:sp>
-      <p:pic>
-        <p:nvPicPr>
-          <p:cNvPr id="1028" name="Picture 4">
-            <a:extLst>
-              <a:ext uri="{FF2B5EF4-FFF2-40B4-BE49-F238E27FC236}">
-                <a16:creationId xmlns:a16="http://schemas.microsoft.com/office/drawing/2014/main" id="{C33E6BF7-AA3C-CCC2-094A-AAD012E1D65E}"/>
-              </a:ext>
-            </a:extLst>
-          </p:cNvPr>
-          <p:cNvPicPr>
-            <a:picLocks noChangeAspect="1" noChangeArrowheads="1"/>
-          </p:cNvPicPr>
-          <p:nvPr/>
-        </p:nvPicPr>
-        <p:blipFill>
-          <a:blip r:embed="rId3">
-            <a:extLst>
-              <a:ext uri="{28A0092B-C50C-407E-A947-70E740481C1C}">
-                <a14:useLocalDpi xmlns:a14="http://schemas.microsoft.com/office/drawing/2010/main" val="0"/>
-              </a:ext>
-            </a:extLst>
-          </a:blip>
-          <a:srcRect/>
-          <a:stretch>
-            <a:fillRect/>
-          </a:stretch>
-        </p:blipFill>
-        <p:spPr bwMode="auto">
-          <a:xfrm>
-            <a:off x="4337869" y="1555139"/>
-            <a:ext cx="4240161" cy="4240161"/>
-          </a:xfrm>
-          <a:prstGeom prst="rect">
-            <a:avLst/>
-          </a:prstGeom>
-          <a:noFill/>
-          <a:extLst>
-            <a:ext uri="{909E8E84-426E-40DD-AFC4-6F175D3DCCD1}">
-              <a14:hiddenFill xmlns:a14="http://schemas.microsoft.com/office/drawing/2010/main">
-                <a:solidFill>
-                  <a:srgbClr val="FFFFFF"/>
-                </a:solidFill>
-              </a14:hiddenFill>
-            </a:ext>
-          </a:extLst>
-        </p:spPr>
-      </p:pic>
-    </p:spTree>
-    <p:extLst>
-      <p:ext uri="{BB962C8B-B14F-4D97-AF65-F5344CB8AC3E}">
-        <p14:creationId xmlns:p14="http://schemas.microsoft.com/office/powerpoint/2010/main" val="3040514452"/>
-      </p:ext>
-    </p:extLst>
-  </p:cSld>
-  <p:clrMapOvr>
-    <a:masterClrMapping/>
-  </p:clrMapOvr>
-  <mc:AlternateContent xmlns:mc="http://schemas.openxmlformats.org/markup-compatibility/2006" xmlns:p14="http://schemas.microsoft.com/office/powerpoint/2010/main">
-    <mc:Choice Requires="p14">
-      <p:transition spd="med" p14:dur="700">
-        <p:fade/>
-      </p:transition>
-    </mc:Choice>
-    <mc:Fallback xmlns="">
-      <p:transition spd="med">
-        <p:fade/>
-      </p:transition>
-    </mc:Fallback>
-  </mc:AlternateContent>
 </p:sld>
 </file>
 
@@ -16703,6 +16796,146 @@
       </p:transition>
     </mc:Fallback>
   </mc:AlternateContent>
+  <p:timing>
+    <p:tnLst>
+      <p:par>
+        <p:cTn id="1" dur="indefinite" restart="never" nodeType="tmRoot">
+          <p:childTnLst>
+            <p:seq concurrent="1" nextAc="seek">
+              <p:cTn id="2" dur="indefinite" nodeType="mainSeq">
+                <p:childTnLst>
+                  <p:par>
+                    <p:cTn id="3" fill="hold">
+                      <p:stCondLst>
+                        <p:cond delay="indefinite"/>
+                      </p:stCondLst>
+                      <p:childTnLst>
+                        <p:par>
+                          <p:cTn id="4" fill="hold">
+                            <p:stCondLst>
+                              <p:cond delay="0"/>
+                            </p:stCondLst>
+                            <p:childTnLst>
+                              <p:par>
+                                <p:cTn id="5" presetID="10" presetClass="entr" presetSubtype="0" fill="hold" grpId="0" nodeType="clickEffect">
+                                  <p:stCondLst>
+                                    <p:cond delay="0"/>
+                                  </p:stCondLst>
+                                  <p:childTnLst>
+                                    <p:set>
+                                      <p:cBhvr>
+                                        <p:cTn id="6" dur="1" fill="hold">
+                                          <p:stCondLst>
+                                            <p:cond delay="0"/>
+                                          </p:stCondLst>
+                                        </p:cTn>
+                                        <p:tgtEl>
+                                          <p:spTgt spid="3"/>
+                                        </p:tgtEl>
+                                        <p:attrNameLst>
+                                          <p:attrName>style.visibility</p:attrName>
+                                        </p:attrNameLst>
+                                      </p:cBhvr>
+                                      <p:to>
+                                        <p:strVal val="visible"/>
+                                      </p:to>
+                                    </p:set>
+                                    <p:animEffect transition="in" filter="fade">
+                                      <p:cBhvr>
+                                        <p:cTn id="7" dur="500"/>
+                                        <p:tgtEl>
+                                          <p:spTgt spid="3"/>
+                                        </p:tgtEl>
+                                      </p:cBhvr>
+                                    </p:animEffect>
+                                  </p:childTnLst>
+                                </p:cTn>
+                              </p:par>
+                            </p:childTnLst>
+                          </p:cTn>
+                        </p:par>
+                      </p:childTnLst>
+                    </p:cTn>
+                  </p:par>
+                  <p:par>
+                    <p:cTn id="8" fill="hold">
+                      <p:stCondLst>
+                        <p:cond delay="indefinite"/>
+                      </p:stCondLst>
+                      <p:childTnLst>
+                        <p:par>
+                          <p:cTn id="9" fill="hold">
+                            <p:stCondLst>
+                              <p:cond delay="0"/>
+                            </p:stCondLst>
+                            <p:childTnLst>
+                              <p:par>
+                                <p:cTn id="10" presetID="10" presetClass="entr" presetSubtype="0" fill="hold" grpId="0" nodeType="clickEffect">
+                                  <p:stCondLst>
+                                    <p:cond delay="0"/>
+                                  </p:stCondLst>
+                                  <p:childTnLst>
+                                    <p:set>
+                                      <p:cBhvr>
+                                        <p:cTn id="11" dur="1" fill="hold">
+                                          <p:stCondLst>
+                                            <p:cond delay="0"/>
+                                          </p:stCondLst>
+                                        </p:cTn>
+                                        <p:tgtEl>
+                                          <p:spTgt spid="4"/>
+                                        </p:tgtEl>
+                                        <p:attrNameLst>
+                                          <p:attrName>style.visibility</p:attrName>
+                                        </p:attrNameLst>
+                                      </p:cBhvr>
+                                      <p:to>
+                                        <p:strVal val="visible"/>
+                                      </p:to>
+                                    </p:set>
+                                    <p:animEffect transition="in" filter="fade">
+                                      <p:cBhvr>
+                                        <p:cTn id="12" dur="500"/>
+                                        <p:tgtEl>
+                                          <p:spTgt spid="4"/>
+                                        </p:tgtEl>
+                                      </p:cBhvr>
+                                    </p:animEffect>
+                                  </p:childTnLst>
+                                </p:cTn>
+                              </p:par>
+                            </p:childTnLst>
+                          </p:cTn>
+                        </p:par>
+                      </p:childTnLst>
+                    </p:cTn>
+                  </p:par>
+                </p:childTnLst>
+              </p:cTn>
+              <p:prevCondLst>
+                <p:cond evt="onPrev" delay="0">
+                  <p:tgtEl>
+                    <p:sldTgt/>
+                  </p:tgtEl>
+                </p:cond>
+              </p:prevCondLst>
+              <p:nextCondLst>
+                <p:cond evt="onNext" delay="0">
+                  <p:tgtEl>
+                    <p:sldTgt/>
+                  </p:tgtEl>
+                </p:cond>
+              </p:nextCondLst>
+            </p:seq>
+          </p:childTnLst>
+        </p:cTn>
+      </p:par>
+    </p:tnLst>
+    <p:bldLst>
+      <p:bldP spid="4" grpId="0"/>
+      <p:bldP spid="3" grpId="0"/>
+    </p:bldLst>
+  </p:timing>
 </p:sld>
 </file>
 
@@ -17832,12 +18065,9 @@
 </file>
 
 <file path=customXml/item1.xml><?xml version="1.0" encoding="utf-8"?>
-<?mso-contentType ?>
-<FormTemplates xmlns="http://schemas.microsoft.com/sharepoint/v3/contenttype/forms">
-  <Display>DocumentLibraryForm</Display>
-  <Edit>DocumentLibraryForm</Edit>
-  <New>DocumentLibraryForm</New>
-</FormTemplates>
+<p:properties xmlns:p="http://schemas.microsoft.com/office/2006/metadata/properties" xmlns:xsi="http://www.w3.org/2001/XMLSchema-instance" xmlns:pc="http://schemas.microsoft.com/office/infopath/2007/PartnerControls">
+  <documentManagement/>
+</p:properties>
 </file>
 
 <file path=customXml/item2.xml><?xml version="1.0" encoding="utf-8"?>
@@ -17985,15 +18215,26 @@
 </file>
 
 <file path=customXml/item3.xml><?xml version="1.0" encoding="utf-8"?>
-<p:properties xmlns:p="http://schemas.microsoft.com/office/2006/metadata/properties" xmlns:xsi="http://www.w3.org/2001/XMLSchema-instance" xmlns:pc="http://schemas.microsoft.com/office/infopath/2007/PartnerControls">
-  <documentManagement/>
-</p:properties>
+<?mso-contentType ?>
+<FormTemplates xmlns="http://schemas.microsoft.com/sharepoint/v3/contenttype/forms">
+  <Display>DocumentLibraryForm</Display>
+  <Edit>DocumentLibraryForm</Edit>
+  <New>DocumentLibraryForm</New>
+</FormTemplates>
 </file>
 
 <file path=customXml/itemProps1.xml><?xml version="1.0" encoding="utf-8"?>
-<ds:datastoreItem xmlns:ds="http://schemas.openxmlformats.org/officeDocument/2006/customXml" ds:itemID="{1981A0EB-802E-4D0E-9A2A-3AE4F15204D8}">
+<ds:datastoreItem xmlns:ds="http://schemas.openxmlformats.org/officeDocument/2006/customXml" ds:itemID="{8354EFAF-31A0-41ED-A74D-DAE704B6C081}">
   <ds:schemaRefs>
-    <ds:schemaRef ds:uri="http://schemas.microsoft.com/sharepoint/v3/contenttype/forms"/>
+    <ds:schemaRef ds:uri="http://schemas.openxmlformats.org/package/2006/metadata/core-properties"/>
+    <ds:schemaRef ds:uri="http://schemas.microsoft.com/office/2006/documentManagement/types"/>
+    <ds:schemaRef ds:uri="http://www.w3.org/XML/1998/namespace"/>
+    <ds:schemaRef ds:uri="http://schemas.microsoft.com/office/infopath/2007/PartnerControls"/>
+    <ds:schemaRef ds:uri="http://purl.org/dc/elements/1.1/"/>
+    <ds:schemaRef ds:uri="e330c3bd-b73b-44bd-ae32-0c4bdfdcab8e"/>
+    <ds:schemaRef ds:uri="http://schemas.microsoft.com/office/2006/metadata/properties"/>
+    <ds:schemaRef ds:uri="http://purl.org/dc/dcmitype/"/>
+    <ds:schemaRef ds:uri="http://purl.org/dc/terms/"/>
   </ds:schemaRefs>
 </ds:datastoreItem>
 </file>
@@ -18017,17 +18258,9 @@
 </file>
 
 <file path=customXml/itemProps3.xml><?xml version="1.0" encoding="utf-8"?>
-<ds:datastoreItem xmlns:ds="http://schemas.openxmlformats.org/officeDocument/2006/customXml" ds:itemID="{8354EFAF-31A0-41ED-A74D-DAE704B6C081}">
+<ds:datastoreItem xmlns:ds="http://schemas.openxmlformats.org/officeDocument/2006/customXml" ds:itemID="{1981A0EB-802E-4D0E-9A2A-3AE4F15204D8}">
   <ds:schemaRefs>
-    <ds:schemaRef ds:uri="http://schemas.openxmlformats.org/package/2006/metadata/core-properties"/>
-    <ds:schemaRef ds:uri="http://schemas.microsoft.com/office/2006/documentManagement/types"/>
-    <ds:schemaRef ds:uri="http://www.w3.org/XML/1998/namespace"/>
-    <ds:schemaRef ds:uri="http://schemas.microsoft.com/office/infopath/2007/PartnerControls"/>
-    <ds:schemaRef ds:uri="http://purl.org/dc/elements/1.1/"/>
-    <ds:schemaRef ds:uri="e330c3bd-b73b-44bd-ae32-0c4bdfdcab8e"/>
-    <ds:schemaRef ds:uri="http://schemas.microsoft.com/office/2006/metadata/properties"/>
-    <ds:schemaRef ds:uri="http://purl.org/dc/dcmitype/"/>
-    <ds:schemaRef ds:uri="http://purl.org/dc/terms/"/>
+    <ds:schemaRef ds:uri="http://schemas.microsoft.com/sharepoint/v3/contenttype/forms"/>
   </ds:schemaRefs>
 </ds:datastoreItem>
 </file>
</xml_diff>

<commit_message>
Update presentation file for final review
</commit_message>
<xml_diff>
--- a/02_Backend/!_Docs/INF4_SYP_Gruppe1_Abschlusspräsentation.pptx
+++ b/02_Backend/!_Docs/INF4_SYP_Gruppe1_Abschlusspräsentation.pptx
@@ -6,10 +6,10 @@
     <p:sldMasterId id="2147483665" r:id="rId5"/>
   </p:sldMasterIdLst>
   <p:notesMasterIdLst>
-    <p:notesMasterId r:id="rId28"/>
+    <p:notesMasterId r:id="rId29"/>
   </p:notesMasterIdLst>
   <p:handoutMasterIdLst>
-    <p:handoutMasterId r:id="rId29"/>
+    <p:handoutMasterId r:id="rId30"/>
   </p:handoutMasterIdLst>
   <p:sldIdLst>
     <p:sldId id="361" r:id="rId6"/>
@@ -21,19 +21,20 @@
     <p:sldId id="583" r:id="rId12"/>
     <p:sldId id="596" r:id="rId13"/>
     <p:sldId id="597" r:id="rId14"/>
-    <p:sldId id="600" r:id="rId15"/>
-    <p:sldId id="606" r:id="rId16"/>
-    <p:sldId id="608" r:id="rId17"/>
-    <p:sldId id="598" r:id="rId18"/>
-    <p:sldId id="599" r:id="rId19"/>
-    <p:sldId id="607" r:id="rId20"/>
-    <p:sldId id="601" r:id="rId21"/>
-    <p:sldId id="602" r:id="rId22"/>
-    <p:sldId id="603" r:id="rId23"/>
-    <p:sldId id="605" r:id="rId24"/>
-    <p:sldId id="604" r:id="rId25"/>
-    <p:sldId id="610" r:id="rId26"/>
-    <p:sldId id="587" r:id="rId27"/>
+    <p:sldId id="611" r:id="rId15"/>
+    <p:sldId id="600" r:id="rId16"/>
+    <p:sldId id="606" r:id="rId17"/>
+    <p:sldId id="608" r:id="rId18"/>
+    <p:sldId id="598" r:id="rId19"/>
+    <p:sldId id="599" r:id="rId20"/>
+    <p:sldId id="607" r:id="rId21"/>
+    <p:sldId id="601" r:id="rId22"/>
+    <p:sldId id="602" r:id="rId23"/>
+    <p:sldId id="603" r:id="rId24"/>
+    <p:sldId id="605" r:id="rId25"/>
+    <p:sldId id="604" r:id="rId26"/>
+    <p:sldId id="610" r:id="rId27"/>
+    <p:sldId id="587" r:id="rId28"/>
   </p:sldIdLst>
   <p:sldSz cx="9144000" cy="6858000" type="screen4x3"/>
   <p:notesSz cx="7099300" cy="10234613"/>
@@ -835,7 +836,7 @@
             </a:pPr>
             <a:fld id="{3953DA5E-C6E2-4FA2-8BC8-7FF9A5EB6734}" type="datetimeFigureOut">
               <a:rPr lang="de-DE"/>
-              <a:t>11.06.2025</a:t>
+              <a:t>16.06.2025</a:t>
             </a:fld>
             <a:endParaRPr lang="de-DE"/>
           </a:p>
@@ -1016,7 +1017,7 @@
           <a:p>
             <a:fld id="{88DE360A-102B-474E-BEC0-79AC7566E430}" type="datetimeFigureOut">
               <a:rPr lang="en-US" smtClean="0"/>
-              <a:t>6/11/2025</a:t>
+              <a:t>6/16/2025</a:t>
             </a:fld>
             <a:endParaRPr lang="en-US"/>
           </a:p>
@@ -1475,7 +1476,7 @@
           <a:p>
             <a:fld id="{18D8EB10-9094-CC46-9BCA-615730AD1A2C}" type="slidenum">
               <a:rPr lang="en-US" smtClean="0"/>
-              <a:t>15</a:t>
+              <a:t>16</a:t>
             </a:fld>
             <a:endParaRPr lang="en-US"/>
           </a:p>
@@ -1583,7 +1584,7 @@
           <a:p>
             <a:fld id="{18D8EB10-9094-CC46-9BCA-615730AD1A2C}" type="slidenum">
               <a:rPr lang="en-US" smtClean="0"/>
-              <a:t>16</a:t>
+              <a:t>17</a:t>
             </a:fld>
             <a:endParaRPr lang="en-US"/>
           </a:p>
@@ -1691,7 +1692,7 @@
           <a:p>
             <a:fld id="{18D8EB10-9094-CC46-9BCA-615730AD1A2C}" type="slidenum">
               <a:rPr lang="en-US" smtClean="0"/>
-              <a:t>17</a:t>
+              <a:t>18</a:t>
             </a:fld>
             <a:endParaRPr lang="en-US"/>
           </a:p>
@@ -1799,7 +1800,7 @@
           <a:p>
             <a:fld id="{18D8EB10-9094-CC46-9BCA-615730AD1A2C}" type="slidenum">
               <a:rPr lang="en-US" smtClean="0"/>
-              <a:t>18</a:t>
+              <a:t>19</a:t>
             </a:fld>
             <a:endParaRPr lang="en-US"/>
           </a:p>
@@ -1907,7 +1908,7 @@
           <a:p>
             <a:fld id="{18D8EB10-9094-CC46-9BCA-615730AD1A2C}" type="slidenum">
               <a:rPr lang="en-US" smtClean="0"/>
-              <a:t>19</a:t>
+              <a:t>20</a:t>
             </a:fld>
             <a:endParaRPr lang="en-US"/>
           </a:p>
@@ -2015,7 +2016,7 @@
           <a:p>
             <a:fld id="{18D8EB10-9094-CC46-9BCA-615730AD1A2C}" type="slidenum">
               <a:rPr lang="en-US" smtClean="0"/>
-              <a:t>20</a:t>
+              <a:t>21</a:t>
             </a:fld>
             <a:endParaRPr lang="en-US"/>
           </a:p>
@@ -2423,7 +2424,7 @@
           <a:p>
             <a:fld id="{18D8EB10-9094-CC46-9BCA-615730AD1A2C}" type="slidenum">
               <a:rPr lang="en-US" smtClean="0"/>
-              <a:t>10</a:t>
+              <a:t>11</a:t>
             </a:fld>
             <a:endParaRPr lang="en-US"/>
           </a:p>
@@ -2531,7 +2532,7 @@
           <a:p>
             <a:fld id="{18D8EB10-9094-CC46-9BCA-615730AD1A2C}" type="slidenum">
               <a:rPr lang="en-US" smtClean="0"/>
-              <a:t>11</a:t>
+              <a:t>12</a:t>
             </a:fld>
             <a:endParaRPr lang="en-US"/>
           </a:p>
@@ -2639,7 +2640,7 @@
           <a:p>
             <a:fld id="{18D8EB10-9094-CC46-9BCA-615730AD1A2C}" type="slidenum">
               <a:rPr lang="en-US" smtClean="0"/>
-              <a:t>12</a:t>
+              <a:t>13</a:t>
             </a:fld>
             <a:endParaRPr lang="en-US"/>
           </a:p>
@@ -2747,7 +2748,7 @@
           <a:p>
             <a:fld id="{18D8EB10-9094-CC46-9BCA-615730AD1A2C}" type="slidenum">
               <a:rPr lang="en-US" smtClean="0"/>
-              <a:t>13</a:t>
+              <a:t>14</a:t>
             </a:fld>
             <a:endParaRPr lang="en-US"/>
           </a:p>
@@ -2855,7 +2856,7 @@
           <a:p>
             <a:fld id="{18D8EB10-9094-CC46-9BCA-615730AD1A2C}" type="slidenum">
               <a:rPr lang="en-US" smtClean="0"/>
-              <a:t>14</a:t>
+              <a:t>15</a:t>
             </a:fld>
             <a:endParaRPr lang="en-US"/>
           </a:p>
@@ -4494,7 +4495,7 @@
           <a:p>
             <a:fld id="{80DAFC0C-F6F0-42C1-9C86-43D76B94E1FF}" type="datetimeFigureOut">
               <a:rPr lang="de-AT" smtClean="0"/>
-              <a:t>11.06.2025</a:t>
+              <a:t>16.06.2025</a:t>
             </a:fld>
             <a:endParaRPr lang="de-AT"/>
           </a:p>
@@ -4694,7 +4695,7 @@
           <a:p>
             <a:fld id="{80DAFC0C-F6F0-42C1-9C86-43D76B94E1FF}" type="datetimeFigureOut">
               <a:rPr lang="de-AT" smtClean="0"/>
-              <a:t>11.06.2025</a:t>
+              <a:t>16.06.2025</a:t>
             </a:fld>
             <a:endParaRPr lang="de-AT"/>
           </a:p>
@@ -4970,7 +4971,7 @@
           <a:p>
             <a:fld id="{80DAFC0C-F6F0-42C1-9C86-43D76B94E1FF}" type="datetimeFigureOut">
               <a:rPr lang="de-AT" smtClean="0"/>
-              <a:t>11.06.2025</a:t>
+              <a:t>16.06.2025</a:t>
             </a:fld>
             <a:endParaRPr lang="de-AT"/>
           </a:p>
@@ -5238,7 +5239,7 @@
           <a:p>
             <a:fld id="{80DAFC0C-F6F0-42C1-9C86-43D76B94E1FF}" type="datetimeFigureOut">
               <a:rPr lang="de-AT" smtClean="0"/>
-              <a:t>11.06.2025</a:t>
+              <a:t>16.06.2025</a:t>
             </a:fld>
             <a:endParaRPr lang="de-AT"/>
           </a:p>
@@ -5856,7 +5857,7 @@
           <a:p>
             <a:fld id="{80DAFC0C-F6F0-42C1-9C86-43D76B94E1FF}" type="datetimeFigureOut">
               <a:rPr lang="de-AT" smtClean="0"/>
-              <a:t>11.06.2025</a:t>
+              <a:t>16.06.2025</a:t>
             </a:fld>
             <a:endParaRPr lang="de-AT"/>
           </a:p>
@@ -5998,7 +5999,7 @@
           <a:p>
             <a:fld id="{80DAFC0C-F6F0-42C1-9C86-43D76B94E1FF}" type="datetimeFigureOut">
               <a:rPr lang="de-AT" smtClean="0"/>
-              <a:t>11.06.2025</a:t>
+              <a:t>16.06.2025</a:t>
             </a:fld>
             <a:endParaRPr lang="de-AT"/>
           </a:p>
@@ -6111,7 +6112,7 @@
           <a:p>
             <a:fld id="{80DAFC0C-F6F0-42C1-9C86-43D76B94E1FF}" type="datetimeFigureOut">
               <a:rPr lang="de-AT" smtClean="0"/>
-              <a:t>11.06.2025</a:t>
+              <a:t>16.06.2025</a:t>
             </a:fld>
             <a:endParaRPr lang="de-AT"/>
           </a:p>
@@ -6424,7 +6425,7 @@
           <a:p>
             <a:fld id="{80DAFC0C-F6F0-42C1-9C86-43D76B94E1FF}" type="datetimeFigureOut">
               <a:rPr lang="de-AT" smtClean="0"/>
-              <a:t>11.06.2025</a:t>
+              <a:t>16.06.2025</a:t>
             </a:fld>
             <a:endParaRPr lang="de-AT"/>
           </a:p>
@@ -6713,7 +6714,7 @@
           <a:p>
             <a:fld id="{80DAFC0C-F6F0-42C1-9C86-43D76B94E1FF}" type="datetimeFigureOut">
               <a:rPr lang="de-AT" smtClean="0"/>
-              <a:t>11.06.2025</a:t>
+              <a:t>16.06.2025</a:t>
             </a:fld>
             <a:endParaRPr lang="de-AT"/>
           </a:p>
@@ -6913,7 +6914,7 @@
           <a:p>
             <a:fld id="{80DAFC0C-F6F0-42C1-9C86-43D76B94E1FF}" type="datetimeFigureOut">
               <a:rPr lang="de-AT" smtClean="0"/>
-              <a:t>11.06.2025</a:t>
+              <a:t>16.06.2025</a:t>
             </a:fld>
             <a:endParaRPr lang="de-AT"/>
           </a:p>
@@ -7123,7 +7124,7 @@
           <a:p>
             <a:fld id="{80DAFC0C-F6F0-42C1-9C86-43D76B94E1FF}" type="datetimeFigureOut">
               <a:rPr lang="de-AT" smtClean="0"/>
-              <a:t>11.06.2025</a:t>
+              <a:t>16.06.2025</a:t>
             </a:fld>
             <a:endParaRPr lang="de-AT"/>
           </a:p>
@@ -9619,7 +9620,7 @@
           <a:p>
             <a:fld id="{80DAFC0C-F6F0-42C1-9C86-43D76B94E1FF}" type="datetimeFigureOut">
               <a:rPr lang="de-AT" smtClean="0"/>
-              <a:t>11.06.2025</a:t>
+              <a:t>16.06.2025</a:t>
             </a:fld>
             <a:endParaRPr lang="de-AT"/>
           </a:p>
@@ -10282,6 +10283,290 @@
   <p:cSld>
     <p:spTree>
       <p:nvGrpSpPr>
+        <p:cNvPr id="1" name=""/>
+        <p:cNvGrpSpPr/>
+        <p:nvPr/>
+      </p:nvGrpSpPr>
+      <p:grpSpPr>
+        <a:xfrm>
+          <a:off x="0" y="0"/>
+          <a:ext cx="0" cy="0"/>
+          <a:chOff x="0" y="0"/>
+          <a:chExt cx="0" cy="0"/>
+        </a:xfrm>
+      </p:grpSpPr>
+      <p:sp>
+        <p:nvSpPr>
+          <p:cNvPr id="2" name="Titel 1">
+            <a:extLst>
+              <a:ext uri="{FF2B5EF4-FFF2-40B4-BE49-F238E27FC236}">
+                <a16:creationId xmlns:a16="http://schemas.microsoft.com/office/drawing/2014/main" id="{3B3ABC6B-A9E9-6882-551F-8AB797E2B6F0}"/>
+              </a:ext>
+            </a:extLst>
+          </p:cNvPr>
+          <p:cNvSpPr>
+            <a:spLocks noGrp="1"/>
+          </p:cNvSpPr>
+          <p:nvPr>
+            <p:ph type="title"/>
+          </p:nvPr>
+        </p:nvSpPr>
+        <p:spPr/>
+        <p:txBody>
+          <a:bodyPr/>
+          <a:lstStyle/>
+          <a:p>
+            <a:r>
+              <a:rPr lang="de-DE" dirty="0"/>
+              <a:t>Wer hat was gemacht?</a:t>
+            </a:r>
+          </a:p>
+        </p:txBody>
+      </p:sp>
+      <p:sp>
+        <p:nvSpPr>
+          <p:cNvPr id="3" name="Inhaltsplatzhalter 2">
+            <a:extLst>
+              <a:ext uri="{FF2B5EF4-FFF2-40B4-BE49-F238E27FC236}">
+                <a16:creationId xmlns:a16="http://schemas.microsoft.com/office/drawing/2014/main" id="{DD1D7912-6970-ECAF-E6FE-D5DC468AD979}"/>
+              </a:ext>
+            </a:extLst>
+          </p:cNvPr>
+          <p:cNvSpPr>
+            <a:spLocks noGrp="1"/>
+          </p:cNvSpPr>
+          <p:nvPr>
+            <p:ph idx="1"/>
+          </p:nvPr>
+        </p:nvSpPr>
+        <p:spPr/>
+        <p:txBody>
+          <a:bodyPr/>
+          <a:lstStyle/>
+          <a:p>
+            <a:r>
+              <a:rPr lang="de-DE" sz="1800" b="1" dirty="0"/>
+              <a:t>Jonas Aberger</a:t>
+            </a:r>
+          </a:p>
+          <a:p>
+            <a:pPr lvl="1">
+              <a:buFont typeface="Symbol" panose="05050102010706020507" pitchFamily="18" charset="2"/>
+              <a:buChar char="-"/>
+            </a:pPr>
+            <a:r>
+              <a:rPr lang="de-DE" sz="2000" dirty="0"/>
+              <a:t> Kontrolle des </a:t>
+            </a:r>
+            <a:r>
+              <a:rPr lang="de-DE" sz="2000" dirty="0" err="1"/>
+              <a:t>MBots</a:t>
+            </a:r>
+            <a:endParaRPr lang="de-DE" sz="2000" dirty="0"/>
+          </a:p>
+          <a:p>
+            <a:pPr lvl="1">
+              <a:buFont typeface="Symbol" panose="05050102010706020507" pitchFamily="18" charset="2"/>
+              <a:buChar char="-"/>
+            </a:pPr>
+            <a:r>
+              <a:rPr lang="de-DE" sz="2000" dirty="0"/>
+              <a:t> Fahrstreckenlogik &amp; Physisches Steuerungsmodul</a:t>
+            </a:r>
+          </a:p>
+          <a:p>
+            <a:pPr lvl="1">
+              <a:buFont typeface="Symbol" panose="05050102010706020507" pitchFamily="18" charset="2"/>
+              <a:buChar char="-"/>
+            </a:pPr>
+            <a:r>
+              <a:rPr lang="de-DE" sz="2000" dirty="0"/>
+              <a:t> Verbindung zum </a:t>
+            </a:r>
+            <a:r>
+              <a:rPr lang="de-DE" sz="2000" dirty="0" err="1"/>
+              <a:t>MBot</a:t>
+            </a:r>
+            <a:endParaRPr lang="de-DE" sz="2000" dirty="0"/>
+          </a:p>
+          <a:p>
+            <a:pPr lvl="1">
+              <a:buFont typeface="Symbol" panose="05050102010706020507" pitchFamily="18" charset="2"/>
+              <a:buChar char="-"/>
+            </a:pPr>
+            <a:r>
+              <a:rPr lang="de-DE" sz="2000" dirty="0"/>
+              <a:t> Abrufen der Daten des </a:t>
+            </a:r>
+            <a:r>
+              <a:rPr lang="de-DE" sz="2000" dirty="0" err="1"/>
+              <a:t>MBots</a:t>
+            </a:r>
+            <a:endParaRPr lang="de-DE" sz="2000" dirty="0"/>
+          </a:p>
+          <a:p>
+            <a:r>
+              <a:rPr lang="de-DE" sz="1800" b="1" dirty="0"/>
+              <a:t>Fabian Haslinger</a:t>
+            </a:r>
+          </a:p>
+          <a:p>
+            <a:pPr lvl="1">
+              <a:buFont typeface="Symbol" panose="05050102010706020507" pitchFamily="18" charset="2"/>
+              <a:buChar char="-"/>
+            </a:pPr>
+            <a:r>
+              <a:rPr lang="de-DE" sz="2000" dirty="0"/>
+              <a:t> DB &amp; DB-Connection</a:t>
+            </a:r>
+          </a:p>
+          <a:p>
+            <a:pPr lvl="1">
+              <a:buFont typeface="Symbol" panose="05050102010706020507" pitchFamily="18" charset="2"/>
+              <a:buChar char="-"/>
+            </a:pPr>
+            <a:r>
+              <a:rPr lang="de-DE" sz="2000" dirty="0"/>
+              <a:t> Discovery-Mode</a:t>
+            </a:r>
+          </a:p>
+          <a:p>
+            <a:pPr lvl="1">
+              <a:buFont typeface="Symbol" panose="05050102010706020507" pitchFamily="18" charset="2"/>
+              <a:buChar char="-"/>
+            </a:pPr>
+            <a:r>
+              <a:rPr lang="de-DE" sz="2000" dirty="0"/>
+              <a:t> </a:t>
+            </a:r>
+            <a:r>
+              <a:rPr lang="de-DE" sz="2000" dirty="0" err="1"/>
+              <a:t>Shoulder</a:t>
+            </a:r>
+            <a:r>
+              <a:rPr lang="de-DE" sz="2000" dirty="0"/>
+              <a:t> Surfing</a:t>
+            </a:r>
+          </a:p>
+          <a:p>
+            <a:r>
+              <a:rPr lang="de-DE" sz="1800" b="1" dirty="0"/>
+              <a:t>Tim Hechenberger</a:t>
+            </a:r>
+          </a:p>
+          <a:p>
+            <a:pPr lvl="1">
+              <a:buFont typeface="Symbol" panose="05050102010706020507" pitchFamily="18" charset="2"/>
+              <a:buChar char="-"/>
+            </a:pPr>
+            <a:r>
+              <a:rPr lang="de-DE" sz="2000" dirty="0"/>
+              <a:t> API</a:t>
+            </a:r>
+          </a:p>
+          <a:p>
+            <a:pPr lvl="1">
+              <a:buFont typeface="Symbol" panose="05050102010706020507" pitchFamily="18" charset="2"/>
+              <a:buChar char="-"/>
+            </a:pPr>
+            <a:r>
+              <a:rPr lang="de-DE" sz="2000" dirty="0"/>
+              <a:t> Unittests</a:t>
+            </a:r>
+          </a:p>
+          <a:p>
+            <a:pPr lvl="1">
+              <a:buFont typeface="Symbol" panose="05050102010706020507" pitchFamily="18" charset="2"/>
+              <a:buChar char="-"/>
+            </a:pPr>
+            <a:r>
+              <a:rPr lang="de-DE" sz="2000" dirty="0"/>
+              <a:t> Discovery-Mode</a:t>
+            </a:r>
+          </a:p>
+        </p:txBody>
+      </p:sp>
+      <p:sp>
+        <p:nvSpPr>
+          <p:cNvPr id="4" name="Fußzeilenplatzhalter 3">
+            <a:extLst>
+              <a:ext uri="{FF2B5EF4-FFF2-40B4-BE49-F238E27FC236}">
+                <a16:creationId xmlns:a16="http://schemas.microsoft.com/office/drawing/2014/main" id="{86E635ED-EA58-3B69-54F2-F5DF8BCBFEBB}"/>
+              </a:ext>
+            </a:extLst>
+          </p:cNvPr>
+          <p:cNvSpPr>
+            <a:spLocks noGrp="1"/>
+          </p:cNvSpPr>
+          <p:nvPr>
+            <p:ph type="ftr" sz="quarter" idx="11"/>
+          </p:nvPr>
+        </p:nvSpPr>
+        <p:spPr/>
+        <p:txBody>
+          <a:bodyPr/>
+          <a:lstStyle/>
+          <a:p>
+            <a:pPr>
+              <a:defRPr/>
+            </a:pPr>
+            <a:r>
+              <a:rPr lang="de-DE"/>
+              <a:t>DI(FH) Falkensteiner Markus</a:t>
+            </a:r>
+          </a:p>
+        </p:txBody>
+      </p:sp>
+      <p:sp>
+        <p:nvSpPr>
+          <p:cNvPr id="5" name="Foliennummernplatzhalter 4">
+            <a:extLst>
+              <a:ext uri="{FF2B5EF4-FFF2-40B4-BE49-F238E27FC236}">
+                <a16:creationId xmlns:a16="http://schemas.microsoft.com/office/drawing/2014/main" id="{037415F5-EFC1-FD28-95FF-C380BFF93F6C}"/>
+              </a:ext>
+            </a:extLst>
+          </p:cNvPr>
+          <p:cNvSpPr>
+            <a:spLocks noGrp="1"/>
+          </p:cNvSpPr>
+          <p:nvPr>
+            <p:ph type="sldNum" sz="quarter" idx="12"/>
+          </p:nvPr>
+        </p:nvSpPr>
+        <p:spPr/>
+        <p:txBody>
+          <a:bodyPr/>
+          <a:lstStyle/>
+          <a:p>
+            <a:pPr>
+              <a:defRPr/>
+            </a:pPr>
+            <a:fld id="{AE4538FE-AEB4-413B-B741-EC1BAEEF6B8F}" type="slidenum">
+              <a:rPr lang="de-AT" smtClean="0"/>
+              <a:t>10</a:t>
+            </a:fld>
+            <a:endParaRPr lang="de-AT"/>
+          </a:p>
+        </p:txBody>
+      </p:sp>
+    </p:spTree>
+    <p:extLst>
+      <p:ext uri="{BB962C8B-B14F-4D97-AF65-F5344CB8AC3E}">
+        <p14:creationId xmlns:p14="http://schemas.microsoft.com/office/powerpoint/2010/main" val="4280838930"/>
+      </p:ext>
+    </p:extLst>
+  </p:cSld>
+  <p:clrMapOvr>
+    <a:masterClrMapping/>
+  </p:clrMapOvr>
+</p:sld>
+</file>
+
+<file path=ppt/slides/slide11.xml><?xml version="1.0" encoding="utf-8"?>
+<p:sld xmlns:a="http://schemas.openxmlformats.org/drawingml/2006/main" xmlns:r="http://schemas.openxmlformats.org/officeDocument/2006/relationships" xmlns:p="http://schemas.openxmlformats.org/presentationml/2006/main">
+  <p:cSld>
+    <p:spTree>
+      <p:nvGrpSpPr>
         <p:cNvPr id="1" name="">
           <a:extLst>
             <a:ext uri="{FF2B5EF4-FFF2-40B4-BE49-F238E27FC236}">
@@ -10392,7 +10677,7 @@
             </a:pPr>
             <a:fld id="{AE4538FE-AEB4-413B-B741-EC1BAEEF6B8F}" type="slidenum">
               <a:rPr lang="de-AT" smtClean="0"/>
-              <a:t>10</a:t>
+              <a:t>11</a:t>
             </a:fld>
             <a:endParaRPr lang="de-AT"/>
           </a:p>
@@ -10831,375 +11116,6 @@
     <p:extLst>
       <p:ext uri="{BB962C8B-B14F-4D97-AF65-F5344CB8AC3E}">
         <p14:creationId xmlns:p14="http://schemas.microsoft.com/office/powerpoint/2010/main" val="1627836163"/>
-      </p:ext>
-    </p:extLst>
-  </p:cSld>
-  <p:clrMapOvr>
-    <a:masterClrMapping/>
-  </p:clrMapOvr>
-  <mc:AlternateContent xmlns:mc="http://schemas.openxmlformats.org/markup-compatibility/2006" xmlns:p14="http://schemas.microsoft.com/office/powerpoint/2010/main">
-    <mc:Choice Requires="p14">
-      <p:transition spd="med" p14:dur="700">
-        <p:fade/>
-      </p:transition>
-    </mc:Choice>
-    <mc:Fallback xmlns="">
-      <p:transition spd="med">
-        <p:fade/>
-      </p:transition>
-    </mc:Fallback>
-  </mc:AlternateContent>
-</p:sld>
-</file>
-
-<file path=ppt/slides/slide11.xml><?xml version="1.0" encoding="utf-8"?>
-<p:sld xmlns:a="http://schemas.openxmlformats.org/drawingml/2006/main" xmlns:r="http://schemas.openxmlformats.org/officeDocument/2006/relationships" xmlns:p="http://schemas.openxmlformats.org/presentationml/2006/main">
-  <p:cSld>
-    <p:spTree>
-      <p:nvGrpSpPr>
-        <p:cNvPr id="1" name="">
-          <a:extLst>
-            <a:ext uri="{FF2B5EF4-FFF2-40B4-BE49-F238E27FC236}">
-              <a16:creationId xmlns:a16="http://schemas.microsoft.com/office/drawing/2014/main" id="{0F086092-51C1-8D0C-D3B9-8CFBE126EDD6}"/>
-            </a:ext>
-          </a:extLst>
-        </p:cNvPr>
-        <p:cNvGrpSpPr/>
-        <p:nvPr/>
-      </p:nvGrpSpPr>
-      <p:grpSpPr>
-        <a:xfrm>
-          <a:off x="0" y="0"/>
-          <a:ext cx="0" cy="0"/>
-          <a:chOff x="0" y="0"/>
-          <a:chExt cx="0" cy="0"/>
-        </a:xfrm>
-      </p:grpSpPr>
-      <p:pic>
-        <p:nvPicPr>
-          <p:cNvPr id="15" name="Grafik 14">
-            <a:extLst>
-              <a:ext uri="{FF2B5EF4-FFF2-40B4-BE49-F238E27FC236}">
-                <a16:creationId xmlns:a16="http://schemas.microsoft.com/office/drawing/2014/main" id="{BB411CD3-7E80-1F5A-D07F-23CBC9FDDFF2}"/>
-              </a:ext>
-            </a:extLst>
-          </p:cNvPr>
-          <p:cNvPicPr>
-            <a:picLocks noChangeAspect="1"/>
-          </p:cNvPicPr>
-          <p:nvPr/>
-        </p:nvPicPr>
-        <p:blipFill>
-          <a:blip r:embed="rId3">
-            <a:extLst>
-              <a:ext uri="{96DAC541-7B7A-43D3-8B79-37D633B846F1}">
-                <asvg:svgBlip xmlns:asvg="http://schemas.microsoft.com/office/drawing/2016/SVG/main" r:embed="rId4"/>
-              </a:ext>
-            </a:extLst>
-          </a:blip>
-          <a:srcRect t="3579"/>
-          <a:stretch>
-            <a:fillRect/>
-          </a:stretch>
-        </p:blipFill>
-        <p:spPr>
-          <a:xfrm>
-            <a:off x="3640637" y="142568"/>
-            <a:ext cx="5352032" cy="6715432"/>
-          </a:xfrm>
-          <a:prstGeom prst="rect">
-            <a:avLst/>
-          </a:prstGeom>
-        </p:spPr>
-      </p:pic>
-      <p:sp>
-        <p:nvSpPr>
-          <p:cNvPr id="9" name="Slide Number Placeholder 8">
-            <a:extLst>
-              <a:ext uri="{FF2B5EF4-FFF2-40B4-BE49-F238E27FC236}">
-                <a16:creationId xmlns:a16="http://schemas.microsoft.com/office/drawing/2014/main" id="{FA3DA740-BDF0-32C4-D0C4-8147B4DFF455}"/>
-              </a:ext>
-            </a:extLst>
-          </p:cNvPr>
-          <p:cNvSpPr>
-            <a:spLocks noGrp="1"/>
-          </p:cNvSpPr>
-          <p:nvPr>
-            <p:ph type="sldNum" sz="quarter" idx="12"/>
-          </p:nvPr>
-        </p:nvSpPr>
-        <p:spPr/>
-        <p:txBody>
-          <a:bodyPr>
-            <a:normAutofit/>
-          </a:bodyPr>
-          <a:lstStyle/>
-          <a:p>
-            <a:pPr>
-              <a:spcAft>
-                <a:spcPts val="600"/>
-              </a:spcAft>
-              <a:defRPr/>
-            </a:pPr>
-            <a:fld id="{AE4538FE-AEB4-413B-B741-EC1BAEEF6B8F}" type="slidenum">
-              <a:rPr lang="de-AT" smtClean="0"/>
-              <a:pPr>
-                <a:spcAft>
-                  <a:spcPts val="600"/>
-                </a:spcAft>
-                <a:defRPr/>
-              </a:pPr>
-              <a:t>11</a:t>
-            </a:fld>
-            <a:endParaRPr lang="de-AT" dirty="0"/>
-          </a:p>
-        </p:txBody>
-      </p:sp>
-      <p:sp>
-        <p:nvSpPr>
-          <p:cNvPr id="16" name="Textfeld 15">
-            <a:extLst>
-              <a:ext uri="{FF2B5EF4-FFF2-40B4-BE49-F238E27FC236}">
-                <a16:creationId xmlns:a16="http://schemas.microsoft.com/office/drawing/2014/main" id="{9CEE6F2D-1FC2-062F-483E-8DF6B655EFDD}"/>
-              </a:ext>
-            </a:extLst>
-          </p:cNvPr>
-          <p:cNvSpPr txBox="1"/>
-          <p:nvPr/>
-        </p:nvSpPr>
-        <p:spPr>
-          <a:xfrm>
-            <a:off x="235974" y="245806"/>
-            <a:ext cx="3333136" cy="13526780"/>
-          </a:xfrm>
-          <a:prstGeom prst="rect">
-            <a:avLst/>
-          </a:prstGeom>
-          <a:noFill/>
-        </p:spPr>
-        <p:txBody>
-          <a:bodyPr wrap="square" rtlCol="0">
-            <a:spAutoFit/>
-          </a:bodyPr>
-          <a:lstStyle/>
-          <a:p>
-            <a:r>
-              <a:rPr lang="de-AT" sz="2800" b="1" dirty="0"/>
-              <a:t>Funktionalität und Systemverteilung</a:t>
-            </a:r>
-          </a:p>
-          <a:p>
-            <a:endParaRPr lang="de-AT" sz="800" b="1" dirty="0"/>
-          </a:p>
-          <a:p>
-            <a:endParaRPr lang="de-AT" sz="800" b="1" dirty="0"/>
-          </a:p>
-          <a:p>
-            <a:r>
-              <a:rPr lang="de-AT" sz="2100" b="1" dirty="0"/>
-              <a:t>PC-</a:t>
-            </a:r>
-            <a:r>
-              <a:rPr lang="de-AT" sz="2100" b="1" dirty="0" err="1"/>
-              <a:t>Hosted</a:t>
-            </a:r>
-            <a:r>
-              <a:rPr lang="de-AT" sz="2100" b="1" dirty="0"/>
-              <a:t> Backend</a:t>
-            </a:r>
-          </a:p>
-          <a:p>
-            <a:r>
-              <a:rPr lang="de-AT" sz="1900" dirty="0"/>
-              <a:t>Die gesamte Backend-</a:t>
-            </a:r>
-            <a:r>
-              <a:rPr lang="de-AT" sz="1900" dirty="0" err="1"/>
-              <a:t>Application</a:t>
-            </a:r>
-            <a:r>
-              <a:rPr lang="de-AT" sz="1900" dirty="0"/>
-              <a:t> wird mittels einem PC </a:t>
-            </a:r>
-            <a:r>
-              <a:rPr lang="de-AT" sz="1900" dirty="0" err="1"/>
-              <a:t>gehosted</a:t>
-            </a:r>
-            <a:endParaRPr lang="de-AT" sz="1900" dirty="0"/>
-          </a:p>
-          <a:p>
-            <a:endParaRPr lang="de-AT" sz="500" dirty="0"/>
-          </a:p>
-          <a:p>
-            <a:endParaRPr lang="de-AT" sz="500" b="1" dirty="0"/>
-          </a:p>
-          <a:p>
-            <a:r>
-              <a:rPr lang="de-AT" sz="2100" b="1" dirty="0"/>
-              <a:t>Service-Manager</a:t>
-            </a:r>
-          </a:p>
-          <a:p>
-            <a:r>
-              <a:rPr lang="de-AT" sz="1900" b="1" dirty="0"/>
-              <a:t>Frontend-Bridge</a:t>
-            </a:r>
-            <a:endParaRPr lang="de-AT" sz="500" dirty="0"/>
-          </a:p>
-          <a:p>
-            <a:r>
-              <a:rPr lang="de-AT" sz="1900" b="1" dirty="0" err="1"/>
-              <a:t>MBot</a:t>
-            </a:r>
-            <a:r>
-              <a:rPr lang="de-AT" sz="1900" b="1" dirty="0"/>
-              <a:t>-Bridge</a:t>
-            </a:r>
-          </a:p>
-          <a:p>
-            <a:r>
-              <a:rPr lang="de-AT" sz="1900" b="1" dirty="0"/>
-              <a:t>DB-Bridge</a:t>
-            </a:r>
-          </a:p>
-          <a:p>
-            <a:endParaRPr lang="de-AT" sz="500" b="1" dirty="0"/>
-          </a:p>
-          <a:p>
-            <a:endParaRPr lang="de-AT" sz="500" b="1" dirty="0"/>
-          </a:p>
-          <a:p>
-            <a:r>
-              <a:rPr lang="de-AT" sz="2100" b="1" dirty="0" err="1"/>
-              <a:t>Locally-Stored</a:t>
-            </a:r>
-            <a:r>
-              <a:rPr lang="de-AT" sz="2100" b="1" dirty="0"/>
-              <a:t> Logs</a:t>
-            </a:r>
-          </a:p>
-          <a:p>
-            <a:r>
-              <a:rPr lang="de-AT" dirty="0"/>
-              <a:t>Temporäre Speicherung der Fahrstrecken zur </a:t>
-            </a:r>
-            <a:r>
-              <a:rPr lang="de-AT" dirty="0" err="1"/>
-              <a:t>spätern</a:t>
-            </a:r>
-            <a:r>
-              <a:rPr lang="de-AT" dirty="0"/>
-              <a:t> Verarbeitung</a:t>
-            </a:r>
-          </a:p>
-          <a:p>
-            <a:endParaRPr lang="de-AT" sz="500" b="1" dirty="0"/>
-          </a:p>
-          <a:p>
-            <a:endParaRPr lang="de-AT" sz="500" b="1" dirty="0"/>
-          </a:p>
-          <a:p>
-            <a:endParaRPr lang="de-AT" sz="500" b="1" dirty="0"/>
-          </a:p>
-          <a:p>
-            <a:endParaRPr lang="de-AT" sz="500" b="1" dirty="0"/>
-          </a:p>
-          <a:p>
-            <a:r>
-              <a:rPr lang="de-AT" sz="2100" b="1" dirty="0"/>
-              <a:t>MongoDB Datenbank</a:t>
-            </a:r>
-          </a:p>
-          <a:p>
-            <a:r>
-              <a:rPr lang="de-AT" dirty="0"/>
-              <a:t>Konsistente Speicherung der Fahrstrecken</a:t>
-            </a:r>
-          </a:p>
-          <a:p>
-            <a:endParaRPr lang="de-AT" sz="2100" b="1" dirty="0"/>
-          </a:p>
-          <a:p>
-            <a:endParaRPr lang="de-AT" b="1" dirty="0"/>
-          </a:p>
-          <a:p>
-            <a:endParaRPr lang="de-AT" b="1" dirty="0"/>
-          </a:p>
-          <a:p>
-            <a:endParaRPr lang="de-AT" b="1" dirty="0"/>
-          </a:p>
-          <a:p>
-            <a:endParaRPr lang="de-AT" dirty="0"/>
-          </a:p>
-          <a:p>
-            <a:endParaRPr lang="de-AT" dirty="0"/>
-          </a:p>
-          <a:p>
-            <a:endParaRPr lang="de-AT" dirty="0"/>
-          </a:p>
-          <a:p>
-            <a:endParaRPr lang="de-AT" dirty="0"/>
-          </a:p>
-          <a:p>
-            <a:endParaRPr lang="de-AT" dirty="0"/>
-          </a:p>
-          <a:p>
-            <a:endParaRPr lang="de-AT" dirty="0"/>
-          </a:p>
-          <a:p>
-            <a:endParaRPr lang="de-AT" dirty="0"/>
-          </a:p>
-          <a:p>
-            <a:endParaRPr lang="de-AT" dirty="0"/>
-          </a:p>
-          <a:p>
-            <a:endParaRPr lang="de-AT" dirty="0"/>
-          </a:p>
-          <a:p>
-            <a:endParaRPr lang="de-AT" dirty="0"/>
-          </a:p>
-          <a:p>
-            <a:endParaRPr lang="de-AT" dirty="0"/>
-          </a:p>
-          <a:p>
-            <a:endParaRPr lang="de-AT" dirty="0"/>
-          </a:p>
-          <a:p>
-            <a:endParaRPr lang="de-AT" dirty="0"/>
-          </a:p>
-          <a:p>
-            <a:endParaRPr lang="de-AT" dirty="0"/>
-          </a:p>
-          <a:p>
-            <a:endParaRPr lang="de-AT" dirty="0"/>
-          </a:p>
-          <a:p>
-            <a:endParaRPr lang="de-AT" dirty="0"/>
-          </a:p>
-          <a:p>
-            <a:endParaRPr lang="de-AT" dirty="0"/>
-          </a:p>
-          <a:p>
-            <a:endParaRPr lang="de-AT" dirty="0"/>
-          </a:p>
-          <a:p>
-            <a:endParaRPr lang="de-AT" dirty="0"/>
-          </a:p>
-          <a:p>
-            <a:endParaRPr lang="de-AT" dirty="0"/>
-          </a:p>
-          <a:p>
-            <a:endParaRPr lang="de-AT" dirty="0"/>
-          </a:p>
-          <a:p>
-            <a:endParaRPr lang="de-AT" dirty="0"/>
-          </a:p>
-        </p:txBody>
-      </p:sp>
-    </p:spTree>
-    <p:extLst>
-      <p:ext uri="{BB962C8B-B14F-4D97-AF65-F5344CB8AC3E}">
-        <p14:creationId xmlns:p14="http://schemas.microsoft.com/office/powerpoint/2010/main" val="1963864791"/>
       </p:ext>
     </p:extLst>
   </p:cSld>
@@ -11229,6 +11145,375 @@
         <p:cNvPr id="1" name="">
           <a:extLst>
             <a:ext uri="{FF2B5EF4-FFF2-40B4-BE49-F238E27FC236}">
+              <a16:creationId xmlns:a16="http://schemas.microsoft.com/office/drawing/2014/main" id="{0F086092-51C1-8D0C-D3B9-8CFBE126EDD6}"/>
+            </a:ext>
+          </a:extLst>
+        </p:cNvPr>
+        <p:cNvGrpSpPr/>
+        <p:nvPr/>
+      </p:nvGrpSpPr>
+      <p:grpSpPr>
+        <a:xfrm>
+          <a:off x="0" y="0"/>
+          <a:ext cx="0" cy="0"/>
+          <a:chOff x="0" y="0"/>
+          <a:chExt cx="0" cy="0"/>
+        </a:xfrm>
+      </p:grpSpPr>
+      <p:pic>
+        <p:nvPicPr>
+          <p:cNvPr id="15" name="Grafik 14">
+            <a:extLst>
+              <a:ext uri="{FF2B5EF4-FFF2-40B4-BE49-F238E27FC236}">
+                <a16:creationId xmlns:a16="http://schemas.microsoft.com/office/drawing/2014/main" id="{BB411CD3-7E80-1F5A-D07F-23CBC9FDDFF2}"/>
+              </a:ext>
+            </a:extLst>
+          </p:cNvPr>
+          <p:cNvPicPr>
+            <a:picLocks noChangeAspect="1"/>
+          </p:cNvPicPr>
+          <p:nvPr/>
+        </p:nvPicPr>
+        <p:blipFill>
+          <a:blip r:embed="rId3">
+            <a:extLst>
+              <a:ext uri="{96DAC541-7B7A-43D3-8B79-37D633B846F1}">
+                <asvg:svgBlip xmlns:asvg="http://schemas.microsoft.com/office/drawing/2016/SVG/main" r:embed="rId4"/>
+              </a:ext>
+            </a:extLst>
+          </a:blip>
+          <a:srcRect t="3579"/>
+          <a:stretch>
+            <a:fillRect/>
+          </a:stretch>
+        </p:blipFill>
+        <p:spPr>
+          <a:xfrm>
+            <a:off x="3640637" y="142568"/>
+            <a:ext cx="5352032" cy="6715432"/>
+          </a:xfrm>
+          <a:prstGeom prst="rect">
+            <a:avLst/>
+          </a:prstGeom>
+        </p:spPr>
+      </p:pic>
+      <p:sp>
+        <p:nvSpPr>
+          <p:cNvPr id="9" name="Slide Number Placeholder 8">
+            <a:extLst>
+              <a:ext uri="{FF2B5EF4-FFF2-40B4-BE49-F238E27FC236}">
+                <a16:creationId xmlns:a16="http://schemas.microsoft.com/office/drawing/2014/main" id="{FA3DA740-BDF0-32C4-D0C4-8147B4DFF455}"/>
+              </a:ext>
+            </a:extLst>
+          </p:cNvPr>
+          <p:cNvSpPr>
+            <a:spLocks noGrp="1"/>
+          </p:cNvSpPr>
+          <p:nvPr>
+            <p:ph type="sldNum" sz="quarter" idx="12"/>
+          </p:nvPr>
+        </p:nvSpPr>
+        <p:spPr/>
+        <p:txBody>
+          <a:bodyPr>
+            <a:normAutofit/>
+          </a:bodyPr>
+          <a:lstStyle/>
+          <a:p>
+            <a:pPr>
+              <a:spcAft>
+                <a:spcPts val="600"/>
+              </a:spcAft>
+              <a:defRPr/>
+            </a:pPr>
+            <a:fld id="{AE4538FE-AEB4-413B-B741-EC1BAEEF6B8F}" type="slidenum">
+              <a:rPr lang="de-AT" smtClean="0"/>
+              <a:pPr>
+                <a:spcAft>
+                  <a:spcPts val="600"/>
+                </a:spcAft>
+                <a:defRPr/>
+              </a:pPr>
+              <a:t>12</a:t>
+            </a:fld>
+            <a:endParaRPr lang="de-AT" dirty="0"/>
+          </a:p>
+        </p:txBody>
+      </p:sp>
+      <p:sp>
+        <p:nvSpPr>
+          <p:cNvPr id="16" name="Textfeld 15">
+            <a:extLst>
+              <a:ext uri="{FF2B5EF4-FFF2-40B4-BE49-F238E27FC236}">
+                <a16:creationId xmlns:a16="http://schemas.microsoft.com/office/drawing/2014/main" id="{9CEE6F2D-1FC2-062F-483E-8DF6B655EFDD}"/>
+              </a:ext>
+            </a:extLst>
+          </p:cNvPr>
+          <p:cNvSpPr txBox="1"/>
+          <p:nvPr/>
+        </p:nvSpPr>
+        <p:spPr>
+          <a:xfrm>
+            <a:off x="235974" y="245806"/>
+            <a:ext cx="3333136" cy="13526780"/>
+          </a:xfrm>
+          <a:prstGeom prst="rect">
+            <a:avLst/>
+          </a:prstGeom>
+          <a:noFill/>
+        </p:spPr>
+        <p:txBody>
+          <a:bodyPr wrap="square" rtlCol="0">
+            <a:spAutoFit/>
+          </a:bodyPr>
+          <a:lstStyle/>
+          <a:p>
+            <a:r>
+              <a:rPr lang="de-AT" sz="2800" b="1" dirty="0"/>
+              <a:t>Funktionalität und Systemverteilung</a:t>
+            </a:r>
+          </a:p>
+          <a:p>
+            <a:endParaRPr lang="de-AT" sz="800" b="1" dirty="0"/>
+          </a:p>
+          <a:p>
+            <a:endParaRPr lang="de-AT" sz="800" b="1" dirty="0"/>
+          </a:p>
+          <a:p>
+            <a:r>
+              <a:rPr lang="de-AT" sz="2100" b="1" dirty="0"/>
+              <a:t>PC-</a:t>
+            </a:r>
+            <a:r>
+              <a:rPr lang="de-AT" sz="2100" b="1" dirty="0" err="1"/>
+              <a:t>Hosted</a:t>
+            </a:r>
+            <a:r>
+              <a:rPr lang="de-AT" sz="2100" b="1" dirty="0"/>
+              <a:t> Backend</a:t>
+            </a:r>
+          </a:p>
+          <a:p>
+            <a:r>
+              <a:rPr lang="de-AT" sz="1900" dirty="0"/>
+              <a:t>Die gesamte Backend-</a:t>
+            </a:r>
+            <a:r>
+              <a:rPr lang="de-AT" sz="1900" dirty="0" err="1"/>
+              <a:t>Application</a:t>
+            </a:r>
+            <a:r>
+              <a:rPr lang="de-AT" sz="1900" dirty="0"/>
+              <a:t> wird mittels einem PC </a:t>
+            </a:r>
+            <a:r>
+              <a:rPr lang="de-AT" sz="1900" dirty="0" err="1"/>
+              <a:t>gehosted</a:t>
+            </a:r>
+            <a:endParaRPr lang="de-AT" sz="1900" dirty="0"/>
+          </a:p>
+          <a:p>
+            <a:endParaRPr lang="de-AT" sz="500" dirty="0"/>
+          </a:p>
+          <a:p>
+            <a:endParaRPr lang="de-AT" sz="500" b="1" dirty="0"/>
+          </a:p>
+          <a:p>
+            <a:r>
+              <a:rPr lang="de-AT" sz="2100" b="1" dirty="0"/>
+              <a:t>Service-Manager</a:t>
+            </a:r>
+          </a:p>
+          <a:p>
+            <a:r>
+              <a:rPr lang="de-AT" sz="1900" b="1" dirty="0"/>
+              <a:t>Frontend-Bridge</a:t>
+            </a:r>
+            <a:endParaRPr lang="de-AT" sz="500" dirty="0"/>
+          </a:p>
+          <a:p>
+            <a:r>
+              <a:rPr lang="de-AT" sz="1900" b="1" dirty="0" err="1"/>
+              <a:t>MBot</a:t>
+            </a:r>
+            <a:r>
+              <a:rPr lang="de-AT" sz="1900" b="1" dirty="0"/>
+              <a:t>-Bridge</a:t>
+            </a:r>
+          </a:p>
+          <a:p>
+            <a:r>
+              <a:rPr lang="de-AT" sz="1900" b="1" dirty="0"/>
+              <a:t>DB-Bridge</a:t>
+            </a:r>
+          </a:p>
+          <a:p>
+            <a:endParaRPr lang="de-AT" sz="500" b="1" dirty="0"/>
+          </a:p>
+          <a:p>
+            <a:endParaRPr lang="de-AT" sz="500" b="1" dirty="0"/>
+          </a:p>
+          <a:p>
+            <a:r>
+              <a:rPr lang="de-AT" sz="2100" b="1" dirty="0" err="1"/>
+              <a:t>Locally-Stored</a:t>
+            </a:r>
+            <a:r>
+              <a:rPr lang="de-AT" sz="2100" b="1" dirty="0"/>
+              <a:t> Logs</a:t>
+            </a:r>
+          </a:p>
+          <a:p>
+            <a:r>
+              <a:rPr lang="de-AT" dirty="0"/>
+              <a:t>Temporäre Speicherung der Fahrstrecken zur </a:t>
+            </a:r>
+            <a:r>
+              <a:rPr lang="de-AT" dirty="0" err="1"/>
+              <a:t>spätern</a:t>
+            </a:r>
+            <a:r>
+              <a:rPr lang="de-AT" dirty="0"/>
+              <a:t> Verarbeitung</a:t>
+            </a:r>
+          </a:p>
+          <a:p>
+            <a:endParaRPr lang="de-AT" sz="500" b="1" dirty="0"/>
+          </a:p>
+          <a:p>
+            <a:endParaRPr lang="de-AT" sz="500" b="1" dirty="0"/>
+          </a:p>
+          <a:p>
+            <a:endParaRPr lang="de-AT" sz="500" b="1" dirty="0"/>
+          </a:p>
+          <a:p>
+            <a:endParaRPr lang="de-AT" sz="500" b="1" dirty="0"/>
+          </a:p>
+          <a:p>
+            <a:r>
+              <a:rPr lang="de-AT" sz="2100" b="1" dirty="0"/>
+              <a:t>MongoDB Datenbank</a:t>
+            </a:r>
+          </a:p>
+          <a:p>
+            <a:r>
+              <a:rPr lang="de-AT" dirty="0"/>
+              <a:t>Konsistente Speicherung der Fahrstrecken</a:t>
+            </a:r>
+          </a:p>
+          <a:p>
+            <a:endParaRPr lang="de-AT" sz="2100" b="1" dirty="0"/>
+          </a:p>
+          <a:p>
+            <a:endParaRPr lang="de-AT" b="1" dirty="0"/>
+          </a:p>
+          <a:p>
+            <a:endParaRPr lang="de-AT" b="1" dirty="0"/>
+          </a:p>
+          <a:p>
+            <a:endParaRPr lang="de-AT" b="1" dirty="0"/>
+          </a:p>
+          <a:p>
+            <a:endParaRPr lang="de-AT" dirty="0"/>
+          </a:p>
+          <a:p>
+            <a:endParaRPr lang="de-AT" dirty="0"/>
+          </a:p>
+          <a:p>
+            <a:endParaRPr lang="de-AT" dirty="0"/>
+          </a:p>
+          <a:p>
+            <a:endParaRPr lang="de-AT" dirty="0"/>
+          </a:p>
+          <a:p>
+            <a:endParaRPr lang="de-AT" dirty="0"/>
+          </a:p>
+          <a:p>
+            <a:endParaRPr lang="de-AT" dirty="0"/>
+          </a:p>
+          <a:p>
+            <a:endParaRPr lang="de-AT" dirty="0"/>
+          </a:p>
+          <a:p>
+            <a:endParaRPr lang="de-AT" dirty="0"/>
+          </a:p>
+          <a:p>
+            <a:endParaRPr lang="de-AT" dirty="0"/>
+          </a:p>
+          <a:p>
+            <a:endParaRPr lang="de-AT" dirty="0"/>
+          </a:p>
+          <a:p>
+            <a:endParaRPr lang="de-AT" dirty="0"/>
+          </a:p>
+          <a:p>
+            <a:endParaRPr lang="de-AT" dirty="0"/>
+          </a:p>
+          <a:p>
+            <a:endParaRPr lang="de-AT" dirty="0"/>
+          </a:p>
+          <a:p>
+            <a:endParaRPr lang="de-AT" dirty="0"/>
+          </a:p>
+          <a:p>
+            <a:endParaRPr lang="de-AT" dirty="0"/>
+          </a:p>
+          <a:p>
+            <a:endParaRPr lang="de-AT" dirty="0"/>
+          </a:p>
+          <a:p>
+            <a:endParaRPr lang="de-AT" dirty="0"/>
+          </a:p>
+          <a:p>
+            <a:endParaRPr lang="de-AT" dirty="0"/>
+          </a:p>
+          <a:p>
+            <a:endParaRPr lang="de-AT" dirty="0"/>
+          </a:p>
+          <a:p>
+            <a:endParaRPr lang="de-AT" dirty="0"/>
+          </a:p>
+          <a:p>
+            <a:endParaRPr lang="de-AT" dirty="0"/>
+          </a:p>
+          <a:p>
+            <a:endParaRPr lang="de-AT" dirty="0"/>
+          </a:p>
+        </p:txBody>
+      </p:sp>
+    </p:spTree>
+    <p:extLst>
+      <p:ext uri="{BB962C8B-B14F-4D97-AF65-F5344CB8AC3E}">
+        <p14:creationId xmlns:p14="http://schemas.microsoft.com/office/powerpoint/2010/main" val="1963864791"/>
+      </p:ext>
+    </p:extLst>
+  </p:cSld>
+  <p:clrMapOvr>
+    <a:masterClrMapping/>
+  </p:clrMapOvr>
+  <mc:AlternateContent xmlns:mc="http://schemas.openxmlformats.org/markup-compatibility/2006" xmlns:p14="http://schemas.microsoft.com/office/powerpoint/2010/main">
+    <mc:Choice Requires="p14">
+      <p:transition spd="med" p14:dur="700">
+        <p:fade/>
+      </p:transition>
+    </mc:Choice>
+    <mc:Fallback xmlns="">
+      <p:transition spd="med">
+        <p:fade/>
+      </p:transition>
+    </mc:Fallback>
+  </mc:AlternateContent>
+</p:sld>
+</file>
+
+<file path=ppt/slides/slide13.xml><?xml version="1.0" encoding="utf-8"?>
+<p:sld xmlns:a="http://schemas.openxmlformats.org/drawingml/2006/main" xmlns:r="http://schemas.openxmlformats.org/officeDocument/2006/relationships" xmlns:p="http://schemas.openxmlformats.org/presentationml/2006/main">
+  <p:cSld>
+    <p:spTree>
+      <p:nvGrpSpPr>
+        <p:cNvPr id="1" name="">
+          <a:extLst>
+            <a:ext uri="{FF2B5EF4-FFF2-40B4-BE49-F238E27FC236}">
               <a16:creationId xmlns:a16="http://schemas.microsoft.com/office/drawing/2014/main" id="{AA398BD4-509B-084B-04BF-D79C0A190CC4}"/>
             </a:ext>
           </a:extLst>
@@ -11318,7 +11603,7 @@
                 </a:spcAft>
                 <a:defRPr/>
               </a:pPr>
-              <a:t>12</a:t>
+              <a:t>13</a:t>
             </a:fld>
             <a:endParaRPr lang="de-AT" dirty="0"/>
           </a:p>
@@ -11566,7 +11851,7 @@
 </p:sld>
 </file>
 
-<file path=ppt/slides/slide13.xml><?xml version="1.0" encoding="utf-8"?>
+<file path=ppt/slides/slide14.xml><?xml version="1.0" encoding="utf-8"?>
 <p:sld xmlns:a="http://schemas.openxmlformats.org/drawingml/2006/main" xmlns:r="http://schemas.openxmlformats.org/officeDocument/2006/relationships" xmlns:p="http://schemas.openxmlformats.org/presentationml/2006/main">
   <p:cSld>
     <p:spTree>
@@ -11681,7 +11966,7 @@
             </a:pPr>
             <a:fld id="{AE4538FE-AEB4-413B-B741-EC1BAEEF6B8F}" type="slidenum">
               <a:rPr lang="de-AT" smtClean="0"/>
-              <a:t>13</a:t>
+              <a:t>14</a:t>
             </a:fld>
             <a:endParaRPr lang="de-AT"/>
           </a:p>
@@ -11759,7 +12044,7 @@
 </p:sld>
 </file>
 
-<file path=ppt/slides/slide14.xml><?xml version="1.0" encoding="utf-8"?>
+<file path=ppt/slides/slide15.xml><?xml version="1.0" encoding="utf-8"?>
 <p:sld xmlns:a="http://schemas.openxmlformats.org/drawingml/2006/main" xmlns:r="http://schemas.openxmlformats.org/officeDocument/2006/relationships" xmlns:p="http://schemas.openxmlformats.org/presentationml/2006/main">
   <p:cSld>
     <p:spTree>
@@ -11877,7 +12162,7 @@
             </a:pPr>
             <a:fld id="{AE4538FE-AEB4-413B-B741-EC1BAEEF6B8F}" type="slidenum">
               <a:rPr lang="de-AT" smtClean="0"/>
-              <a:t>14</a:t>
+              <a:t>15</a:t>
             </a:fld>
             <a:endParaRPr lang="de-AT"/>
           </a:p>
@@ -11938,7 +12223,7 @@
 </p:sld>
 </file>
 
-<file path=ppt/slides/slide15.xml><?xml version="1.0" encoding="utf-8"?>
+<file path=ppt/slides/slide16.xml><?xml version="1.0" encoding="utf-8"?>
 <p:sld xmlns:a="http://schemas.openxmlformats.org/drawingml/2006/main" xmlns:r="http://schemas.openxmlformats.org/officeDocument/2006/relationships" xmlns:p="http://schemas.openxmlformats.org/presentationml/2006/main">
   <p:cSld>
     <p:spTree>
@@ -12053,7 +12338,7 @@
             </a:pPr>
             <a:fld id="{AE4538FE-AEB4-413B-B741-EC1BAEEF6B8F}" type="slidenum">
               <a:rPr lang="de-AT" smtClean="0"/>
-              <a:t>15</a:t>
+              <a:t>16</a:t>
             </a:fld>
             <a:endParaRPr lang="de-AT"/>
           </a:p>
@@ -12115,7 +12400,7 @@
 </p:sld>
 </file>
 
-<file path=ppt/slides/slide16.xml><?xml version="1.0" encoding="utf-8"?>
+<file path=ppt/slides/slide17.xml><?xml version="1.0" encoding="utf-8"?>
 <p:sld xmlns:a="http://schemas.openxmlformats.org/drawingml/2006/main" xmlns:r="http://schemas.openxmlformats.org/officeDocument/2006/relationships" xmlns:p="http://schemas.openxmlformats.org/presentationml/2006/main">
   <p:cSld>
     <p:spTree>
@@ -12256,7 +12541,7 @@
                 </a:spcAft>
                 <a:defRPr/>
               </a:pPr>
-              <a:t>16</a:t>
+              <a:t>17</a:t>
             </a:fld>
             <a:endParaRPr lang="de-AT"/>
           </a:p>
@@ -12358,7 +12643,7 @@
 </p:sld>
 </file>
 
-<file path=ppt/slides/slide17.xml><?xml version="1.0" encoding="utf-8"?>
+<file path=ppt/slides/slide18.xml><?xml version="1.0" encoding="utf-8"?>
 <p:sld xmlns:a="http://schemas.openxmlformats.org/drawingml/2006/main" xmlns:r="http://schemas.openxmlformats.org/officeDocument/2006/relationships" xmlns:p="http://schemas.openxmlformats.org/presentationml/2006/main">
   <p:cSld>
     <p:spTree>
@@ -12500,7 +12785,7 @@
                 </a:spcAft>
                 <a:defRPr/>
               </a:pPr>
-              <a:t>17</a:t>
+              <a:t>18</a:t>
             </a:fld>
             <a:endParaRPr lang="de-AT"/>
           </a:p>
@@ -12598,7 +12883,7 @@
 </p:sld>
 </file>
 
-<file path=ppt/slides/slide18.xml><?xml version="1.0" encoding="utf-8"?>
+<file path=ppt/slides/slide19.xml><?xml version="1.0" encoding="utf-8"?>
 <p:sld xmlns:a="http://schemas.openxmlformats.org/drawingml/2006/main" xmlns:r="http://schemas.openxmlformats.org/officeDocument/2006/relationships" xmlns:p="http://schemas.openxmlformats.org/presentationml/2006/main">
   <p:cSld>
     <p:spTree>
@@ -12740,7 +13025,7 @@
                 </a:spcAft>
                 <a:defRPr/>
               </a:pPr>
-              <a:t>18</a:t>
+              <a:t>19</a:t>
             </a:fld>
             <a:endParaRPr lang="de-AT"/>
           </a:p>
@@ -12837,249 +13122,6 @@
 </p:sld>
 </file>
 
-<file path=ppt/slides/slide19.xml><?xml version="1.0" encoding="utf-8"?>
-<p:sld xmlns:a="http://schemas.openxmlformats.org/drawingml/2006/main" xmlns:r="http://schemas.openxmlformats.org/officeDocument/2006/relationships" xmlns:p="http://schemas.openxmlformats.org/presentationml/2006/main">
-  <p:cSld>
-    <p:spTree>
-      <p:nvGrpSpPr>
-        <p:cNvPr id="1" name="">
-          <a:extLst>
-            <a:ext uri="{FF2B5EF4-FFF2-40B4-BE49-F238E27FC236}">
-              <a16:creationId xmlns:a16="http://schemas.microsoft.com/office/drawing/2014/main" id="{B060D187-0F8D-F933-2505-452ED1078F6C}"/>
-            </a:ext>
-          </a:extLst>
-        </p:cNvPr>
-        <p:cNvGrpSpPr/>
-        <p:nvPr/>
-      </p:nvGrpSpPr>
-      <p:grpSpPr>
-        <a:xfrm>
-          <a:off x="0" y="0"/>
-          <a:ext cx="0" cy="0"/>
-          <a:chOff x="0" y="0"/>
-          <a:chExt cx="0" cy="0"/>
-        </a:xfrm>
-      </p:grpSpPr>
-      <p:sp>
-        <p:nvSpPr>
-          <p:cNvPr id="2" name="Title 1">
-            <a:extLst>
-              <a:ext uri="{FF2B5EF4-FFF2-40B4-BE49-F238E27FC236}">
-                <a16:creationId xmlns:a16="http://schemas.microsoft.com/office/drawing/2014/main" id="{8C0622B3-2EDC-4EEE-6856-E922158B9BEC}"/>
-              </a:ext>
-            </a:extLst>
-          </p:cNvPr>
-          <p:cNvSpPr>
-            <a:spLocks noGrp="1"/>
-          </p:cNvSpPr>
-          <p:nvPr>
-            <p:ph type="title"/>
-          </p:nvPr>
-        </p:nvSpPr>
-        <p:spPr>
-          <a:xfrm>
-            <a:off x="1907704" y="365127"/>
-            <a:ext cx="6607646" cy="759618"/>
-          </a:xfrm>
-        </p:spPr>
-        <p:txBody>
-          <a:bodyPr anchor="ctr">
-            <a:normAutofit/>
-          </a:bodyPr>
-          <a:lstStyle/>
-          <a:p>
-            <a:r>
-              <a:rPr lang="de-DE" altLang="en-US"/>
-              <a:t>Wichtige Code-Abschnitte</a:t>
-            </a:r>
-          </a:p>
-        </p:txBody>
-      </p:sp>
-      <p:sp>
-        <p:nvSpPr>
-          <p:cNvPr id="8" name="Footer Placeholder 7">
-            <a:extLst>
-              <a:ext uri="{FF2B5EF4-FFF2-40B4-BE49-F238E27FC236}">
-                <a16:creationId xmlns:a16="http://schemas.microsoft.com/office/drawing/2014/main" id="{ECE079C2-3B92-A665-3CE3-3632B4C9204F}"/>
-              </a:ext>
-            </a:extLst>
-          </p:cNvPr>
-          <p:cNvSpPr>
-            <a:spLocks noGrp="1"/>
-          </p:cNvSpPr>
-          <p:nvPr>
-            <p:ph type="ftr" sz="quarter" idx="11"/>
-          </p:nvPr>
-        </p:nvSpPr>
-        <p:spPr>
-          <a:xfrm>
-            <a:off x="3028950" y="6356351"/>
-            <a:ext cx="3086100" cy="365125"/>
-          </a:xfrm>
-        </p:spPr>
-        <p:txBody>
-          <a:bodyPr anchor="ctr">
-            <a:normAutofit/>
-          </a:bodyPr>
-          <a:lstStyle/>
-          <a:p>
-            <a:pPr>
-              <a:spcAft>
-                <a:spcPts val="600"/>
-              </a:spcAft>
-              <a:defRPr/>
-            </a:pPr>
-            <a:r>
-              <a:rPr lang="de-DE" dirty="0"/>
-              <a:t>DI(FH) Falkensteiner Markus</a:t>
-            </a:r>
-            <a:endParaRPr lang="de-DE"/>
-          </a:p>
-        </p:txBody>
-      </p:sp>
-      <p:sp>
-        <p:nvSpPr>
-          <p:cNvPr id="9" name="Slide Number Placeholder 8">
-            <a:extLst>
-              <a:ext uri="{FF2B5EF4-FFF2-40B4-BE49-F238E27FC236}">
-                <a16:creationId xmlns:a16="http://schemas.microsoft.com/office/drawing/2014/main" id="{9827DA1E-2300-BDC6-3DC7-3C746E062B90}"/>
-              </a:ext>
-            </a:extLst>
-          </p:cNvPr>
-          <p:cNvSpPr>
-            <a:spLocks noGrp="1"/>
-          </p:cNvSpPr>
-          <p:nvPr>
-            <p:ph type="sldNum" sz="quarter" idx="12"/>
-          </p:nvPr>
-        </p:nvSpPr>
-        <p:spPr>
-          <a:xfrm>
-            <a:off x="6457950" y="6356351"/>
-            <a:ext cx="2057400" cy="365125"/>
-          </a:xfrm>
-        </p:spPr>
-        <p:txBody>
-          <a:bodyPr anchor="ctr">
-            <a:normAutofit/>
-          </a:bodyPr>
-          <a:lstStyle/>
-          <a:p>
-            <a:pPr>
-              <a:spcAft>
-                <a:spcPts val="600"/>
-              </a:spcAft>
-              <a:defRPr/>
-            </a:pPr>
-            <a:fld id="{AE4538FE-AEB4-413B-B741-EC1BAEEF6B8F}" type="slidenum">
-              <a:rPr lang="de-AT" smtClean="0"/>
-              <a:pPr>
-                <a:spcAft>
-                  <a:spcPts val="600"/>
-                </a:spcAft>
-                <a:defRPr/>
-              </a:pPr>
-              <a:t>19</a:t>
-            </a:fld>
-            <a:endParaRPr lang="de-AT"/>
-          </a:p>
-        </p:txBody>
-      </p:sp>
-      <p:sp>
-        <p:nvSpPr>
-          <p:cNvPr id="20" name="Textfeld 19">
-            <a:extLst>
-              <a:ext uri="{FF2B5EF4-FFF2-40B4-BE49-F238E27FC236}">
-                <a16:creationId xmlns:a16="http://schemas.microsoft.com/office/drawing/2014/main" id="{E6910B90-64B7-3210-3841-66CED5DC9777}"/>
-              </a:ext>
-            </a:extLst>
-          </p:cNvPr>
-          <p:cNvSpPr txBox="1"/>
-          <p:nvPr/>
-        </p:nvSpPr>
-        <p:spPr>
-          <a:xfrm>
-            <a:off x="1681316" y="1661927"/>
-            <a:ext cx="5486400" cy="800219"/>
-          </a:xfrm>
-          <a:prstGeom prst="rect">
-            <a:avLst/>
-          </a:prstGeom>
-          <a:noFill/>
-        </p:spPr>
-        <p:txBody>
-          <a:bodyPr wrap="square" rtlCol="0">
-            <a:spAutoFit/>
-          </a:bodyPr>
-          <a:lstStyle/>
-          <a:p>
-            <a:pPr algn="ctr"/>
-            <a:r>
-              <a:rPr lang="de-DE" sz="2300" b="1" dirty="0" err="1"/>
-              <a:t>MBot-Waypoint</a:t>
-            </a:r>
-            <a:r>
-              <a:rPr lang="de-DE" sz="2300" b="1" dirty="0"/>
-              <a:t> Kommunikation mit dem Backend</a:t>
-            </a:r>
-          </a:p>
-        </p:txBody>
-      </p:sp>
-      <p:pic>
-        <p:nvPicPr>
-          <p:cNvPr id="4" name="Grafik 3">
-            <a:extLst>
-              <a:ext uri="{FF2B5EF4-FFF2-40B4-BE49-F238E27FC236}">
-                <a16:creationId xmlns:a16="http://schemas.microsoft.com/office/drawing/2014/main" id="{26479A12-6C8A-CDC3-4A18-04EC014C43F5}"/>
-              </a:ext>
-            </a:extLst>
-          </p:cNvPr>
-          <p:cNvPicPr>
-            <a:picLocks noChangeAspect="1"/>
-          </p:cNvPicPr>
-          <p:nvPr/>
-        </p:nvPicPr>
-        <p:blipFill>
-          <a:blip r:embed="rId3"/>
-          <a:stretch>
-            <a:fillRect/>
-          </a:stretch>
-        </p:blipFill>
-        <p:spPr>
-          <a:xfrm>
-            <a:off x="-1" y="2899092"/>
-            <a:ext cx="9645445" cy="2473802"/>
-          </a:xfrm>
-          <a:prstGeom prst="rect">
-            <a:avLst/>
-          </a:prstGeom>
-        </p:spPr>
-      </p:pic>
-    </p:spTree>
-    <p:extLst>
-      <p:ext uri="{BB962C8B-B14F-4D97-AF65-F5344CB8AC3E}">
-        <p14:creationId xmlns:p14="http://schemas.microsoft.com/office/powerpoint/2010/main" val="698079570"/>
-      </p:ext>
-    </p:extLst>
-  </p:cSld>
-  <p:clrMapOvr>
-    <a:masterClrMapping/>
-  </p:clrMapOvr>
-  <mc:AlternateContent xmlns:mc="http://schemas.openxmlformats.org/markup-compatibility/2006" xmlns:p14="http://schemas.microsoft.com/office/powerpoint/2010/main">
-    <mc:Choice Requires="p14">
-      <p:transition spd="med" p14:dur="700">
-        <p:fade/>
-      </p:transition>
-    </mc:Choice>
-    <mc:Fallback xmlns="">
-      <p:transition spd="med">
-        <p:fade/>
-      </p:transition>
-    </mc:Fallback>
-  </mc:AlternateContent>
-</p:sld>
-</file>
-
 <file path=ppt/slides/slide2.xml><?xml version="1.0" encoding="utf-8"?>
 <p:sld xmlns:a="http://schemas.openxmlformats.org/drawingml/2006/main" xmlns:r="http://schemas.openxmlformats.org/officeDocument/2006/relationships" xmlns:p="http://schemas.openxmlformats.org/presentationml/2006/main">
   <p:cSld>
@@ -13216,7 +13258,7 @@
         <p:spPr>
           <a:xfrm>
             <a:off x="668593" y="1843950"/>
-            <a:ext cx="8043402" cy="3789948"/>
+            <a:ext cx="8043402" cy="4343946"/>
           </a:xfrm>
           <a:prstGeom prst="rect">
             <a:avLst/>
@@ -13260,6 +13302,19 @@
             <a:r>
               <a:rPr lang="de-DE" sz="2400" dirty="0"/>
               <a:t>Retrospektive</a:t>
+            </a:r>
+          </a:p>
+          <a:p>
+            <a:pPr marL="342900" indent="-342900">
+              <a:lnSpc>
+                <a:spcPct val="150000"/>
+              </a:lnSpc>
+              <a:buFont typeface="Symbol" panose="05050102010706020507" pitchFamily="18" charset="2"/>
+              <a:buChar char="-"/>
+            </a:pPr>
+            <a:r>
+              <a:rPr lang="de-DE" sz="2400" dirty="0"/>
+              <a:t>Wer hat was gemacht?</a:t>
             </a:r>
           </a:p>
           <a:p>
@@ -13405,6 +13460,249 @@
         <p:cNvPr id="1" name="">
           <a:extLst>
             <a:ext uri="{FF2B5EF4-FFF2-40B4-BE49-F238E27FC236}">
+              <a16:creationId xmlns:a16="http://schemas.microsoft.com/office/drawing/2014/main" id="{B060D187-0F8D-F933-2505-452ED1078F6C}"/>
+            </a:ext>
+          </a:extLst>
+        </p:cNvPr>
+        <p:cNvGrpSpPr/>
+        <p:nvPr/>
+      </p:nvGrpSpPr>
+      <p:grpSpPr>
+        <a:xfrm>
+          <a:off x="0" y="0"/>
+          <a:ext cx="0" cy="0"/>
+          <a:chOff x="0" y="0"/>
+          <a:chExt cx="0" cy="0"/>
+        </a:xfrm>
+      </p:grpSpPr>
+      <p:sp>
+        <p:nvSpPr>
+          <p:cNvPr id="2" name="Title 1">
+            <a:extLst>
+              <a:ext uri="{FF2B5EF4-FFF2-40B4-BE49-F238E27FC236}">
+                <a16:creationId xmlns:a16="http://schemas.microsoft.com/office/drawing/2014/main" id="{8C0622B3-2EDC-4EEE-6856-E922158B9BEC}"/>
+              </a:ext>
+            </a:extLst>
+          </p:cNvPr>
+          <p:cNvSpPr>
+            <a:spLocks noGrp="1"/>
+          </p:cNvSpPr>
+          <p:nvPr>
+            <p:ph type="title"/>
+          </p:nvPr>
+        </p:nvSpPr>
+        <p:spPr>
+          <a:xfrm>
+            <a:off x="1907704" y="365127"/>
+            <a:ext cx="6607646" cy="759618"/>
+          </a:xfrm>
+        </p:spPr>
+        <p:txBody>
+          <a:bodyPr anchor="ctr">
+            <a:normAutofit/>
+          </a:bodyPr>
+          <a:lstStyle/>
+          <a:p>
+            <a:r>
+              <a:rPr lang="de-DE" altLang="en-US"/>
+              <a:t>Wichtige Code-Abschnitte</a:t>
+            </a:r>
+          </a:p>
+        </p:txBody>
+      </p:sp>
+      <p:sp>
+        <p:nvSpPr>
+          <p:cNvPr id="8" name="Footer Placeholder 7">
+            <a:extLst>
+              <a:ext uri="{FF2B5EF4-FFF2-40B4-BE49-F238E27FC236}">
+                <a16:creationId xmlns:a16="http://schemas.microsoft.com/office/drawing/2014/main" id="{ECE079C2-3B92-A665-3CE3-3632B4C9204F}"/>
+              </a:ext>
+            </a:extLst>
+          </p:cNvPr>
+          <p:cNvSpPr>
+            <a:spLocks noGrp="1"/>
+          </p:cNvSpPr>
+          <p:nvPr>
+            <p:ph type="ftr" sz="quarter" idx="11"/>
+          </p:nvPr>
+        </p:nvSpPr>
+        <p:spPr>
+          <a:xfrm>
+            <a:off x="3028950" y="6356351"/>
+            <a:ext cx="3086100" cy="365125"/>
+          </a:xfrm>
+        </p:spPr>
+        <p:txBody>
+          <a:bodyPr anchor="ctr">
+            <a:normAutofit/>
+          </a:bodyPr>
+          <a:lstStyle/>
+          <a:p>
+            <a:pPr>
+              <a:spcAft>
+                <a:spcPts val="600"/>
+              </a:spcAft>
+              <a:defRPr/>
+            </a:pPr>
+            <a:r>
+              <a:rPr lang="de-DE" dirty="0"/>
+              <a:t>DI(FH) Falkensteiner Markus</a:t>
+            </a:r>
+            <a:endParaRPr lang="de-DE"/>
+          </a:p>
+        </p:txBody>
+      </p:sp>
+      <p:sp>
+        <p:nvSpPr>
+          <p:cNvPr id="9" name="Slide Number Placeholder 8">
+            <a:extLst>
+              <a:ext uri="{FF2B5EF4-FFF2-40B4-BE49-F238E27FC236}">
+                <a16:creationId xmlns:a16="http://schemas.microsoft.com/office/drawing/2014/main" id="{9827DA1E-2300-BDC6-3DC7-3C746E062B90}"/>
+              </a:ext>
+            </a:extLst>
+          </p:cNvPr>
+          <p:cNvSpPr>
+            <a:spLocks noGrp="1"/>
+          </p:cNvSpPr>
+          <p:nvPr>
+            <p:ph type="sldNum" sz="quarter" idx="12"/>
+          </p:nvPr>
+        </p:nvSpPr>
+        <p:spPr>
+          <a:xfrm>
+            <a:off x="6457950" y="6356351"/>
+            <a:ext cx="2057400" cy="365125"/>
+          </a:xfrm>
+        </p:spPr>
+        <p:txBody>
+          <a:bodyPr anchor="ctr">
+            <a:normAutofit/>
+          </a:bodyPr>
+          <a:lstStyle/>
+          <a:p>
+            <a:pPr>
+              <a:spcAft>
+                <a:spcPts val="600"/>
+              </a:spcAft>
+              <a:defRPr/>
+            </a:pPr>
+            <a:fld id="{AE4538FE-AEB4-413B-B741-EC1BAEEF6B8F}" type="slidenum">
+              <a:rPr lang="de-AT" smtClean="0"/>
+              <a:pPr>
+                <a:spcAft>
+                  <a:spcPts val="600"/>
+                </a:spcAft>
+                <a:defRPr/>
+              </a:pPr>
+              <a:t>20</a:t>
+            </a:fld>
+            <a:endParaRPr lang="de-AT"/>
+          </a:p>
+        </p:txBody>
+      </p:sp>
+      <p:sp>
+        <p:nvSpPr>
+          <p:cNvPr id="20" name="Textfeld 19">
+            <a:extLst>
+              <a:ext uri="{FF2B5EF4-FFF2-40B4-BE49-F238E27FC236}">
+                <a16:creationId xmlns:a16="http://schemas.microsoft.com/office/drawing/2014/main" id="{E6910B90-64B7-3210-3841-66CED5DC9777}"/>
+              </a:ext>
+            </a:extLst>
+          </p:cNvPr>
+          <p:cNvSpPr txBox="1"/>
+          <p:nvPr/>
+        </p:nvSpPr>
+        <p:spPr>
+          <a:xfrm>
+            <a:off x="1681316" y="1661927"/>
+            <a:ext cx="5486400" cy="800219"/>
+          </a:xfrm>
+          <a:prstGeom prst="rect">
+            <a:avLst/>
+          </a:prstGeom>
+          <a:noFill/>
+        </p:spPr>
+        <p:txBody>
+          <a:bodyPr wrap="square" rtlCol="0">
+            <a:spAutoFit/>
+          </a:bodyPr>
+          <a:lstStyle/>
+          <a:p>
+            <a:pPr algn="ctr"/>
+            <a:r>
+              <a:rPr lang="de-DE" sz="2300" b="1" dirty="0" err="1"/>
+              <a:t>MBot-Waypoint</a:t>
+            </a:r>
+            <a:r>
+              <a:rPr lang="de-DE" sz="2300" b="1" dirty="0"/>
+              <a:t> Kommunikation mit dem Backend</a:t>
+            </a:r>
+          </a:p>
+        </p:txBody>
+      </p:sp>
+      <p:pic>
+        <p:nvPicPr>
+          <p:cNvPr id="4" name="Grafik 3">
+            <a:extLst>
+              <a:ext uri="{FF2B5EF4-FFF2-40B4-BE49-F238E27FC236}">
+                <a16:creationId xmlns:a16="http://schemas.microsoft.com/office/drawing/2014/main" id="{26479A12-6C8A-CDC3-4A18-04EC014C43F5}"/>
+              </a:ext>
+            </a:extLst>
+          </p:cNvPr>
+          <p:cNvPicPr>
+            <a:picLocks noChangeAspect="1"/>
+          </p:cNvPicPr>
+          <p:nvPr/>
+        </p:nvPicPr>
+        <p:blipFill>
+          <a:blip r:embed="rId3"/>
+          <a:stretch>
+            <a:fillRect/>
+          </a:stretch>
+        </p:blipFill>
+        <p:spPr>
+          <a:xfrm>
+            <a:off x="-1" y="2899092"/>
+            <a:ext cx="9645445" cy="2473802"/>
+          </a:xfrm>
+          <a:prstGeom prst="rect">
+            <a:avLst/>
+          </a:prstGeom>
+        </p:spPr>
+      </p:pic>
+    </p:spTree>
+    <p:extLst>
+      <p:ext uri="{BB962C8B-B14F-4D97-AF65-F5344CB8AC3E}">
+        <p14:creationId xmlns:p14="http://schemas.microsoft.com/office/powerpoint/2010/main" val="698079570"/>
+      </p:ext>
+    </p:extLst>
+  </p:cSld>
+  <p:clrMapOvr>
+    <a:masterClrMapping/>
+  </p:clrMapOvr>
+  <mc:AlternateContent xmlns:mc="http://schemas.openxmlformats.org/markup-compatibility/2006" xmlns:p14="http://schemas.microsoft.com/office/powerpoint/2010/main">
+    <mc:Choice Requires="p14">
+      <p:transition spd="med" p14:dur="700">
+        <p:fade/>
+      </p:transition>
+    </mc:Choice>
+    <mc:Fallback xmlns="">
+      <p:transition spd="med">
+        <p:fade/>
+      </p:transition>
+    </mc:Fallback>
+  </mc:AlternateContent>
+</p:sld>
+</file>
+
+<file path=ppt/slides/slide21.xml><?xml version="1.0" encoding="utf-8"?>
+<p:sld xmlns:a="http://schemas.openxmlformats.org/drawingml/2006/main" xmlns:r="http://schemas.openxmlformats.org/officeDocument/2006/relationships" xmlns:p="http://schemas.openxmlformats.org/presentationml/2006/main">
+  <p:cSld>
+    <p:spTree>
+      <p:nvGrpSpPr>
+        <p:cNvPr id="1" name="">
+          <a:extLst>
+            <a:ext uri="{FF2B5EF4-FFF2-40B4-BE49-F238E27FC236}">
               <a16:creationId xmlns:a16="http://schemas.microsoft.com/office/drawing/2014/main" id="{C30EC4AF-87D1-CE42-09B5-9EC797B957D1}"/>
             </a:ext>
           </a:extLst>
@@ -13539,7 +13837,7 @@
                 </a:spcAft>
                 <a:defRPr/>
               </a:pPr>
-              <a:t>20</a:t>
+              <a:t>21</a:t>
             </a:fld>
             <a:endParaRPr lang="de-AT"/>
           </a:p>
@@ -13636,227 +13934,6 @@
 </p:sld>
 </file>
 
-<file path=ppt/slides/slide21.xml><?xml version="1.0" encoding="utf-8"?>
-<p:sld xmlns:a="http://schemas.openxmlformats.org/drawingml/2006/main" xmlns:r="http://schemas.openxmlformats.org/officeDocument/2006/relationships" xmlns:p="http://schemas.openxmlformats.org/presentationml/2006/main">
-  <p:cSld>
-    <p:spTree>
-      <p:nvGrpSpPr>
-        <p:cNvPr id="1" name=""/>
-        <p:cNvGrpSpPr/>
-        <p:nvPr/>
-      </p:nvGrpSpPr>
-      <p:grpSpPr>
-        <a:xfrm>
-          <a:off x="0" y="0"/>
-          <a:ext cx="0" cy="0"/>
-          <a:chOff x="0" y="0"/>
-          <a:chExt cx="0" cy="0"/>
-        </a:xfrm>
-      </p:grpSpPr>
-      <p:sp>
-        <p:nvSpPr>
-          <p:cNvPr id="2" name="Titel 1">
-            <a:extLst>
-              <a:ext uri="{FF2B5EF4-FFF2-40B4-BE49-F238E27FC236}">
-                <a16:creationId xmlns:a16="http://schemas.microsoft.com/office/drawing/2014/main" id="{B8C98380-99A4-EF9B-192A-2A34996F9167}"/>
-              </a:ext>
-            </a:extLst>
-          </p:cNvPr>
-          <p:cNvSpPr>
-            <a:spLocks noGrp="1"/>
-          </p:cNvSpPr>
-          <p:nvPr>
-            <p:ph type="title"/>
-          </p:nvPr>
-        </p:nvSpPr>
-        <p:spPr/>
-        <p:txBody>
-          <a:bodyPr/>
-          <a:lstStyle/>
-          <a:p>
-            <a:r>
-              <a:rPr lang="de-DE" dirty="0" err="1"/>
-              <a:t>Lessons</a:t>
-            </a:r>
-            <a:r>
-              <a:rPr lang="de-DE" dirty="0"/>
-              <a:t> </a:t>
-            </a:r>
-            <a:r>
-              <a:rPr lang="de-DE" dirty="0" err="1"/>
-              <a:t>Learned</a:t>
-            </a:r>
-            <a:endParaRPr lang="de-DE" dirty="0"/>
-          </a:p>
-        </p:txBody>
-      </p:sp>
-      <p:sp>
-        <p:nvSpPr>
-          <p:cNvPr id="3" name="Inhaltsplatzhalter 2">
-            <a:extLst>
-              <a:ext uri="{FF2B5EF4-FFF2-40B4-BE49-F238E27FC236}">
-                <a16:creationId xmlns:a16="http://schemas.microsoft.com/office/drawing/2014/main" id="{8789ED24-4EEE-6485-379B-40BA2AE78EE3}"/>
-              </a:ext>
-            </a:extLst>
-          </p:cNvPr>
-          <p:cNvSpPr>
-            <a:spLocks noGrp="1"/>
-          </p:cNvSpPr>
-          <p:nvPr>
-            <p:ph idx="1"/>
-          </p:nvPr>
-        </p:nvSpPr>
-        <p:spPr/>
-        <p:txBody>
-          <a:bodyPr/>
-          <a:lstStyle/>
-          <a:p>
-            <a:endParaRPr lang="de-DE" dirty="0"/>
-          </a:p>
-          <a:p>
-            <a:r>
-              <a:rPr lang="de-AT" sz="2400" b="1" dirty="0"/>
-              <a:t>Zeit fürs Schätzen nehmen</a:t>
-            </a:r>
-          </a:p>
-          <a:p>
-            <a:pPr lvl="1"/>
-            <a:r>
-              <a:rPr lang="de-AT" sz="2100" dirty="0"/>
-              <a:t>Gründliches Schätzen verhindert Missverständnisse</a:t>
-            </a:r>
-          </a:p>
-          <a:p>
-            <a:endParaRPr lang="de-DE" dirty="0"/>
-          </a:p>
-          <a:p>
-            <a:r>
-              <a:rPr lang="de-DE" sz="2400" b="1" dirty="0"/>
-              <a:t>Einfach vor komplex</a:t>
-            </a:r>
-          </a:p>
-          <a:p>
-            <a:pPr lvl="1"/>
-            <a:r>
-              <a:rPr lang="de-DE" sz="2100" dirty="0"/>
-              <a:t>Einfache und klare Lösungen statt unnötig komplizierter Ansätze</a:t>
-            </a:r>
-          </a:p>
-          <a:p>
-            <a:endParaRPr lang="de-DE" dirty="0"/>
-          </a:p>
-          <a:p>
-            <a:r>
-              <a:rPr lang="de-DE" sz="2400" b="1" dirty="0"/>
-              <a:t>Offene Kommunikation</a:t>
-            </a:r>
-          </a:p>
-          <a:p>
-            <a:pPr lvl="1"/>
-            <a:r>
-              <a:rPr lang="de-DE" sz="2100" dirty="0"/>
-              <a:t>Gute Kommunikation ist essentiell</a:t>
-            </a:r>
-          </a:p>
-          <a:p>
-            <a:pPr marL="0" indent="0">
-              <a:buNone/>
-            </a:pPr>
-            <a:endParaRPr lang="de-DE" dirty="0"/>
-          </a:p>
-          <a:p>
-            <a:endParaRPr lang="de-DE" dirty="0"/>
-          </a:p>
-        </p:txBody>
-      </p:sp>
-      <p:sp>
-        <p:nvSpPr>
-          <p:cNvPr id="4" name="Fußzeilenplatzhalter 3">
-            <a:extLst>
-              <a:ext uri="{FF2B5EF4-FFF2-40B4-BE49-F238E27FC236}">
-                <a16:creationId xmlns:a16="http://schemas.microsoft.com/office/drawing/2014/main" id="{EF3C89BD-9939-F75E-CD06-7557242DA97C}"/>
-              </a:ext>
-            </a:extLst>
-          </p:cNvPr>
-          <p:cNvSpPr>
-            <a:spLocks noGrp="1"/>
-          </p:cNvSpPr>
-          <p:nvPr>
-            <p:ph type="ftr" sz="quarter" idx="11"/>
-          </p:nvPr>
-        </p:nvSpPr>
-        <p:spPr/>
-        <p:txBody>
-          <a:bodyPr/>
-          <a:lstStyle/>
-          <a:p>
-            <a:pPr>
-              <a:defRPr/>
-            </a:pPr>
-            <a:r>
-              <a:rPr lang="de-DE"/>
-              <a:t>DI(FH) Falkensteiner Markus</a:t>
-            </a:r>
-          </a:p>
-        </p:txBody>
-      </p:sp>
-      <p:sp>
-        <p:nvSpPr>
-          <p:cNvPr id="5" name="Foliennummernplatzhalter 4">
-            <a:extLst>
-              <a:ext uri="{FF2B5EF4-FFF2-40B4-BE49-F238E27FC236}">
-                <a16:creationId xmlns:a16="http://schemas.microsoft.com/office/drawing/2014/main" id="{FCAA05B3-E539-18F1-D02C-60BC47198DBB}"/>
-              </a:ext>
-            </a:extLst>
-          </p:cNvPr>
-          <p:cNvSpPr>
-            <a:spLocks noGrp="1"/>
-          </p:cNvSpPr>
-          <p:nvPr>
-            <p:ph type="sldNum" sz="quarter" idx="12"/>
-          </p:nvPr>
-        </p:nvSpPr>
-        <p:spPr/>
-        <p:txBody>
-          <a:bodyPr/>
-          <a:lstStyle/>
-          <a:p>
-            <a:pPr>
-              <a:defRPr/>
-            </a:pPr>
-            <a:fld id="{AE4538FE-AEB4-413B-B741-EC1BAEEF6B8F}" type="slidenum">
-              <a:rPr lang="de-AT" smtClean="0"/>
-              <a:t>21</a:t>
-            </a:fld>
-            <a:endParaRPr lang="de-AT"/>
-          </a:p>
-        </p:txBody>
-      </p:sp>
-    </p:spTree>
-    <p:extLst>
-      <p:ext uri="{BB962C8B-B14F-4D97-AF65-F5344CB8AC3E}">
-        <p14:creationId xmlns:p14="http://schemas.microsoft.com/office/powerpoint/2010/main" val="3605471312"/>
-      </p:ext>
-    </p:extLst>
-  </p:cSld>
-  <p:clrMapOvr>
-    <a:masterClrMapping/>
-  </p:clrMapOvr>
-  <mc:AlternateContent xmlns:mc="http://schemas.openxmlformats.org/markup-compatibility/2006">
-    <mc:Choice xmlns:p14="http://schemas.microsoft.com/office/powerpoint/2010/main" Requires="p14">
-      <p:transition spd="med" p14:dur="700">
-        <p:fade/>
-      </p:transition>
-    </mc:Choice>
-    <mc:Fallback>
-      <p:transition spd="med">
-        <p:fade/>
-      </p:transition>
-    </mc:Fallback>
-  </mc:AlternateContent>
-</p:sld>
-</file>
-
 <file path=ppt/slides/slide22.xml><?xml version="1.0" encoding="utf-8"?>
 <p:sld xmlns:a="http://schemas.openxmlformats.org/drawingml/2006/main" xmlns:r="http://schemas.openxmlformats.org/officeDocument/2006/relationships" xmlns:p="http://schemas.openxmlformats.org/presentationml/2006/main">
   <p:cSld>
@@ -13879,7 +13956,7 @@
           <p:cNvPr id="2" name="Titel 1">
             <a:extLst>
               <a:ext uri="{FF2B5EF4-FFF2-40B4-BE49-F238E27FC236}">
-                <a16:creationId xmlns:a16="http://schemas.microsoft.com/office/drawing/2014/main" id="{1A023566-529E-043A-5868-33CEE76861A5}"/>
+                <a16:creationId xmlns:a16="http://schemas.microsoft.com/office/drawing/2014/main" id="{B8C98380-99A4-EF9B-192A-2A34996F9167}"/>
               </a:ext>
             </a:extLst>
           </p:cNvPr>
@@ -13896,9 +13973,97 @@
           <a:lstStyle/>
           <a:p>
             <a:r>
-              <a:rPr lang="de-AT" b="1"/>
-              <a:t>Vielen Dank für Eure Aufmerksamkeit</a:t>
-            </a:r>
+              <a:rPr lang="de-DE" dirty="0" err="1"/>
+              <a:t>Lessons</a:t>
+            </a:r>
+            <a:r>
+              <a:rPr lang="de-DE" dirty="0"/>
+              <a:t> </a:t>
+            </a:r>
+            <a:r>
+              <a:rPr lang="de-DE" dirty="0" err="1"/>
+              <a:t>Learned</a:t>
+            </a:r>
+            <a:endParaRPr lang="de-DE" dirty="0"/>
+          </a:p>
+        </p:txBody>
+      </p:sp>
+      <p:sp>
+        <p:nvSpPr>
+          <p:cNvPr id="3" name="Inhaltsplatzhalter 2">
+            <a:extLst>
+              <a:ext uri="{FF2B5EF4-FFF2-40B4-BE49-F238E27FC236}">
+                <a16:creationId xmlns:a16="http://schemas.microsoft.com/office/drawing/2014/main" id="{8789ED24-4EEE-6485-379B-40BA2AE78EE3}"/>
+              </a:ext>
+            </a:extLst>
+          </p:cNvPr>
+          <p:cNvSpPr>
+            <a:spLocks noGrp="1"/>
+          </p:cNvSpPr>
+          <p:nvPr>
+            <p:ph idx="1"/>
+          </p:nvPr>
+        </p:nvSpPr>
+        <p:spPr/>
+        <p:txBody>
+          <a:bodyPr/>
+          <a:lstStyle/>
+          <a:p>
+            <a:endParaRPr lang="de-DE" dirty="0"/>
+          </a:p>
+          <a:p>
+            <a:r>
+              <a:rPr lang="de-AT" sz="2400" b="1" dirty="0"/>
+              <a:t>Zeit fürs Schätzen nehmen</a:t>
+            </a:r>
+          </a:p>
+          <a:p>
+            <a:pPr lvl="1"/>
+            <a:r>
+              <a:rPr lang="de-AT" sz="2100" dirty="0"/>
+              <a:t>Gründliches Schätzen verhindert Missverständnisse</a:t>
+            </a:r>
+          </a:p>
+          <a:p>
+            <a:endParaRPr lang="de-DE" dirty="0"/>
+          </a:p>
+          <a:p>
+            <a:r>
+              <a:rPr lang="de-DE" sz="2400" b="1" dirty="0"/>
+              <a:t>Einfach vor komplex</a:t>
+            </a:r>
+          </a:p>
+          <a:p>
+            <a:pPr lvl="1"/>
+            <a:r>
+              <a:rPr lang="de-DE" sz="2100" dirty="0"/>
+              <a:t>Einfache und klare Lösungen statt unnötig komplizierter Ansätze</a:t>
+            </a:r>
+          </a:p>
+          <a:p>
+            <a:endParaRPr lang="de-DE" dirty="0"/>
+          </a:p>
+          <a:p>
+            <a:r>
+              <a:rPr lang="de-DE" sz="2400" b="1" dirty="0"/>
+              <a:t>Offene Kommunikation</a:t>
+            </a:r>
+          </a:p>
+          <a:p>
+            <a:pPr lvl="1"/>
+            <a:r>
+              <a:rPr lang="de-DE" sz="2100" dirty="0"/>
+              <a:t>Gute Kommunikation ist essentiell</a:t>
+            </a:r>
+          </a:p>
+          <a:p>
+            <a:pPr marL="0" indent="0">
+              <a:buNone/>
+            </a:pPr>
+            <a:endParaRPr lang="de-DE" dirty="0"/>
+          </a:p>
+          <a:p>
+            <a:endParaRPr lang="de-DE" dirty="0"/>
           </a:p>
         </p:txBody>
       </p:sp>
@@ -13907,7 +14072,7 @@
           <p:cNvPr id="4" name="Fußzeilenplatzhalter 3">
             <a:extLst>
               <a:ext uri="{FF2B5EF4-FFF2-40B4-BE49-F238E27FC236}">
-                <a16:creationId xmlns:a16="http://schemas.microsoft.com/office/drawing/2014/main" id="{D942A9F4-5A19-123D-9935-AB9D4F939C04}"/>
+                <a16:creationId xmlns:a16="http://schemas.microsoft.com/office/drawing/2014/main" id="{EF3C89BD-9939-F75E-CD06-7557242DA97C}"/>
               </a:ext>
             </a:extLst>
           </p:cNvPr>
@@ -13938,7 +14103,7 @@
           <p:cNvPr id="5" name="Foliennummernplatzhalter 4">
             <a:extLst>
               <a:ext uri="{FF2B5EF4-FFF2-40B4-BE49-F238E27FC236}">
-                <a16:creationId xmlns:a16="http://schemas.microsoft.com/office/drawing/2014/main" id="{A8CC9DD3-4AFF-88C7-B3EE-688A0CE837D8}"/>
+                <a16:creationId xmlns:a16="http://schemas.microsoft.com/office/drawing/2014/main" id="{FCAA05B3-E539-18F1-D02C-60BC47198DBB}"/>
               </a:ext>
             </a:extLst>
           </p:cNvPr>
@@ -13960,6 +14125,139 @@
             <a:fld id="{AE4538FE-AEB4-413B-B741-EC1BAEEF6B8F}" type="slidenum">
               <a:rPr lang="de-AT" smtClean="0"/>
               <a:t>22</a:t>
+            </a:fld>
+            <a:endParaRPr lang="de-AT"/>
+          </a:p>
+        </p:txBody>
+      </p:sp>
+    </p:spTree>
+    <p:extLst>
+      <p:ext uri="{BB962C8B-B14F-4D97-AF65-F5344CB8AC3E}">
+        <p14:creationId xmlns:p14="http://schemas.microsoft.com/office/powerpoint/2010/main" val="3605471312"/>
+      </p:ext>
+    </p:extLst>
+  </p:cSld>
+  <p:clrMapOvr>
+    <a:masterClrMapping/>
+  </p:clrMapOvr>
+  <mc:AlternateContent xmlns:mc="http://schemas.openxmlformats.org/markup-compatibility/2006" xmlns:p14="http://schemas.microsoft.com/office/powerpoint/2010/main">
+    <mc:Choice Requires="p14">
+      <p:transition spd="med" p14:dur="700">
+        <p:fade/>
+      </p:transition>
+    </mc:Choice>
+    <mc:Fallback xmlns="">
+      <p:transition spd="med">
+        <p:fade/>
+      </p:transition>
+    </mc:Fallback>
+  </mc:AlternateContent>
+</p:sld>
+</file>
+
+<file path=ppt/slides/slide23.xml><?xml version="1.0" encoding="utf-8"?>
+<p:sld xmlns:a="http://schemas.openxmlformats.org/drawingml/2006/main" xmlns:r="http://schemas.openxmlformats.org/officeDocument/2006/relationships" xmlns:p="http://schemas.openxmlformats.org/presentationml/2006/main">
+  <p:cSld>
+    <p:spTree>
+      <p:nvGrpSpPr>
+        <p:cNvPr id="1" name=""/>
+        <p:cNvGrpSpPr/>
+        <p:nvPr/>
+      </p:nvGrpSpPr>
+      <p:grpSpPr>
+        <a:xfrm>
+          <a:off x="0" y="0"/>
+          <a:ext cx="0" cy="0"/>
+          <a:chOff x="0" y="0"/>
+          <a:chExt cx="0" cy="0"/>
+        </a:xfrm>
+      </p:grpSpPr>
+      <p:sp>
+        <p:nvSpPr>
+          <p:cNvPr id="2" name="Titel 1">
+            <a:extLst>
+              <a:ext uri="{FF2B5EF4-FFF2-40B4-BE49-F238E27FC236}">
+                <a16:creationId xmlns:a16="http://schemas.microsoft.com/office/drawing/2014/main" id="{1A023566-529E-043A-5868-33CEE76861A5}"/>
+              </a:ext>
+            </a:extLst>
+          </p:cNvPr>
+          <p:cNvSpPr>
+            <a:spLocks noGrp="1"/>
+          </p:cNvSpPr>
+          <p:nvPr>
+            <p:ph type="title"/>
+          </p:nvPr>
+        </p:nvSpPr>
+        <p:spPr/>
+        <p:txBody>
+          <a:bodyPr/>
+          <a:lstStyle/>
+          <a:p>
+            <a:r>
+              <a:rPr lang="de-AT" b="1"/>
+              <a:t>Vielen Dank für Eure Aufmerksamkeit</a:t>
+            </a:r>
+          </a:p>
+        </p:txBody>
+      </p:sp>
+      <p:sp>
+        <p:nvSpPr>
+          <p:cNvPr id="4" name="Fußzeilenplatzhalter 3">
+            <a:extLst>
+              <a:ext uri="{FF2B5EF4-FFF2-40B4-BE49-F238E27FC236}">
+                <a16:creationId xmlns:a16="http://schemas.microsoft.com/office/drawing/2014/main" id="{D942A9F4-5A19-123D-9935-AB9D4F939C04}"/>
+              </a:ext>
+            </a:extLst>
+          </p:cNvPr>
+          <p:cNvSpPr>
+            <a:spLocks noGrp="1"/>
+          </p:cNvSpPr>
+          <p:nvPr>
+            <p:ph type="ftr" sz="quarter" idx="11"/>
+          </p:nvPr>
+        </p:nvSpPr>
+        <p:spPr/>
+        <p:txBody>
+          <a:bodyPr/>
+          <a:lstStyle/>
+          <a:p>
+            <a:pPr>
+              <a:defRPr/>
+            </a:pPr>
+            <a:r>
+              <a:rPr lang="de-DE"/>
+              <a:t>DI(FH) Falkensteiner Markus</a:t>
+            </a:r>
+          </a:p>
+        </p:txBody>
+      </p:sp>
+      <p:sp>
+        <p:nvSpPr>
+          <p:cNvPr id="5" name="Foliennummernplatzhalter 4">
+            <a:extLst>
+              <a:ext uri="{FF2B5EF4-FFF2-40B4-BE49-F238E27FC236}">
+                <a16:creationId xmlns:a16="http://schemas.microsoft.com/office/drawing/2014/main" id="{A8CC9DD3-4AFF-88C7-B3EE-688A0CE837D8}"/>
+              </a:ext>
+            </a:extLst>
+          </p:cNvPr>
+          <p:cNvSpPr>
+            <a:spLocks noGrp="1"/>
+          </p:cNvSpPr>
+          <p:nvPr>
+            <p:ph type="sldNum" sz="quarter" idx="12"/>
+          </p:nvPr>
+        </p:nvSpPr>
+        <p:spPr/>
+        <p:txBody>
+          <a:bodyPr/>
+          <a:lstStyle/>
+          <a:p>
+            <a:pPr>
+              <a:defRPr/>
+            </a:pPr>
+            <a:fld id="{AE4538FE-AEB4-413B-B741-EC1BAEEF6B8F}" type="slidenum">
+              <a:rPr lang="de-AT" smtClean="0"/>
+              <a:t>23</a:t>
             </a:fld>
             <a:endParaRPr lang="de-AT"/>
           </a:p>
@@ -18323,6 +18621,15 @@
 </file>
 
 <file path=customXml/item2.xml><?xml version="1.0" encoding="utf-8"?>
+<?mso-contentType ?>
+<FormTemplates xmlns="http://schemas.microsoft.com/sharepoint/v3/contenttype/forms">
+  <Display>DocumentLibraryForm</Display>
+  <Edit>DocumentLibraryForm</Edit>
+  <New>DocumentLibraryForm</New>
+</FormTemplates>
+</file>
+
+<file path=customXml/item3.xml><?xml version="1.0" encoding="utf-8"?>
 <ct:contentTypeSchema xmlns:ct="http://schemas.microsoft.com/office/2006/metadata/contentType" xmlns:ma="http://schemas.microsoft.com/office/2006/metadata/properties/metaAttributes" ct:_="" ma:_="" ma:contentTypeName="Dokument" ma:contentTypeID="0x01010091FD76AC810CD946AFF2048135E5AED8" ma:contentTypeVersion="4" ma:contentTypeDescription="Ein neues Dokument erstellen." ma:contentTypeScope="" ma:versionID="f1a1cd72032fc8609ea7c3f0b5cd8b51">
   <xsd:schema xmlns:xsd="http://www.w3.org/2001/XMLSchema" xmlns:xs="http://www.w3.org/2001/XMLSchema" xmlns:p="http://schemas.microsoft.com/office/2006/metadata/properties" xmlns:ns2="e330c3bd-b73b-44bd-ae32-0c4bdfdcab8e" targetNamespace="http://schemas.microsoft.com/office/2006/metadata/properties" ma:root="true" ma:fieldsID="a8427e112a34e63d5c426854409c5fee" ns2:_="">
     <xsd:import namespace="e330c3bd-b73b-44bd-ae32-0c4bdfdcab8e"/>
@@ -18466,15 +18773,6 @@
 </ct:contentTypeSchema>
 </file>
 
-<file path=customXml/item3.xml><?xml version="1.0" encoding="utf-8"?>
-<?mso-contentType ?>
-<FormTemplates xmlns="http://schemas.microsoft.com/sharepoint/v3/contenttype/forms">
-  <Display>DocumentLibraryForm</Display>
-  <Edit>DocumentLibraryForm</Edit>
-  <New>DocumentLibraryForm</New>
-</FormTemplates>
-</file>
-
 <file path=customXml/itemProps1.xml><?xml version="1.0" encoding="utf-8"?>
 <ds:datastoreItem xmlns:ds="http://schemas.openxmlformats.org/officeDocument/2006/customXml" ds:itemID="{8354EFAF-31A0-41ED-A74D-DAE704B6C081}">
   <ds:schemaRefs>
@@ -18492,6 +18790,14 @@
 </file>
 
 <file path=customXml/itemProps2.xml><?xml version="1.0" encoding="utf-8"?>
+<ds:datastoreItem xmlns:ds="http://schemas.openxmlformats.org/officeDocument/2006/customXml" ds:itemID="{1981A0EB-802E-4D0E-9A2A-3AE4F15204D8}">
+  <ds:schemaRefs>
+    <ds:schemaRef ds:uri="http://schemas.microsoft.com/sharepoint/v3/contenttype/forms"/>
+  </ds:schemaRefs>
+</ds:datastoreItem>
+</file>
+
+<file path=customXml/itemProps3.xml><?xml version="1.0" encoding="utf-8"?>
 <ds:datastoreItem xmlns:ds="http://schemas.openxmlformats.org/officeDocument/2006/customXml" ds:itemID="{B3B628B2-85F5-4AD2-9E28-9130197E5E7C}">
   <ds:schemaRefs>
     <ds:schemaRef ds:uri="e330c3bd-b73b-44bd-ae32-0c4bdfdcab8e"/>
@@ -18507,12 +18813,4 @@
     <ds:schemaRef ds:uri="http://www.w3.org/2001/XMLSchema"/>
   </ds:schemaRefs>
 </ds:datastoreItem>
-</file>
-
-<file path=customXml/itemProps3.xml><?xml version="1.0" encoding="utf-8"?>
-<ds:datastoreItem xmlns:ds="http://schemas.openxmlformats.org/officeDocument/2006/customXml" ds:itemID="{1981A0EB-802E-4D0E-9A2A-3AE4F15204D8}">
-  <ds:schemaRefs>
-    <ds:schemaRef ds:uri="http://schemas.microsoft.com/sharepoint/v3/contenttype/forms"/>
-  </ds:schemaRefs>
-</ds:datastoreItem>
 </file>
</xml_diff>